<commit_message>
new changes update after revision
</commit_message>
<xml_diff>
--- a/Requirements/Presentations/Presentation_Luis.pptx
+++ b/Requirements/Presentations/Presentation_Luis.pptx
@@ -6,13 +6,14 @@
   </p:sldMasterIdLst>
   <p:sldIdLst>
     <p:sldId id="268" r:id="rId2"/>
-    <p:sldId id="261" r:id="rId3"/>
-    <p:sldId id="269" r:id="rId4"/>
-    <p:sldId id="272" r:id="rId5"/>
-    <p:sldId id="258" r:id="rId6"/>
-    <p:sldId id="271" r:id="rId7"/>
-    <p:sldId id="260" r:id="rId8"/>
-    <p:sldId id="273" r:id="rId9"/>
+    <p:sldId id="273" r:id="rId3"/>
+    <p:sldId id="261" r:id="rId4"/>
+    <p:sldId id="269" r:id="rId5"/>
+    <p:sldId id="272" r:id="rId6"/>
+    <p:sldId id="258" r:id="rId7"/>
+    <p:sldId id="271" r:id="rId8"/>
+    <p:sldId id="260" r:id="rId9"/>
+    <p:sldId id="275" r:id="rId10"/>
   </p:sldIdLst>
   <p:sldSz cx="12192000" cy="6858000"/>
   <p:notesSz cx="6858000" cy="9144000"/>
@@ -122,7 +123,7 @@
 <file path=ppt/revisionInfo.xml><?xml version="1.0" encoding="utf-8"?>
 <p1510:revInfo xmlns:a="http://schemas.openxmlformats.org/drawingml/2006/main" xmlns:r="http://schemas.openxmlformats.org/officeDocument/2006/relationships" xmlns:p1510="http://schemas.microsoft.com/office/powerpoint/2015/10/main">
   <p1510:revLst>
-    <p1510:client id="{DD51FDF5-5D26-4F34-9136-EC8102EEAF54}" v="83" dt="2024-01-14T17:36:41.306"/>
+    <p1510:client id="{DD51FDF5-5D26-4F34-9136-EC8102EEAF54}" v="94" dt="2024-01-15T15:21:01.281"/>
   </p1510:revLst>
 </p1510:revInfo>
 </file>
@@ -132,7 +133,7 @@
   <pc:docChgLst>
     <pc:chgData name="Luis Fernando Rodriguez Gutierrez" userId="47d13518-703e-4604-b449-ba54b8feb907" providerId="ADAL" clId="{DD51FDF5-5D26-4F34-9136-EC8102EEAF54}"/>
     <pc:docChg chg="undo custSel addSld delSld modSld sldOrd">
-      <pc:chgData name="Luis Fernando Rodriguez Gutierrez" userId="47d13518-703e-4604-b449-ba54b8feb907" providerId="ADAL" clId="{DD51FDF5-5D26-4F34-9136-EC8102EEAF54}" dt="2024-01-14T17:36:46.100" v="965" actId="26606"/>
+      <pc:chgData name="Luis Fernando Rodriguez Gutierrez" userId="47d13518-703e-4604-b449-ba54b8feb907" providerId="ADAL" clId="{DD51FDF5-5D26-4F34-9136-EC8102EEAF54}" dt="2024-01-15T15:21:35.999" v="1395" actId="1076"/>
       <pc:docMkLst>
         <pc:docMk/>
       </pc:docMkLst>
@@ -223,8 +224,8 @@
           </ac:picMkLst>
         </pc:picChg>
       </pc:sldChg>
-      <pc:sldChg chg="addSp delSp mod">
-        <pc:chgData name="Luis Fernando Rodriguez Gutierrez" userId="47d13518-703e-4604-b449-ba54b8feb907" providerId="ADAL" clId="{DD51FDF5-5D26-4F34-9136-EC8102EEAF54}" dt="2024-01-12T13:28:06.241" v="115" actId="26606"/>
+      <pc:sldChg chg="addSp delSp modSp mod">
+        <pc:chgData name="Luis Fernando Rodriguez Gutierrez" userId="47d13518-703e-4604-b449-ba54b8feb907" providerId="ADAL" clId="{DD51FDF5-5D26-4F34-9136-EC8102EEAF54}" dt="2024-01-15T15:19:14.710" v="1210" actId="26606"/>
         <pc:sldMkLst>
           <pc:docMk/>
           <pc:sldMk cId="2080358371" sldId="260"/>
@@ -245,25 +246,57 @@
             <ac:spMk id="16" creationId="{CD8B4F24-440B-49E9-B85D-733523DC064B}"/>
           </ac:spMkLst>
         </pc:spChg>
-        <pc:spChg chg="add">
-          <ac:chgData name="Luis Fernando Rodriguez Gutierrez" userId="47d13518-703e-4604-b449-ba54b8feb907" providerId="ADAL" clId="{DD51FDF5-5D26-4F34-9136-EC8102EEAF54}" dt="2024-01-12T13:28:06.241" v="115" actId="26606"/>
+        <pc:spChg chg="add del">
+          <ac:chgData name="Luis Fernando Rodriguez Gutierrez" userId="47d13518-703e-4604-b449-ba54b8feb907" providerId="ADAL" clId="{DD51FDF5-5D26-4F34-9136-EC8102EEAF54}" dt="2024-01-15T15:19:14.710" v="1210" actId="26606"/>
           <ac:spMkLst>
             <pc:docMk/>
             <pc:sldMk cId="2080358371" sldId="260"/>
             <ac:spMk id="21" creationId="{2B97F24A-32CE-4C1C-A50D-3016B394DCFB}"/>
           </ac:spMkLst>
         </pc:spChg>
-        <pc:spChg chg="add">
-          <ac:chgData name="Luis Fernando Rodriguez Gutierrez" userId="47d13518-703e-4604-b449-ba54b8feb907" providerId="ADAL" clId="{DD51FDF5-5D26-4F34-9136-EC8102EEAF54}" dt="2024-01-12T13:28:06.241" v="115" actId="26606"/>
+        <pc:spChg chg="add del">
+          <ac:chgData name="Luis Fernando Rodriguez Gutierrez" userId="47d13518-703e-4604-b449-ba54b8feb907" providerId="ADAL" clId="{DD51FDF5-5D26-4F34-9136-EC8102EEAF54}" dt="2024-01-15T15:19:14.710" v="1210" actId="26606"/>
           <ac:spMkLst>
             <pc:docMk/>
             <pc:sldMk cId="2080358371" sldId="260"/>
             <ac:spMk id="23" creationId="{CD8B4F24-440B-49E9-B85D-733523DC064B}"/>
           </ac:spMkLst>
         </pc:spChg>
+        <pc:spChg chg="add">
+          <ac:chgData name="Luis Fernando Rodriguez Gutierrez" userId="47d13518-703e-4604-b449-ba54b8feb907" providerId="ADAL" clId="{DD51FDF5-5D26-4F34-9136-EC8102EEAF54}" dt="2024-01-15T15:19:14.710" v="1210" actId="26606"/>
+          <ac:spMkLst>
+            <pc:docMk/>
+            <pc:sldMk cId="2080358371" sldId="260"/>
+            <ac:spMk id="28" creationId="{2B97F24A-32CE-4C1C-A50D-3016B394DCFB}"/>
+          </ac:spMkLst>
+        </pc:spChg>
+        <pc:spChg chg="add">
+          <ac:chgData name="Luis Fernando Rodriguez Gutierrez" userId="47d13518-703e-4604-b449-ba54b8feb907" providerId="ADAL" clId="{DD51FDF5-5D26-4F34-9136-EC8102EEAF54}" dt="2024-01-15T15:19:14.710" v="1210" actId="26606"/>
+          <ac:spMkLst>
+            <pc:docMk/>
+            <pc:sldMk cId="2080358371" sldId="260"/>
+            <ac:spMk id="30" creationId="{CD8B4F24-440B-49E9-B85D-733523DC064B}"/>
+          </ac:spMkLst>
+        </pc:spChg>
+        <pc:picChg chg="del">
+          <ac:chgData name="Luis Fernando Rodriguez Gutierrez" userId="47d13518-703e-4604-b449-ba54b8feb907" providerId="ADAL" clId="{DD51FDF5-5D26-4F34-9136-EC8102EEAF54}" dt="2024-01-15T15:19:05.442" v="1208" actId="478"/>
+          <ac:picMkLst>
+            <pc:docMk/>
+            <pc:sldMk cId="2080358371" sldId="260"/>
+            <ac:picMk id="4" creationId="{6A52FA51-F15D-558B-042D-16B245E2F3AF}"/>
+          </ac:picMkLst>
+        </pc:picChg>
+        <pc:picChg chg="add mod">
+          <ac:chgData name="Luis Fernando Rodriguez Gutierrez" userId="47d13518-703e-4604-b449-ba54b8feb907" providerId="ADAL" clId="{DD51FDF5-5D26-4F34-9136-EC8102EEAF54}" dt="2024-01-15T15:19:14.710" v="1210" actId="26606"/>
+          <ac:picMkLst>
+            <pc:docMk/>
+            <pc:sldMk cId="2080358371" sldId="260"/>
+            <ac:picMk id="5" creationId="{1371372A-7ACD-F9AC-AED0-052716656783}"/>
+          </ac:picMkLst>
+        </pc:picChg>
       </pc:sldChg>
       <pc:sldChg chg="addSp delSp modSp mod setBg">
-        <pc:chgData name="Luis Fernando Rodriguez Gutierrez" userId="47d13518-703e-4604-b449-ba54b8feb907" providerId="ADAL" clId="{DD51FDF5-5D26-4F34-9136-EC8102EEAF54}" dt="2024-01-14T17:26:45.171" v="941" actId="692"/>
+        <pc:chgData name="Luis Fernando Rodriguez Gutierrez" userId="47d13518-703e-4604-b449-ba54b8feb907" providerId="ADAL" clId="{DD51FDF5-5D26-4F34-9136-EC8102EEAF54}" dt="2024-01-15T15:11:12.181" v="1179" actId="1076"/>
         <pc:sldMkLst>
           <pc:docMk/>
           <pc:sldMk cId="3275417882" sldId="261"/>
@@ -284,8 +317,8 @@
             <ac:spMk id="9" creationId="{6587E8D0-A7AB-C8BA-C7C7-86FEE2105C0B}"/>
           </ac:spMkLst>
         </pc:spChg>
-        <pc:spChg chg="add mod ord">
-          <ac:chgData name="Luis Fernando Rodriguez Gutierrez" userId="47d13518-703e-4604-b449-ba54b8feb907" providerId="ADAL" clId="{DD51FDF5-5D26-4F34-9136-EC8102EEAF54}" dt="2024-01-14T17:26:22.138" v="936" actId="207"/>
+        <pc:spChg chg="add del mod ord">
+          <ac:chgData name="Luis Fernando Rodriguez Gutierrez" userId="47d13518-703e-4604-b449-ba54b8feb907" providerId="ADAL" clId="{DD51FDF5-5D26-4F34-9136-EC8102EEAF54}" dt="2024-01-15T15:10:41.981" v="1169" actId="21"/>
           <ac:spMkLst>
             <pc:docMk/>
             <pc:sldMk cId="3275417882" sldId="261"/>
@@ -300,16 +333,16 @@
             <ac:spMk id="11" creationId="{47389148-6EEB-770B-B95D-095683385635}"/>
           </ac:spMkLst>
         </pc:spChg>
-        <pc:spChg chg="add mod ord">
-          <ac:chgData name="Luis Fernando Rodriguez Gutierrez" userId="47d13518-703e-4604-b449-ba54b8feb907" providerId="ADAL" clId="{DD51FDF5-5D26-4F34-9136-EC8102EEAF54}" dt="2024-01-14T17:26:08.286" v="934" actId="1076"/>
+        <pc:spChg chg="add del mod ord">
+          <ac:chgData name="Luis Fernando Rodriguez Gutierrez" userId="47d13518-703e-4604-b449-ba54b8feb907" providerId="ADAL" clId="{DD51FDF5-5D26-4F34-9136-EC8102EEAF54}" dt="2024-01-15T15:10:41.981" v="1169" actId="21"/>
           <ac:spMkLst>
             <pc:docMk/>
             <pc:sldMk cId="3275417882" sldId="261"/>
             <ac:spMk id="12" creationId="{569928B0-9253-FA55-0C11-B1860ECAE94A}"/>
           </ac:spMkLst>
         </pc:spChg>
-        <pc:spChg chg="add mod ord">
-          <ac:chgData name="Luis Fernando Rodriguez Gutierrez" userId="47d13518-703e-4604-b449-ba54b8feb907" providerId="ADAL" clId="{DD51FDF5-5D26-4F34-9136-EC8102EEAF54}" dt="2024-01-14T17:26:08.286" v="934" actId="1076"/>
+        <pc:spChg chg="add del mod ord">
+          <ac:chgData name="Luis Fernando Rodriguez Gutierrez" userId="47d13518-703e-4604-b449-ba54b8feb907" providerId="ADAL" clId="{DD51FDF5-5D26-4F34-9136-EC8102EEAF54}" dt="2024-01-15T15:10:41.981" v="1169" actId="21"/>
           <ac:spMkLst>
             <pc:docMk/>
             <pc:sldMk cId="3275417882" sldId="261"/>
@@ -324,8 +357,8 @@
             <ac:spMk id="14" creationId="{2B97F24A-32CE-4C1C-A50D-3016B394DCFB}"/>
           </ac:spMkLst>
         </pc:spChg>
-        <pc:spChg chg="add mod ord">
-          <ac:chgData name="Luis Fernando Rodriguez Gutierrez" userId="47d13518-703e-4604-b449-ba54b8feb907" providerId="ADAL" clId="{DD51FDF5-5D26-4F34-9136-EC8102EEAF54}" dt="2024-01-14T17:26:25.889" v="937" actId="207"/>
+        <pc:spChg chg="add del mod ord">
+          <ac:chgData name="Luis Fernando Rodriguez Gutierrez" userId="47d13518-703e-4604-b449-ba54b8feb907" providerId="ADAL" clId="{DD51FDF5-5D26-4F34-9136-EC8102EEAF54}" dt="2024-01-15T15:10:41.981" v="1169" actId="21"/>
           <ac:spMkLst>
             <pc:docMk/>
             <pc:sldMk cId="3275417882" sldId="261"/>
@@ -340,22 +373,46 @@
             <ac:spMk id="16" creationId="{CD8B4F24-440B-49E9-B85D-733523DC064B}"/>
           </ac:spMkLst>
         </pc:spChg>
-        <pc:spChg chg="add mod ord">
-          <ac:chgData name="Luis Fernando Rodriguez Gutierrez" userId="47d13518-703e-4604-b449-ba54b8feb907" providerId="ADAL" clId="{DD51FDF5-5D26-4F34-9136-EC8102EEAF54}" dt="2024-01-14T17:23:49.449" v="906" actId="1076"/>
+        <pc:spChg chg="add del mod ord">
+          <ac:chgData name="Luis Fernando Rodriguez Gutierrez" userId="47d13518-703e-4604-b449-ba54b8feb907" providerId="ADAL" clId="{DD51FDF5-5D26-4F34-9136-EC8102EEAF54}" dt="2024-01-15T15:10:41.981" v="1169" actId="21"/>
           <ac:spMkLst>
             <pc:docMk/>
             <pc:sldMk cId="3275417882" sldId="261"/>
             <ac:spMk id="17" creationId="{26F6281D-7B4A-CFD4-9E7E-1CEE0C71557D}"/>
           </ac:spMkLst>
         </pc:spChg>
-        <pc:spChg chg="add mod ord">
-          <ac:chgData name="Luis Fernando Rodriguez Gutierrez" userId="47d13518-703e-4604-b449-ba54b8feb907" providerId="ADAL" clId="{DD51FDF5-5D26-4F34-9136-EC8102EEAF54}" dt="2024-01-14T17:23:49.449" v="906" actId="1076"/>
+        <pc:spChg chg="add del mod ord">
+          <ac:chgData name="Luis Fernando Rodriguez Gutierrez" userId="47d13518-703e-4604-b449-ba54b8feb907" providerId="ADAL" clId="{DD51FDF5-5D26-4F34-9136-EC8102EEAF54}" dt="2024-01-15T15:10:41.981" v="1169" actId="21"/>
           <ac:spMkLst>
             <pc:docMk/>
             <pc:sldMk cId="3275417882" sldId="261"/>
             <ac:spMk id="18" creationId="{EF32660C-30F8-99B8-E41E-471103E89FB1}"/>
           </ac:spMkLst>
         </pc:spChg>
+        <pc:spChg chg="add mod">
+          <ac:chgData name="Luis Fernando Rodriguez Gutierrez" userId="47d13518-703e-4604-b449-ba54b8feb907" providerId="ADAL" clId="{DD51FDF5-5D26-4F34-9136-EC8102EEAF54}" dt="2024-01-15T15:10:48.311" v="1173"/>
+          <ac:spMkLst>
+            <pc:docMk/>
+            <pc:sldMk cId="3275417882" sldId="261"/>
+            <ac:spMk id="19" creationId="{7019285E-40D6-7517-0D2D-F51C317CE0A0}"/>
+          </ac:spMkLst>
+        </pc:spChg>
+        <pc:spChg chg="add mod">
+          <ac:chgData name="Luis Fernando Rodriguez Gutierrez" userId="47d13518-703e-4604-b449-ba54b8feb907" providerId="ADAL" clId="{DD51FDF5-5D26-4F34-9136-EC8102EEAF54}" dt="2024-01-15T15:10:48.311" v="1173"/>
+          <ac:spMkLst>
+            <pc:docMk/>
+            <pc:sldMk cId="3275417882" sldId="261"/>
+            <ac:spMk id="20" creationId="{569928B0-9253-FA55-0C11-B1860ECAE94A}"/>
+          </ac:spMkLst>
+        </pc:spChg>
+        <pc:spChg chg="add mod">
+          <ac:chgData name="Luis Fernando Rodriguez Gutierrez" userId="47d13518-703e-4604-b449-ba54b8feb907" providerId="ADAL" clId="{DD51FDF5-5D26-4F34-9136-EC8102EEAF54}" dt="2024-01-15T15:10:48.311" v="1173"/>
+          <ac:spMkLst>
+            <pc:docMk/>
+            <pc:sldMk cId="3275417882" sldId="261"/>
+            <ac:spMk id="21" creationId="{58B18A23-E1F5-D2F0-1742-5B4134C036DD}"/>
+          </ac:spMkLst>
+        </pc:spChg>
         <pc:spChg chg="add del">
           <ac:chgData name="Luis Fernando Rodriguez Gutierrez" userId="47d13518-703e-4604-b449-ba54b8feb907" providerId="ADAL" clId="{DD51FDF5-5D26-4F34-9136-EC8102EEAF54}" dt="2024-01-14T16:44:10.089" v="425" actId="26606"/>
           <ac:spMkLst>
@@ -364,6 +421,14 @@
             <ac:spMk id="21" creationId="{F13C74B1-5B17-4795-BED0-7140497B445A}"/>
           </ac:spMkLst>
         </pc:spChg>
+        <pc:spChg chg="add mod">
+          <ac:chgData name="Luis Fernando Rodriguez Gutierrez" userId="47d13518-703e-4604-b449-ba54b8feb907" providerId="ADAL" clId="{DD51FDF5-5D26-4F34-9136-EC8102EEAF54}" dt="2024-01-15T15:10:48.311" v="1173"/>
+          <ac:spMkLst>
+            <pc:docMk/>
+            <pc:sldMk cId="3275417882" sldId="261"/>
+            <ac:spMk id="23" creationId="{C23A6BEA-4FEA-226E-A272-269E6B3881F7}"/>
+          </ac:spMkLst>
+        </pc:spChg>
         <pc:spChg chg="add del">
           <ac:chgData name="Luis Fernando Rodriguez Gutierrez" userId="47d13518-703e-4604-b449-ba54b8feb907" providerId="ADAL" clId="{DD51FDF5-5D26-4F34-9136-EC8102EEAF54}" dt="2024-01-14T16:44:10.089" v="425" actId="26606"/>
           <ac:spMkLst>
@@ -372,6 +437,14 @@
             <ac:spMk id="23" creationId="{D4974D33-8DC5-464E-8C6D-BE58F0669C17}"/>
           </ac:spMkLst>
         </pc:spChg>
+        <pc:spChg chg="add mod">
+          <ac:chgData name="Luis Fernando Rodriguez Gutierrez" userId="47d13518-703e-4604-b449-ba54b8feb907" providerId="ADAL" clId="{DD51FDF5-5D26-4F34-9136-EC8102EEAF54}" dt="2024-01-15T15:10:48.311" v="1173"/>
+          <ac:spMkLst>
+            <pc:docMk/>
+            <pc:sldMk cId="3275417882" sldId="261"/>
+            <ac:spMk id="25" creationId="{26F6281D-7B4A-CFD4-9E7E-1CEE0C71557D}"/>
+          </ac:spMkLst>
+        </pc:spChg>
         <pc:spChg chg="add del mod">
           <ac:chgData name="Luis Fernando Rodriguez Gutierrez" userId="47d13518-703e-4604-b449-ba54b8feb907" providerId="ADAL" clId="{DD51FDF5-5D26-4F34-9136-EC8102EEAF54}" dt="2024-01-14T17:24:03.925" v="911" actId="478"/>
           <ac:spMkLst>
@@ -388,6 +461,14 @@
             <ac:spMk id="26" creationId="{85D25A54-DB3A-7643-83FA-D0FDB00E2755}"/>
           </ac:spMkLst>
         </pc:spChg>
+        <pc:spChg chg="add mod">
+          <ac:chgData name="Luis Fernando Rodriguez Gutierrez" userId="47d13518-703e-4604-b449-ba54b8feb907" providerId="ADAL" clId="{DD51FDF5-5D26-4F34-9136-EC8102EEAF54}" dt="2024-01-15T15:10:48.311" v="1173"/>
+          <ac:spMkLst>
+            <pc:docMk/>
+            <pc:sldMk cId="3275417882" sldId="261"/>
+            <ac:spMk id="26" creationId="{EF32660C-30F8-99B8-E41E-471103E89FB1}"/>
+          </ac:spMkLst>
+        </pc:spChg>
         <pc:spChg chg="add del mod">
           <ac:chgData name="Luis Fernando Rodriguez Gutierrez" userId="47d13518-703e-4604-b449-ba54b8feb907" providerId="ADAL" clId="{DD51FDF5-5D26-4F34-9136-EC8102EEAF54}" dt="2024-01-14T17:24:03.925" v="911" actId="478"/>
           <ac:spMkLst>
@@ -397,51 +478,195 @@
           </ac:spMkLst>
         </pc:spChg>
         <pc:spChg chg="add mod">
-          <ac:chgData name="Luis Fernando Rodriguez Gutierrez" userId="47d13518-703e-4604-b449-ba54b8feb907" providerId="ADAL" clId="{DD51FDF5-5D26-4F34-9136-EC8102EEAF54}" dt="2024-01-14T17:25:43.102" v="929" actId="1076"/>
+          <ac:chgData name="Luis Fernando Rodriguez Gutierrez" userId="47d13518-703e-4604-b449-ba54b8feb907" providerId="ADAL" clId="{DD51FDF5-5D26-4F34-9136-EC8102EEAF54}" dt="2024-01-15T15:10:48.311" v="1173"/>
+          <ac:spMkLst>
+            <pc:docMk/>
+            <pc:sldMk cId="3275417882" sldId="261"/>
+            <ac:spMk id="27" creationId="{F626299B-1422-5920-5B6E-33E7AB56CCD9}"/>
+          </ac:spMkLst>
+        </pc:spChg>
+        <pc:spChg chg="add del mod">
+          <ac:chgData name="Luis Fernando Rodriguez Gutierrez" userId="47d13518-703e-4604-b449-ba54b8feb907" providerId="ADAL" clId="{DD51FDF5-5D26-4F34-9136-EC8102EEAF54}" dt="2024-01-15T15:10:41.981" v="1169" actId="21"/>
           <ac:spMkLst>
             <pc:docMk/>
             <pc:sldMk cId="3275417882" sldId="261"/>
             <ac:spMk id="28" creationId="{F626299B-1422-5920-5B6E-33E7AB56CCD9}"/>
           </ac:spMkLst>
         </pc:spChg>
-        <pc:spChg chg="add mod">
-          <ac:chgData name="Luis Fernando Rodriguez Gutierrez" userId="47d13518-703e-4604-b449-ba54b8feb907" providerId="ADAL" clId="{DD51FDF5-5D26-4F34-9136-EC8102EEAF54}" dt="2024-01-14T17:25:45.366" v="930" actId="1076"/>
+        <pc:spChg chg="add del mod">
+          <ac:chgData name="Luis Fernando Rodriguez Gutierrez" userId="47d13518-703e-4604-b449-ba54b8feb907" providerId="ADAL" clId="{DD51FDF5-5D26-4F34-9136-EC8102EEAF54}" dt="2024-01-15T15:10:41.981" v="1169" actId="21"/>
           <ac:spMkLst>
             <pc:docMk/>
             <pc:sldMk cId="3275417882" sldId="261"/>
             <ac:spMk id="29" creationId="{3D60F3CC-B5E4-A947-5F55-C46BF5128245}"/>
           </ac:spMkLst>
         </pc:spChg>
-        <pc:spChg chg="add mod">
-          <ac:chgData name="Luis Fernando Rodriguez Gutierrez" userId="47d13518-703e-4604-b449-ba54b8feb907" providerId="ADAL" clId="{DD51FDF5-5D26-4F34-9136-EC8102EEAF54}" dt="2024-01-14T17:25:53.025" v="932" actId="1076"/>
+        <pc:spChg chg="add del mod">
+          <ac:chgData name="Luis Fernando Rodriguez Gutierrez" userId="47d13518-703e-4604-b449-ba54b8feb907" providerId="ADAL" clId="{DD51FDF5-5D26-4F34-9136-EC8102EEAF54}" dt="2024-01-15T15:10:41.981" v="1169" actId="21"/>
           <ac:spMkLst>
             <pc:docMk/>
             <pc:sldMk cId="3275417882" sldId="261"/>
             <ac:spMk id="30" creationId="{82C88C94-3E1A-DD0D-0B11-8A3F1A803BCA}"/>
           </ac:spMkLst>
         </pc:spChg>
-        <pc:spChg chg="add mod">
-          <ac:chgData name="Luis Fernando Rodriguez Gutierrez" userId="47d13518-703e-4604-b449-ba54b8feb907" providerId="ADAL" clId="{DD51FDF5-5D26-4F34-9136-EC8102EEAF54}" dt="2024-01-14T17:25:37.124" v="927" actId="1076"/>
+        <pc:spChg chg="add del mod">
+          <ac:chgData name="Luis Fernando Rodriguez Gutierrez" userId="47d13518-703e-4604-b449-ba54b8feb907" providerId="ADAL" clId="{DD51FDF5-5D26-4F34-9136-EC8102EEAF54}" dt="2024-01-15T15:10:41.981" v="1169" actId="21"/>
           <ac:spMkLst>
             <pc:docMk/>
             <pc:sldMk cId="3275417882" sldId="261"/>
             <ac:spMk id="31" creationId="{23E897B4-6B7A-3201-A4A2-F84359BDC81A}"/>
           </ac:spMkLst>
         </pc:spChg>
-        <pc:spChg chg="add mod">
-          <ac:chgData name="Luis Fernando Rodriguez Gutierrez" userId="47d13518-703e-4604-b449-ba54b8feb907" providerId="ADAL" clId="{DD51FDF5-5D26-4F34-9136-EC8102EEAF54}" dt="2024-01-14T17:25:02.076" v="925" actId="1076"/>
+        <pc:spChg chg="add del mod">
+          <ac:chgData name="Luis Fernando Rodriguez Gutierrez" userId="47d13518-703e-4604-b449-ba54b8feb907" providerId="ADAL" clId="{DD51FDF5-5D26-4F34-9136-EC8102EEAF54}" dt="2024-01-15T15:10:41.981" v="1169" actId="21"/>
           <ac:spMkLst>
             <pc:docMk/>
             <pc:sldMk cId="3275417882" sldId="261"/>
             <ac:spMk id="32" creationId="{7C0A972B-8DA6-464D-8DB8-52D10187E75B}"/>
           </ac:spMkLst>
         </pc:spChg>
-        <pc:spChg chg="add mod">
-          <ac:chgData name="Luis Fernando Rodriguez Gutierrez" userId="47d13518-703e-4604-b449-ba54b8feb907" providerId="ADAL" clId="{DD51FDF5-5D26-4F34-9136-EC8102EEAF54}" dt="2024-01-14T17:25:35.466" v="926" actId="1076"/>
+        <pc:spChg chg="add del mod">
+          <ac:chgData name="Luis Fernando Rodriguez Gutierrez" userId="47d13518-703e-4604-b449-ba54b8feb907" providerId="ADAL" clId="{DD51FDF5-5D26-4F34-9136-EC8102EEAF54}" dt="2024-01-15T15:10:41.981" v="1169" actId="21"/>
           <ac:spMkLst>
             <pc:docMk/>
             <pc:sldMk cId="3275417882" sldId="261"/>
             <ac:spMk id="33" creationId="{80D3272F-3785-EF90-ADAB-5AB5A77F4892}"/>
+          </ac:spMkLst>
+        </pc:spChg>
+        <pc:spChg chg="add mod">
+          <ac:chgData name="Luis Fernando Rodriguez Gutierrez" userId="47d13518-703e-4604-b449-ba54b8feb907" providerId="ADAL" clId="{DD51FDF5-5D26-4F34-9136-EC8102EEAF54}" dt="2024-01-15T15:10:48.311" v="1173"/>
+          <ac:spMkLst>
+            <pc:docMk/>
+            <pc:sldMk cId="3275417882" sldId="261"/>
+            <ac:spMk id="34" creationId="{3D60F3CC-B5E4-A947-5F55-C46BF5128245}"/>
+          </ac:spMkLst>
+        </pc:spChg>
+        <pc:spChg chg="add mod">
+          <ac:chgData name="Luis Fernando Rodriguez Gutierrez" userId="47d13518-703e-4604-b449-ba54b8feb907" providerId="ADAL" clId="{DD51FDF5-5D26-4F34-9136-EC8102EEAF54}" dt="2024-01-15T15:10:48.311" v="1173"/>
+          <ac:spMkLst>
+            <pc:docMk/>
+            <pc:sldMk cId="3275417882" sldId="261"/>
+            <ac:spMk id="36" creationId="{82C88C94-3E1A-DD0D-0B11-8A3F1A803BCA}"/>
+          </ac:spMkLst>
+        </pc:spChg>
+        <pc:spChg chg="add mod">
+          <ac:chgData name="Luis Fernando Rodriguez Gutierrez" userId="47d13518-703e-4604-b449-ba54b8feb907" providerId="ADAL" clId="{DD51FDF5-5D26-4F34-9136-EC8102EEAF54}" dt="2024-01-15T15:10:48.311" v="1173"/>
+          <ac:spMkLst>
+            <pc:docMk/>
+            <pc:sldMk cId="3275417882" sldId="261"/>
+            <ac:spMk id="37" creationId="{23E897B4-6B7A-3201-A4A2-F84359BDC81A}"/>
+          </ac:spMkLst>
+        </pc:spChg>
+        <pc:spChg chg="add mod">
+          <ac:chgData name="Luis Fernando Rodriguez Gutierrez" userId="47d13518-703e-4604-b449-ba54b8feb907" providerId="ADAL" clId="{DD51FDF5-5D26-4F34-9136-EC8102EEAF54}" dt="2024-01-15T15:10:48.311" v="1173"/>
+          <ac:spMkLst>
+            <pc:docMk/>
+            <pc:sldMk cId="3275417882" sldId="261"/>
+            <ac:spMk id="38" creationId="{7C0A972B-8DA6-464D-8DB8-52D10187E75B}"/>
+          </ac:spMkLst>
+        </pc:spChg>
+        <pc:spChg chg="add mod">
+          <ac:chgData name="Luis Fernando Rodriguez Gutierrez" userId="47d13518-703e-4604-b449-ba54b8feb907" providerId="ADAL" clId="{DD51FDF5-5D26-4F34-9136-EC8102EEAF54}" dt="2024-01-15T15:10:48.311" v="1173"/>
+          <ac:spMkLst>
+            <pc:docMk/>
+            <pc:sldMk cId="3275417882" sldId="261"/>
+            <ac:spMk id="39" creationId="{80D3272F-3785-EF90-ADAB-5AB5A77F4892}"/>
+          </ac:spMkLst>
+        </pc:spChg>
+        <pc:spChg chg="add mod">
+          <ac:chgData name="Luis Fernando Rodriguez Gutierrez" userId="47d13518-703e-4604-b449-ba54b8feb907" providerId="ADAL" clId="{DD51FDF5-5D26-4F34-9136-EC8102EEAF54}" dt="2024-01-15T15:10:51.593" v="1174"/>
+          <ac:spMkLst>
+            <pc:docMk/>
+            <pc:sldMk cId="3275417882" sldId="261"/>
+            <ac:spMk id="42" creationId="{1357319E-049B-0F1C-722A-0EC8E76A0785}"/>
+          </ac:spMkLst>
+        </pc:spChg>
+        <pc:spChg chg="add mod">
+          <ac:chgData name="Luis Fernando Rodriguez Gutierrez" userId="47d13518-703e-4604-b449-ba54b8feb907" providerId="ADAL" clId="{DD51FDF5-5D26-4F34-9136-EC8102EEAF54}" dt="2024-01-15T15:10:51.593" v="1174"/>
+          <ac:spMkLst>
+            <pc:docMk/>
+            <pc:sldMk cId="3275417882" sldId="261"/>
+            <ac:spMk id="43" creationId="{61B43DEF-FCED-86C9-9CA6-CF68BD44706C}"/>
+          </ac:spMkLst>
+        </pc:spChg>
+        <pc:spChg chg="add mod">
+          <ac:chgData name="Luis Fernando Rodriguez Gutierrez" userId="47d13518-703e-4604-b449-ba54b8feb907" providerId="ADAL" clId="{DD51FDF5-5D26-4F34-9136-EC8102EEAF54}" dt="2024-01-15T15:10:51.593" v="1174"/>
+          <ac:spMkLst>
+            <pc:docMk/>
+            <pc:sldMk cId="3275417882" sldId="261"/>
+            <ac:spMk id="44" creationId="{18EC5516-98EB-5C0E-0B9E-EAD6F8572533}"/>
+          </ac:spMkLst>
+        </pc:spChg>
+        <pc:spChg chg="add mod">
+          <ac:chgData name="Luis Fernando Rodriguez Gutierrez" userId="47d13518-703e-4604-b449-ba54b8feb907" providerId="ADAL" clId="{DD51FDF5-5D26-4F34-9136-EC8102EEAF54}" dt="2024-01-15T15:11:05.460" v="1177" actId="1076"/>
+          <ac:spMkLst>
+            <pc:docMk/>
+            <pc:sldMk cId="3275417882" sldId="261"/>
+            <ac:spMk id="46" creationId="{55767D49-1EF5-B7AE-77F2-42CA2795BF12}"/>
+          </ac:spMkLst>
+        </pc:spChg>
+        <pc:spChg chg="add mod">
+          <ac:chgData name="Luis Fernando Rodriguez Gutierrez" userId="47d13518-703e-4604-b449-ba54b8feb907" providerId="ADAL" clId="{DD51FDF5-5D26-4F34-9136-EC8102EEAF54}" dt="2024-01-15T15:11:05.460" v="1177" actId="1076"/>
+          <ac:spMkLst>
+            <pc:docMk/>
+            <pc:sldMk cId="3275417882" sldId="261"/>
+            <ac:spMk id="47" creationId="{F77AE316-A040-60CF-AD73-4963CE3B11DB}"/>
+          </ac:spMkLst>
+        </pc:spChg>
+        <pc:spChg chg="add mod">
+          <ac:chgData name="Luis Fernando Rodriguez Gutierrez" userId="47d13518-703e-4604-b449-ba54b8feb907" providerId="ADAL" clId="{DD51FDF5-5D26-4F34-9136-EC8102EEAF54}" dt="2024-01-15T15:11:05.460" v="1177" actId="1076"/>
+          <ac:spMkLst>
+            <pc:docMk/>
+            <pc:sldMk cId="3275417882" sldId="261"/>
+            <ac:spMk id="48" creationId="{508CA081-2154-5827-2D47-433D3BB2A4D2}"/>
+          </ac:spMkLst>
+        </pc:spChg>
+        <pc:spChg chg="add mod">
+          <ac:chgData name="Luis Fernando Rodriguez Gutierrez" userId="47d13518-703e-4604-b449-ba54b8feb907" providerId="ADAL" clId="{DD51FDF5-5D26-4F34-9136-EC8102EEAF54}" dt="2024-01-15T15:10:57.134" v="1175" actId="1076"/>
+          <ac:spMkLst>
+            <pc:docMk/>
+            <pc:sldMk cId="3275417882" sldId="261"/>
+            <ac:spMk id="49" creationId="{680AA6C6-7D91-F1A0-0A17-D32EBB82EFFD}"/>
+          </ac:spMkLst>
+        </pc:spChg>
+        <pc:spChg chg="add mod">
+          <ac:chgData name="Luis Fernando Rodriguez Gutierrez" userId="47d13518-703e-4604-b449-ba54b8feb907" providerId="ADAL" clId="{DD51FDF5-5D26-4F34-9136-EC8102EEAF54}" dt="2024-01-15T15:10:57.134" v="1175" actId="1076"/>
+          <ac:spMkLst>
+            <pc:docMk/>
+            <pc:sldMk cId="3275417882" sldId="261"/>
+            <ac:spMk id="50" creationId="{1CD6AF0D-FE76-6EED-FD3A-1C964F1109BD}"/>
+          </ac:spMkLst>
+        </pc:spChg>
+        <pc:spChg chg="add mod">
+          <ac:chgData name="Luis Fernando Rodriguez Gutierrez" userId="47d13518-703e-4604-b449-ba54b8feb907" providerId="ADAL" clId="{DD51FDF5-5D26-4F34-9136-EC8102EEAF54}" dt="2024-01-15T15:10:57.134" v="1175" actId="1076"/>
+          <ac:spMkLst>
+            <pc:docMk/>
+            <pc:sldMk cId="3275417882" sldId="261"/>
+            <ac:spMk id="51" creationId="{30444D10-577A-5EB3-B4B8-09CFFB972062}"/>
+          </ac:spMkLst>
+        </pc:spChg>
+        <pc:spChg chg="add mod">
+          <ac:chgData name="Luis Fernando Rodriguez Gutierrez" userId="47d13518-703e-4604-b449-ba54b8feb907" providerId="ADAL" clId="{DD51FDF5-5D26-4F34-9136-EC8102EEAF54}" dt="2024-01-15T15:11:00.736" v="1176" actId="1076"/>
+          <ac:spMkLst>
+            <pc:docMk/>
+            <pc:sldMk cId="3275417882" sldId="261"/>
+            <ac:spMk id="52" creationId="{7B3EAF02-ACC2-14E5-6921-5782AFCD0284}"/>
+          </ac:spMkLst>
+        </pc:spChg>
+        <pc:spChg chg="add mod">
+          <ac:chgData name="Luis Fernando Rodriguez Gutierrez" userId="47d13518-703e-4604-b449-ba54b8feb907" providerId="ADAL" clId="{DD51FDF5-5D26-4F34-9136-EC8102EEAF54}" dt="2024-01-15T15:11:00.736" v="1176" actId="1076"/>
+          <ac:spMkLst>
+            <pc:docMk/>
+            <pc:sldMk cId="3275417882" sldId="261"/>
+            <ac:spMk id="53" creationId="{57655DC0-3809-6A18-E1B8-793DD1B6C0B2}"/>
+          </ac:spMkLst>
+        </pc:spChg>
+        <pc:spChg chg="add mod">
+          <ac:chgData name="Luis Fernando Rodriguez Gutierrez" userId="47d13518-703e-4604-b449-ba54b8feb907" providerId="ADAL" clId="{DD51FDF5-5D26-4F34-9136-EC8102EEAF54}" dt="2024-01-15T15:11:00.736" v="1176" actId="1076"/>
+          <ac:spMkLst>
+            <pc:docMk/>
+            <pc:sldMk cId="3275417882" sldId="261"/>
+            <ac:spMk id="54" creationId="{B95F2391-15E6-AD99-468D-980C22C688B8}"/>
           </ac:spMkLst>
         </pc:spChg>
         <pc:picChg chg="del mod modCrop">
@@ -452,8 +677,16 @@
             <ac:picMk id="3" creationId="{A7DCBC03-4886-4D96-8D92-BC04F4A3A4C0}"/>
           </ac:picMkLst>
         </pc:picChg>
-        <pc:picChg chg="add mod ord">
-          <ac:chgData name="Luis Fernando Rodriguez Gutierrez" userId="47d13518-703e-4604-b449-ba54b8feb907" providerId="ADAL" clId="{DD51FDF5-5D26-4F34-9136-EC8102EEAF54}" dt="2024-01-14T17:23:32.191" v="902" actId="1076"/>
+        <pc:picChg chg="add del mod ord">
+          <ac:chgData name="Luis Fernando Rodriguez Gutierrez" userId="47d13518-703e-4604-b449-ba54b8feb907" providerId="ADAL" clId="{DD51FDF5-5D26-4F34-9136-EC8102EEAF54}" dt="2024-01-15T15:10:35.015" v="1164" actId="478"/>
+          <ac:picMkLst>
+            <pc:docMk/>
+            <pc:sldMk cId="3275417882" sldId="261"/>
+            <ac:picMk id="4" creationId="{B13E78E2-2F56-B6C0-5DA5-49D9530D0A76}"/>
+          </ac:picMkLst>
+        </pc:picChg>
+        <pc:picChg chg="add del mod ord">
+          <ac:chgData name="Luis Fernando Rodriguez Gutierrez" userId="47d13518-703e-4604-b449-ba54b8feb907" providerId="ADAL" clId="{DD51FDF5-5D26-4F34-9136-EC8102EEAF54}" dt="2024-01-15T15:10:41.981" v="1169" actId="21"/>
           <ac:picMkLst>
             <pc:docMk/>
             <pc:sldMk cId="3275417882" sldId="261"/>
@@ -461,11 +694,27 @@
           </ac:picMkLst>
         </pc:picChg>
         <pc:picChg chg="add mod">
-          <ac:chgData name="Luis Fernando Rodriguez Gutierrez" userId="47d13518-703e-4604-b449-ba54b8feb907" providerId="ADAL" clId="{DD51FDF5-5D26-4F34-9136-EC8102EEAF54}" dt="2024-01-14T17:23:27.161" v="899" actId="1076"/>
+          <ac:chgData name="Luis Fernando Rodriguez Gutierrez" userId="47d13518-703e-4604-b449-ba54b8feb907" providerId="ADAL" clId="{DD51FDF5-5D26-4F34-9136-EC8102EEAF54}" dt="2024-01-15T15:11:08.180" v="1178" actId="14100"/>
+          <ac:picMkLst>
+            <pc:docMk/>
+            <pc:sldMk cId="3275417882" sldId="261"/>
+            <ac:picMk id="7" creationId="{9D0B9E41-6888-D0F3-1CD5-F78E75FBEF6C}"/>
+          </ac:picMkLst>
+        </pc:picChg>
+        <pc:picChg chg="add del mod">
+          <ac:chgData name="Luis Fernando Rodriguez Gutierrez" userId="47d13518-703e-4604-b449-ba54b8feb907" providerId="ADAL" clId="{DD51FDF5-5D26-4F34-9136-EC8102EEAF54}" dt="2024-01-15T15:10:41.981" v="1169" actId="21"/>
           <ac:picMkLst>
             <pc:docMk/>
             <pc:sldMk cId="3275417882" sldId="261"/>
             <ac:picMk id="8" creationId="{21D95ABC-747C-DA07-312D-76255D236E8D}"/>
+          </ac:picMkLst>
+        </pc:picChg>
+        <pc:picChg chg="add mod">
+          <ac:chgData name="Luis Fernando Rodriguez Gutierrez" userId="47d13518-703e-4604-b449-ba54b8feb907" providerId="ADAL" clId="{DD51FDF5-5D26-4F34-9136-EC8102EEAF54}" dt="2024-01-15T15:10:48.311" v="1173"/>
+          <ac:picMkLst>
+            <pc:docMk/>
+            <pc:sldMk cId="3275417882" sldId="261"/>
+            <ac:picMk id="11" creationId="{21D95ABC-747C-DA07-312D-76255D236E8D}"/>
           </ac:picMkLst>
         </pc:picChg>
         <pc:picChg chg="add del mod ord">
@@ -477,11 +726,35 @@
           </ac:picMkLst>
         </pc:picChg>
         <pc:picChg chg="add mod">
-          <ac:chgData name="Luis Fernando Rodriguez Gutierrez" userId="47d13518-703e-4604-b449-ba54b8feb907" providerId="ADAL" clId="{DD51FDF5-5D26-4F34-9136-EC8102EEAF54}" dt="2024-01-14T17:23:16.878" v="896" actId="1076"/>
+          <ac:chgData name="Luis Fernando Rodriguez Gutierrez" userId="47d13518-703e-4604-b449-ba54b8feb907" providerId="ADAL" clId="{DD51FDF5-5D26-4F34-9136-EC8102EEAF54}" dt="2024-01-15T15:10:48.311" v="1173"/>
+          <ac:picMkLst>
+            <pc:docMk/>
+            <pc:sldMk cId="3275417882" sldId="261"/>
+            <ac:picMk id="22" creationId="{1BD58911-655B-E317-136F-F98A6B8BADB5}"/>
+          </ac:picMkLst>
+        </pc:picChg>
+        <pc:picChg chg="add del mod">
+          <ac:chgData name="Luis Fernando Rodriguez Gutierrez" userId="47d13518-703e-4604-b449-ba54b8feb907" providerId="ADAL" clId="{DD51FDF5-5D26-4F34-9136-EC8102EEAF54}" dt="2024-01-15T15:10:26.884" v="1157" actId="478"/>
           <ac:picMkLst>
             <pc:docMk/>
             <pc:sldMk cId="3275417882" sldId="261"/>
             <ac:picMk id="24" creationId="{1170184A-7187-4866-49DA-DF9FCE02C489}"/>
+          </ac:picMkLst>
+        </pc:picChg>
+        <pc:picChg chg="add mod">
+          <ac:chgData name="Luis Fernando Rodriguez Gutierrez" userId="47d13518-703e-4604-b449-ba54b8feb907" providerId="ADAL" clId="{DD51FDF5-5D26-4F34-9136-EC8102EEAF54}" dt="2024-01-15T15:10:51.593" v="1174"/>
+          <ac:picMkLst>
+            <pc:docMk/>
+            <pc:sldMk cId="3275417882" sldId="261"/>
+            <ac:picMk id="41" creationId="{D2D5DFCB-F9E8-3979-7A59-4B3203C18B48}"/>
+          </ac:picMkLst>
+        </pc:picChg>
+        <pc:picChg chg="add mod">
+          <ac:chgData name="Luis Fernando Rodriguez Gutierrez" userId="47d13518-703e-4604-b449-ba54b8feb907" providerId="ADAL" clId="{DD51FDF5-5D26-4F34-9136-EC8102EEAF54}" dt="2024-01-15T15:11:05.460" v="1177" actId="1076"/>
+          <ac:picMkLst>
+            <pc:docMk/>
+            <pc:sldMk cId="3275417882" sldId="261"/>
+            <ac:picMk id="45" creationId="{FDCD2A21-A964-58FE-D38E-18B61DEF06E5}"/>
           </ac:picMkLst>
         </pc:picChg>
         <pc:cxnChg chg="add del mod">
@@ -492,12 +765,28 @@
             <ac:cxnSpMk id="7" creationId="{46DE634B-EE6D-CAD1-3E5C-D8D434256ECA}"/>
           </ac:cxnSpMkLst>
         </pc:cxnChg>
-        <pc:cxnChg chg="add mod">
-          <ac:chgData name="Luis Fernando Rodriguez Gutierrez" userId="47d13518-703e-4604-b449-ba54b8feb907" providerId="ADAL" clId="{DD51FDF5-5D26-4F34-9136-EC8102EEAF54}" dt="2024-01-14T17:26:45.171" v="941" actId="692"/>
+        <pc:cxnChg chg="add del mod">
+          <ac:chgData name="Luis Fernando Rodriguez Gutierrez" userId="47d13518-703e-4604-b449-ba54b8feb907" providerId="ADAL" clId="{DD51FDF5-5D26-4F34-9136-EC8102EEAF54}" dt="2024-01-15T15:10:41.981" v="1169" actId="21"/>
           <ac:cxnSpMkLst>
             <pc:docMk/>
             <pc:sldMk cId="3275417882" sldId="261"/>
             <ac:cxnSpMk id="35" creationId="{AC54A6A2-8D89-B46A-A0EA-2BA5937E15F4}"/>
+          </ac:cxnSpMkLst>
+        </pc:cxnChg>
+        <pc:cxnChg chg="add mod">
+          <ac:chgData name="Luis Fernando Rodriguez Gutierrez" userId="47d13518-703e-4604-b449-ba54b8feb907" providerId="ADAL" clId="{DD51FDF5-5D26-4F34-9136-EC8102EEAF54}" dt="2024-01-15T15:10:48.311" v="1173"/>
+          <ac:cxnSpMkLst>
+            <pc:docMk/>
+            <pc:sldMk cId="3275417882" sldId="261"/>
+            <ac:cxnSpMk id="40" creationId="{AC54A6A2-8D89-B46A-A0EA-2BA5937E15F4}"/>
+          </ac:cxnSpMkLst>
+        </pc:cxnChg>
+        <pc:cxnChg chg="add mod">
+          <ac:chgData name="Luis Fernando Rodriguez Gutierrez" userId="47d13518-703e-4604-b449-ba54b8feb907" providerId="ADAL" clId="{DD51FDF5-5D26-4F34-9136-EC8102EEAF54}" dt="2024-01-15T15:11:12.181" v="1179" actId="1076"/>
+          <ac:cxnSpMkLst>
+            <pc:docMk/>
+            <pc:sldMk cId="3275417882" sldId="261"/>
+            <ac:cxnSpMk id="55" creationId="{BD5330F2-3672-67DC-5299-32944AC77A6F}"/>
           </ac:cxnSpMkLst>
         </pc:cxnChg>
       </pc:sldChg>
@@ -1039,7 +1328,7 @@
         </pc:picChg>
       </pc:sldChg>
       <pc:sldChg chg="addSp delSp modSp add mod setBg delDesignElem">
-        <pc:chgData name="Luis Fernando Rodriguez Gutierrez" userId="47d13518-703e-4604-b449-ba54b8feb907" providerId="ADAL" clId="{DD51FDF5-5D26-4F34-9136-EC8102EEAF54}" dt="2024-01-14T17:27:48.690" v="950"/>
+        <pc:chgData name="Luis Fernando Rodriguez Gutierrez" userId="47d13518-703e-4604-b449-ba54b8feb907" providerId="ADAL" clId="{DD51FDF5-5D26-4F34-9136-EC8102EEAF54}" dt="2024-01-15T15:11:22.224" v="1184" actId="26606"/>
         <pc:sldMkLst>
           <pc:docMk/>
           <pc:sldMk cId="3803339467" sldId="269"/>
@@ -1149,7 +1438,7 @@
           </ac:spMkLst>
         </pc:spChg>
         <pc:spChg chg="add del">
-          <ac:chgData name="Luis Fernando Rodriguez Gutierrez" userId="47d13518-703e-4604-b449-ba54b8feb907" providerId="ADAL" clId="{DD51FDF5-5D26-4F34-9136-EC8102EEAF54}" dt="2024-01-14T17:27:16.526" v="945" actId="26606"/>
+          <ac:chgData name="Luis Fernando Rodriguez Gutierrez" userId="47d13518-703e-4604-b449-ba54b8feb907" providerId="ADAL" clId="{DD51FDF5-5D26-4F34-9136-EC8102EEAF54}" dt="2024-01-15T15:11:22.224" v="1184" actId="26606"/>
           <ac:spMkLst>
             <pc:docMk/>
             <pc:sldMk cId="3803339467" sldId="269"/>
@@ -1157,13 +1446,21 @@
           </ac:spMkLst>
         </pc:spChg>
         <pc:spChg chg="add del">
-          <ac:chgData name="Luis Fernando Rodriguez Gutierrez" userId="47d13518-703e-4604-b449-ba54b8feb907" providerId="ADAL" clId="{DD51FDF5-5D26-4F34-9136-EC8102EEAF54}" dt="2024-01-14T17:27:16.526" v="945" actId="26606"/>
+          <ac:chgData name="Luis Fernando Rodriguez Gutierrez" userId="47d13518-703e-4604-b449-ba54b8feb907" providerId="ADAL" clId="{DD51FDF5-5D26-4F34-9136-EC8102EEAF54}" dt="2024-01-15T15:11:22.224" v="1184" actId="26606"/>
           <ac:spMkLst>
             <pc:docMk/>
             <pc:sldMk cId="3803339467" sldId="269"/>
             <ac:spMk id="21" creationId="{CD8B4F24-440B-49E9-B85D-733523DC064B}"/>
           </ac:spMkLst>
         </pc:spChg>
+        <pc:spChg chg="add">
+          <ac:chgData name="Luis Fernando Rodriguez Gutierrez" userId="47d13518-703e-4604-b449-ba54b8feb907" providerId="ADAL" clId="{DD51FDF5-5D26-4F34-9136-EC8102EEAF54}" dt="2024-01-15T15:11:22.224" v="1184" actId="26606"/>
+          <ac:spMkLst>
+            <pc:docMk/>
+            <pc:sldMk cId="3803339467" sldId="269"/>
+            <ac:spMk id="26" creationId="{2B97F24A-32CE-4C1C-A50D-3016B394DCFB}"/>
+          </ac:spMkLst>
+        </pc:spChg>
         <pc:spChg chg="add del">
           <ac:chgData name="Luis Fernando Rodriguez Gutierrez" userId="47d13518-703e-4604-b449-ba54b8feb907" providerId="ADAL" clId="{DD51FDF5-5D26-4F34-9136-EC8102EEAF54}" dt="2024-01-14T17:27:16.526" v="945" actId="26606"/>
           <ac:spMkLst>
@@ -1172,6 +1469,14 @@
             <ac:spMk id="27" creationId="{F13C74B1-5B17-4795-BED0-7140497B445A}"/>
           </ac:spMkLst>
         </pc:spChg>
+        <pc:spChg chg="add">
+          <ac:chgData name="Luis Fernando Rodriguez Gutierrez" userId="47d13518-703e-4604-b449-ba54b8feb907" providerId="ADAL" clId="{DD51FDF5-5D26-4F34-9136-EC8102EEAF54}" dt="2024-01-15T15:11:22.224" v="1184" actId="26606"/>
+          <ac:spMkLst>
+            <pc:docMk/>
+            <pc:sldMk cId="3803339467" sldId="269"/>
+            <ac:spMk id="28" creationId="{CD8B4F24-440B-49E9-B85D-733523DC064B}"/>
+          </ac:spMkLst>
+        </pc:spChg>
         <pc:spChg chg="add del">
           <ac:chgData name="Luis Fernando Rodriguez Gutierrez" userId="47d13518-703e-4604-b449-ba54b8feb907" providerId="ADAL" clId="{DD51FDF5-5D26-4F34-9136-EC8102EEAF54}" dt="2024-01-14T17:27:16.526" v="945" actId="26606"/>
           <ac:spMkLst>
@@ -1180,6 +1485,14 @@
             <ac:spMk id="29" creationId="{D4974D33-8DC5-464E-8C6D-BE58F0669C17}"/>
           </ac:spMkLst>
         </pc:spChg>
+        <pc:picChg chg="add mod">
+          <ac:chgData name="Luis Fernando Rodriguez Gutierrez" userId="47d13518-703e-4604-b449-ba54b8feb907" providerId="ADAL" clId="{DD51FDF5-5D26-4F34-9136-EC8102EEAF54}" dt="2024-01-15T15:11:22.224" v="1184" actId="26606"/>
+          <ac:picMkLst>
+            <pc:docMk/>
+            <pc:sldMk cId="3803339467" sldId="269"/>
+            <ac:picMk id="3" creationId="{50C91B2F-0723-D5C5-0738-4250283CB87C}"/>
+          </ac:picMkLst>
+        </pc:picChg>
         <pc:picChg chg="add del mod">
           <ac:chgData name="Luis Fernando Rodriguez Gutierrez" userId="47d13518-703e-4604-b449-ba54b8feb907" providerId="ADAL" clId="{DD51FDF5-5D26-4F34-9136-EC8102EEAF54}" dt="2024-01-14T17:27:48.251" v="949" actId="478"/>
           <ac:picMkLst>
@@ -1212,8 +1525,8 @@
             <ac:picMk id="22" creationId="{E66079FA-56D9-06D3-9D43-F5648E47F553}"/>
           </ac:picMkLst>
         </pc:picChg>
-        <pc:picChg chg="add mod">
-          <ac:chgData name="Luis Fernando Rodriguez Gutierrez" userId="47d13518-703e-4604-b449-ba54b8feb907" providerId="ADAL" clId="{DD51FDF5-5D26-4F34-9136-EC8102EEAF54}" dt="2024-01-14T17:27:48.690" v="950"/>
+        <pc:picChg chg="add del mod">
+          <ac:chgData name="Luis Fernando Rodriguez Gutierrez" userId="47d13518-703e-4604-b449-ba54b8feb907" providerId="ADAL" clId="{DD51FDF5-5D26-4F34-9136-EC8102EEAF54}" dt="2024-01-15T15:11:19.913" v="1180" actId="478"/>
           <ac:picMkLst>
             <pc:docMk/>
             <pc:sldMk cId="3803339467" sldId="269"/>
@@ -1348,7 +1661,7 @@
         </pc:picChg>
       </pc:sldChg>
       <pc:sldChg chg="addSp delSp modSp add mod setBg delDesignElem">
-        <pc:chgData name="Luis Fernando Rodriguez Gutierrez" userId="47d13518-703e-4604-b449-ba54b8feb907" providerId="ADAL" clId="{DD51FDF5-5D26-4F34-9136-EC8102EEAF54}" dt="2024-01-14T17:27:40.759" v="948"/>
+        <pc:chgData name="Luis Fernando Rodriguez Gutierrez" userId="47d13518-703e-4604-b449-ba54b8feb907" providerId="ADAL" clId="{DD51FDF5-5D26-4F34-9136-EC8102EEAF54}" dt="2024-01-15T15:11:55.963" v="1207" actId="6549"/>
         <pc:sldMkLst>
           <pc:docMk/>
           <pc:sldMk cId="3556383139" sldId="272"/>
@@ -1362,7 +1675,7 @@
           </ac:spMkLst>
         </pc:spChg>
         <pc:spChg chg="mod">
-          <ac:chgData name="Luis Fernando Rodriguez Gutierrez" userId="47d13518-703e-4604-b449-ba54b8feb907" providerId="ADAL" clId="{DD51FDF5-5D26-4F34-9136-EC8102EEAF54}" dt="2024-01-14T17:18:45.045" v="879" actId="20577"/>
+          <ac:chgData name="Luis Fernando Rodriguez Gutierrez" userId="47d13518-703e-4604-b449-ba54b8feb907" providerId="ADAL" clId="{DD51FDF5-5D26-4F34-9136-EC8102EEAF54}" dt="2024-01-15T15:11:55.963" v="1207" actId="6549"/>
           <ac:spMkLst>
             <pc:docMk/>
             <pc:sldMk cId="3556383139" sldId="272"/>
@@ -1441,8 +1754,8 @@
             <ac:picMk id="6" creationId="{2767E51B-8DD4-D6E5-E14D-A9C2B9AD76A0}"/>
           </ac:picMkLst>
         </pc:picChg>
-        <pc:picChg chg="add mod">
-          <ac:chgData name="Luis Fernando Rodriguez Gutierrez" userId="47d13518-703e-4604-b449-ba54b8feb907" providerId="ADAL" clId="{DD51FDF5-5D26-4F34-9136-EC8102EEAF54}" dt="2024-01-14T17:18:30.506" v="840" actId="1076"/>
+        <pc:picChg chg="add del mod">
+          <ac:chgData name="Luis Fernando Rodriguez Gutierrez" userId="47d13518-703e-4604-b449-ba54b8feb907" providerId="ADAL" clId="{DD51FDF5-5D26-4F34-9136-EC8102EEAF54}" dt="2024-01-15T15:11:37.920" v="1186" actId="478"/>
           <ac:picMkLst>
             <pc:docMk/>
             <pc:sldMk cId="3556383139" sldId="272"/>
@@ -1450,14 +1763,14 @@
           </ac:picMkLst>
         </pc:picChg>
       </pc:sldChg>
-      <pc:sldChg chg="addSp delSp modSp new mod setBg">
-        <pc:chgData name="Luis Fernando Rodriguez Gutierrez" userId="47d13518-703e-4604-b449-ba54b8feb907" providerId="ADAL" clId="{DD51FDF5-5D26-4F34-9136-EC8102EEAF54}" dt="2024-01-14T17:36:46.100" v="965" actId="26606"/>
+      <pc:sldChg chg="addSp delSp modSp new mod ord setBg">
+        <pc:chgData name="Luis Fernando Rodriguez Gutierrez" userId="47d13518-703e-4604-b449-ba54b8feb907" providerId="ADAL" clId="{DD51FDF5-5D26-4F34-9136-EC8102EEAF54}" dt="2024-01-15T15:02:08.845" v="1156" actId="20577"/>
         <pc:sldMkLst>
           <pc:docMk/>
           <pc:sldMk cId="2684201535" sldId="273"/>
         </pc:sldMkLst>
         <pc:spChg chg="mod">
-          <ac:chgData name="Luis Fernando Rodriguez Gutierrez" userId="47d13518-703e-4604-b449-ba54b8feb907" providerId="ADAL" clId="{DD51FDF5-5D26-4F34-9136-EC8102EEAF54}" dt="2024-01-14T17:36:46.100" v="965" actId="26606"/>
+          <ac:chgData name="Luis Fernando Rodriguez Gutierrez" userId="47d13518-703e-4604-b449-ba54b8feb907" providerId="ADAL" clId="{DD51FDF5-5D26-4F34-9136-EC8102EEAF54}" dt="2024-01-15T15:01:15.904" v="981" actId="20577"/>
           <ac:spMkLst>
             <pc:docMk/>
             <pc:sldMk cId="2684201535" sldId="273"/>
@@ -1472,8 +1785,8 @@
             <ac:spMk id="3" creationId="{282DD1DB-34B1-7B13-B256-C19FF0982561}"/>
           </ac:spMkLst>
         </pc:spChg>
-        <pc:spChg chg="add">
-          <ac:chgData name="Luis Fernando Rodriguez Gutierrez" userId="47d13518-703e-4604-b449-ba54b8feb907" providerId="ADAL" clId="{DD51FDF5-5D26-4F34-9136-EC8102EEAF54}" dt="2024-01-14T17:36:46.100" v="965" actId="26606"/>
+        <pc:spChg chg="add mod">
+          <ac:chgData name="Luis Fernando Rodriguez Gutierrez" userId="47d13518-703e-4604-b449-ba54b8feb907" providerId="ADAL" clId="{DD51FDF5-5D26-4F34-9136-EC8102EEAF54}" dt="2024-01-15T15:02:08.845" v="1156" actId="20577"/>
           <ac:spMkLst>
             <pc:docMk/>
             <pc:sldMk cId="2684201535" sldId="273"/>
@@ -1502,6 +1815,156 @@
             <pc:docMk/>
             <pc:sldMk cId="2684201535" sldId="273"/>
             <ac:picMk id="5" creationId="{BEA00B24-3B0F-3E47-ABAB-5694E85DD7AE}"/>
+          </ac:picMkLst>
+        </pc:picChg>
+      </pc:sldChg>
+      <pc:sldChg chg="new del">
+        <pc:chgData name="Luis Fernando Rodriguez Gutierrez" userId="47d13518-703e-4604-b449-ba54b8feb907" providerId="ADAL" clId="{DD51FDF5-5D26-4F34-9136-EC8102EEAF54}" dt="2024-01-15T15:19:47.128" v="1214" actId="47"/>
+        <pc:sldMkLst>
+          <pc:docMk/>
+          <pc:sldMk cId="3207559417" sldId="274"/>
+        </pc:sldMkLst>
+      </pc:sldChg>
+      <pc:sldChg chg="addSp delSp modSp add mod setBg delDesignElem">
+        <pc:chgData name="Luis Fernando Rodriguez Gutierrez" userId="47d13518-703e-4604-b449-ba54b8feb907" providerId="ADAL" clId="{DD51FDF5-5D26-4F34-9136-EC8102EEAF54}" dt="2024-01-15T15:21:35.999" v="1395" actId="1076"/>
+        <pc:sldMkLst>
+          <pc:docMk/>
+          <pc:sldMk cId="417262923" sldId="275"/>
+        </pc:sldMkLst>
+        <pc:spChg chg="mod ord">
+          <ac:chgData name="Luis Fernando Rodriguez Gutierrez" userId="47d13518-703e-4604-b449-ba54b8feb907" providerId="ADAL" clId="{DD51FDF5-5D26-4F34-9136-EC8102EEAF54}" dt="2024-01-15T15:21:12.524" v="1390" actId="26606"/>
+          <ac:spMkLst>
+            <pc:docMk/>
+            <pc:sldMk cId="417262923" sldId="275"/>
+            <ac:spMk id="2" creationId="{2CA1D05F-8071-6289-CF59-FA97AEE49972}"/>
+          </ac:spMkLst>
+        </pc:spChg>
+        <pc:spChg chg="mod ord">
+          <ac:chgData name="Luis Fernando Rodriguez Gutierrez" userId="47d13518-703e-4604-b449-ba54b8feb907" providerId="ADAL" clId="{DD51FDF5-5D26-4F34-9136-EC8102EEAF54}" dt="2024-01-15T15:21:35.999" v="1395" actId="1076"/>
+          <ac:spMkLst>
+            <pc:docMk/>
+            <pc:sldMk cId="417262923" sldId="275"/>
+            <ac:spMk id="9" creationId="{6587E8D0-A7AB-C8BA-C7C7-86FEE2105C0B}"/>
+          </ac:spMkLst>
+        </pc:spChg>
+        <pc:spChg chg="add del">
+          <ac:chgData name="Luis Fernando Rodriguez Gutierrez" userId="47d13518-703e-4604-b449-ba54b8feb907" providerId="ADAL" clId="{DD51FDF5-5D26-4F34-9136-EC8102EEAF54}" dt="2024-01-15T15:21:11.073" v="1387" actId="26606"/>
+          <ac:spMkLst>
+            <pc:docMk/>
+            <pc:sldMk cId="417262923" sldId="275"/>
+            <ac:spMk id="14" creationId="{63F5877B-98C7-49DD-83AB-0F6F57CB6543}"/>
+          </ac:spMkLst>
+        </pc:spChg>
+        <pc:spChg chg="add del">
+          <ac:chgData name="Luis Fernando Rodriguez Gutierrez" userId="47d13518-703e-4604-b449-ba54b8feb907" providerId="ADAL" clId="{DD51FDF5-5D26-4F34-9136-EC8102EEAF54}" dt="2024-01-15T15:21:11.073" v="1387" actId="26606"/>
+          <ac:spMkLst>
+            <pc:docMk/>
+            <pc:sldMk cId="417262923" sldId="275"/>
+            <ac:spMk id="16" creationId="{4EA91930-66BC-4C41-B4F5-C31EB216F64B}"/>
+          </ac:spMkLst>
+        </pc:spChg>
+        <pc:spChg chg="add del">
+          <ac:chgData name="Luis Fernando Rodriguez Gutierrez" userId="47d13518-703e-4604-b449-ba54b8feb907" providerId="ADAL" clId="{DD51FDF5-5D26-4F34-9136-EC8102EEAF54}" dt="2024-01-15T15:21:11.073" v="1387" actId="26606"/>
+          <ac:spMkLst>
+            <pc:docMk/>
+            <pc:sldMk cId="417262923" sldId="275"/>
+            <ac:spMk id="18" creationId="{6313CF8F-B436-401E-9575-DE0F8E8B5B17}"/>
+          </ac:spMkLst>
+        </pc:spChg>
+        <pc:spChg chg="add del">
+          <ac:chgData name="Luis Fernando Rodriguez Gutierrez" userId="47d13518-703e-4604-b449-ba54b8feb907" providerId="ADAL" clId="{DD51FDF5-5D26-4F34-9136-EC8102EEAF54}" dt="2024-01-15T15:21:11.073" v="1387" actId="26606"/>
+          <ac:spMkLst>
+            <pc:docMk/>
+            <pc:sldMk cId="417262923" sldId="275"/>
+            <ac:spMk id="20" creationId="{2A38CFE9-C30A-4551-ACCB-D5808FBC39CD}"/>
+          </ac:spMkLst>
+        </pc:spChg>
+        <pc:spChg chg="add del">
+          <ac:chgData name="Luis Fernando Rodriguez Gutierrez" userId="47d13518-703e-4604-b449-ba54b8feb907" providerId="ADAL" clId="{DD51FDF5-5D26-4F34-9136-EC8102EEAF54}" dt="2024-01-15T15:21:11.073" v="1387" actId="26606"/>
+          <ac:spMkLst>
+            <pc:docMk/>
+            <pc:sldMk cId="417262923" sldId="275"/>
+            <ac:spMk id="22" creationId="{67EF550F-47CE-4FB2-9DAC-12AD835C833D}"/>
+          </ac:spMkLst>
+        </pc:spChg>
+        <pc:spChg chg="add del">
+          <ac:chgData name="Luis Fernando Rodriguez Gutierrez" userId="47d13518-703e-4604-b449-ba54b8feb907" providerId="ADAL" clId="{DD51FDF5-5D26-4F34-9136-EC8102EEAF54}" dt="2024-01-15T15:21:12.514" v="1389" actId="26606"/>
+          <ac:spMkLst>
+            <pc:docMk/>
+            <pc:sldMk cId="417262923" sldId="275"/>
+            <ac:spMk id="24" creationId="{352BEC0E-22F8-46D0-9632-375DB541B06C}"/>
+          </ac:spMkLst>
+        </pc:spChg>
+        <pc:spChg chg="add del">
+          <ac:chgData name="Luis Fernando Rodriguez Gutierrez" userId="47d13518-703e-4604-b449-ba54b8feb907" providerId="ADAL" clId="{DD51FDF5-5D26-4F34-9136-EC8102EEAF54}" dt="2024-01-15T15:21:12.514" v="1389" actId="26606"/>
+          <ac:spMkLst>
+            <pc:docMk/>
+            <pc:sldMk cId="417262923" sldId="275"/>
+            <ac:spMk id="25" creationId="{3FCFB1DE-0B7E-48CC-BA90-B2AB0889F9D6}"/>
+          </ac:spMkLst>
+        </pc:spChg>
+        <pc:spChg chg="add">
+          <ac:chgData name="Luis Fernando Rodriguez Gutierrez" userId="47d13518-703e-4604-b449-ba54b8feb907" providerId="ADAL" clId="{DD51FDF5-5D26-4F34-9136-EC8102EEAF54}" dt="2024-01-15T15:21:12.524" v="1390" actId="26606"/>
+          <ac:spMkLst>
+            <pc:docMk/>
+            <pc:sldMk cId="417262923" sldId="275"/>
+            <ac:spMk id="27" creationId="{21516CB1-E8C8-4751-B6A6-46B2D1E72A61}"/>
+          </ac:spMkLst>
+        </pc:spChg>
+        <pc:spChg chg="del">
+          <ac:chgData name="Luis Fernando Rodriguez Gutierrez" userId="47d13518-703e-4604-b449-ba54b8feb907" providerId="ADAL" clId="{DD51FDF5-5D26-4F34-9136-EC8102EEAF54}" dt="2024-01-15T15:19:45.736" v="1213"/>
+          <ac:spMkLst>
+            <pc:docMk/>
+            <pc:sldMk cId="417262923" sldId="275"/>
+            <ac:spMk id="28" creationId="{2B97F24A-32CE-4C1C-A50D-3016B394DCFB}"/>
+          </ac:spMkLst>
+        </pc:spChg>
+        <pc:spChg chg="add">
+          <ac:chgData name="Luis Fernando Rodriguez Gutierrez" userId="47d13518-703e-4604-b449-ba54b8feb907" providerId="ADAL" clId="{DD51FDF5-5D26-4F34-9136-EC8102EEAF54}" dt="2024-01-15T15:21:12.524" v="1390" actId="26606"/>
+          <ac:spMkLst>
+            <pc:docMk/>
+            <pc:sldMk cId="417262923" sldId="275"/>
+            <ac:spMk id="29" creationId="{90C0C0D1-E79A-41FF-8322-256F6DD1499B}"/>
+          </ac:spMkLst>
+        </pc:spChg>
+        <pc:spChg chg="del">
+          <ac:chgData name="Luis Fernando Rodriguez Gutierrez" userId="47d13518-703e-4604-b449-ba54b8feb907" providerId="ADAL" clId="{DD51FDF5-5D26-4F34-9136-EC8102EEAF54}" dt="2024-01-15T15:19:45.736" v="1213"/>
+          <ac:spMkLst>
+            <pc:docMk/>
+            <pc:sldMk cId="417262923" sldId="275"/>
+            <ac:spMk id="30" creationId="{CD8B4F24-440B-49E9-B85D-733523DC064B}"/>
+          </ac:spMkLst>
+        </pc:spChg>
+        <pc:spChg chg="add">
+          <ac:chgData name="Luis Fernando Rodriguez Gutierrez" userId="47d13518-703e-4604-b449-ba54b8feb907" providerId="ADAL" clId="{DD51FDF5-5D26-4F34-9136-EC8102EEAF54}" dt="2024-01-15T15:21:12.524" v="1390" actId="26606"/>
+          <ac:spMkLst>
+            <pc:docMk/>
+            <pc:sldMk cId="417262923" sldId="275"/>
+            <ac:spMk id="31" creationId="{395FA420-5595-49D1-9D5F-79EC43B55574}"/>
+          </ac:spMkLst>
+        </pc:spChg>
+        <pc:picChg chg="add mod ord">
+          <ac:chgData name="Luis Fernando Rodriguez Gutierrez" userId="47d13518-703e-4604-b449-ba54b8feb907" providerId="ADAL" clId="{DD51FDF5-5D26-4F34-9136-EC8102EEAF54}" dt="2024-01-15T15:21:33.458" v="1394" actId="1076"/>
+          <ac:picMkLst>
+            <pc:docMk/>
+            <pc:sldMk cId="417262923" sldId="275"/>
+            <ac:picMk id="4" creationId="{A9B7E561-A069-7833-6DED-28BEF3E07113}"/>
+          </ac:picMkLst>
+        </pc:picChg>
+        <pc:picChg chg="del">
+          <ac:chgData name="Luis Fernando Rodriguez Gutierrez" userId="47d13518-703e-4604-b449-ba54b8feb907" providerId="ADAL" clId="{DD51FDF5-5D26-4F34-9136-EC8102EEAF54}" dt="2024-01-15T15:20:43.553" v="1381" actId="478"/>
+          <ac:picMkLst>
+            <pc:docMk/>
+            <pc:sldMk cId="417262923" sldId="275"/>
+            <ac:picMk id="5" creationId="{1371372A-7ACD-F9AC-AED0-052716656783}"/>
+          </ac:picMkLst>
+        </pc:picChg>
+        <pc:picChg chg="add mod">
+          <ac:chgData name="Luis Fernando Rodriguez Gutierrez" userId="47d13518-703e-4604-b449-ba54b8feb907" providerId="ADAL" clId="{DD51FDF5-5D26-4F34-9136-EC8102EEAF54}" dt="2024-01-15T15:21:12.524" v="1390" actId="26606"/>
+          <ac:picMkLst>
+            <pc:docMk/>
+            <pc:sldMk cId="417262923" sldId="275"/>
+            <ac:picMk id="7" creationId="{E53DC600-58EE-996E-C649-027E7025AE3D}"/>
           </ac:picMkLst>
         </pc:picChg>
       </pc:sldChg>
@@ -1659,7 +2122,7 @@
           <a:p>
             <a:fld id="{4E047255-789E-4FCE-BC5F-950022540136}" type="datetimeFigureOut">
               <a:rPr lang="en-DE" smtClean="0"/>
-              <a:t>14/01/2024</a:t>
+              <a:t>15/01/2024</a:t>
             </a:fld>
             <a:endParaRPr lang="en-DE"/>
           </a:p>
@@ -1859,7 +2322,7 @@
           <a:p>
             <a:fld id="{4E047255-789E-4FCE-BC5F-950022540136}" type="datetimeFigureOut">
               <a:rPr lang="en-DE" smtClean="0"/>
-              <a:t>14/01/2024</a:t>
+              <a:t>15/01/2024</a:t>
             </a:fld>
             <a:endParaRPr lang="en-DE"/>
           </a:p>
@@ -2069,7 +2532,7 @@
           <a:p>
             <a:fld id="{4E047255-789E-4FCE-BC5F-950022540136}" type="datetimeFigureOut">
               <a:rPr lang="en-DE" smtClean="0"/>
-              <a:t>14/01/2024</a:t>
+              <a:t>15/01/2024</a:t>
             </a:fld>
             <a:endParaRPr lang="en-DE"/>
           </a:p>
@@ -2269,7 +2732,7 @@
           <a:p>
             <a:fld id="{4E047255-789E-4FCE-BC5F-950022540136}" type="datetimeFigureOut">
               <a:rPr lang="en-DE" smtClean="0"/>
-              <a:t>14/01/2024</a:t>
+              <a:t>15/01/2024</a:t>
             </a:fld>
             <a:endParaRPr lang="en-DE"/>
           </a:p>
@@ -2545,7 +3008,7 @@
           <a:p>
             <a:fld id="{4E047255-789E-4FCE-BC5F-950022540136}" type="datetimeFigureOut">
               <a:rPr lang="en-DE" smtClean="0"/>
-              <a:t>14/01/2024</a:t>
+              <a:t>15/01/2024</a:t>
             </a:fld>
             <a:endParaRPr lang="en-DE"/>
           </a:p>
@@ -2813,7 +3276,7 @@
           <a:p>
             <a:fld id="{4E047255-789E-4FCE-BC5F-950022540136}" type="datetimeFigureOut">
               <a:rPr lang="en-DE" smtClean="0"/>
-              <a:t>14/01/2024</a:t>
+              <a:t>15/01/2024</a:t>
             </a:fld>
             <a:endParaRPr lang="en-DE"/>
           </a:p>
@@ -3228,7 +3691,7 @@
           <a:p>
             <a:fld id="{4E047255-789E-4FCE-BC5F-950022540136}" type="datetimeFigureOut">
               <a:rPr lang="en-DE" smtClean="0"/>
-              <a:t>14/01/2024</a:t>
+              <a:t>15/01/2024</a:t>
             </a:fld>
             <a:endParaRPr lang="en-DE"/>
           </a:p>
@@ -3370,7 +3833,7 @@
           <a:p>
             <a:fld id="{4E047255-789E-4FCE-BC5F-950022540136}" type="datetimeFigureOut">
               <a:rPr lang="en-DE" smtClean="0"/>
-              <a:t>14/01/2024</a:t>
+              <a:t>15/01/2024</a:t>
             </a:fld>
             <a:endParaRPr lang="en-DE"/>
           </a:p>
@@ -3483,7 +3946,7 @@
           <a:p>
             <a:fld id="{4E047255-789E-4FCE-BC5F-950022540136}" type="datetimeFigureOut">
               <a:rPr lang="en-DE" smtClean="0"/>
-              <a:t>14/01/2024</a:t>
+              <a:t>15/01/2024</a:t>
             </a:fld>
             <a:endParaRPr lang="en-DE"/>
           </a:p>
@@ -3796,7 +4259,7 @@
           <a:p>
             <a:fld id="{4E047255-789E-4FCE-BC5F-950022540136}" type="datetimeFigureOut">
               <a:rPr lang="en-DE" smtClean="0"/>
-              <a:t>14/01/2024</a:t>
+              <a:t>15/01/2024</a:t>
             </a:fld>
             <a:endParaRPr lang="en-DE"/>
           </a:p>
@@ -4085,7 +4548,7 @@
           <a:p>
             <a:fld id="{4E047255-789E-4FCE-BC5F-950022540136}" type="datetimeFigureOut">
               <a:rPr lang="en-DE" smtClean="0"/>
-              <a:t>14/01/2024</a:t>
+              <a:t>15/01/2024</a:t>
             </a:fld>
             <a:endParaRPr lang="en-DE"/>
           </a:p>
@@ -4328,7 +4791,7 @@
           <a:p>
             <a:fld id="{4E047255-789E-4FCE-BC5F-950022540136}" type="datetimeFigureOut">
               <a:rPr lang="en-DE" smtClean="0"/>
-              <a:t>14/01/2024</a:t>
+              <a:t>15/01/2024</a:t>
             </a:fld>
             <a:endParaRPr lang="en-DE"/>
           </a:p>
@@ -5318,6 +5781,496 @@
       </p:grpSpPr>
       <p:sp useBgFill="1">
         <p:nvSpPr>
+          <p:cNvPr id="12" name="Rectangle 11">
+            <a:extLst>
+              <a:ext uri="{FF2B5EF4-FFF2-40B4-BE49-F238E27FC236}">
+                <a16:creationId xmlns:a16="http://schemas.microsoft.com/office/drawing/2014/main" id="{743AA782-23D1-4521-8CAD-47662984AA08}"/>
+              </a:ext>
+              <a:ext uri="{C183D7F6-B498-43B3-948B-1728B52AA6E4}">
+                <adec:decorative xmlns:adec="http://schemas.microsoft.com/office/drawing/2017/decorative" val="1"/>
+              </a:ext>
+            </a:extLst>
+          </p:cNvPr>
+          <p:cNvSpPr>
+            <a:spLocks noGrp="1" noRot="1" noChangeAspect="1" noMove="1" noResize="1" noEditPoints="1" noAdjustHandles="1" noChangeArrowheads="1" noChangeShapeType="1" noTextEdit="1"/>
+          </p:cNvSpPr>
+          <p:nvPr>
+            <p:extLst>
+              <p:ext uri="{386F3935-93C4-4BCD-93E2-E3B085C9AB24}">
+                <p16:designElem xmlns:p16="http://schemas.microsoft.com/office/powerpoint/2015/main" val="1"/>
+              </p:ext>
+            </p:extLst>
+          </p:nvPr>
+        </p:nvSpPr>
+        <p:spPr>
+          <a:xfrm>
+            <a:off x="0" y="0"/>
+            <a:ext cx="12192000" cy="6858000"/>
+          </a:xfrm>
+          <a:prstGeom prst="rect">
+            <a:avLst/>
+          </a:prstGeom>
+          <a:ln>
+            <a:noFill/>
+          </a:ln>
+        </p:spPr>
+        <p:style>
+          <a:lnRef idx="2">
+            <a:schemeClr val="accent1">
+              <a:shade val="50000"/>
+            </a:schemeClr>
+          </a:lnRef>
+          <a:fillRef idx="1">
+            <a:schemeClr val="accent1"/>
+          </a:fillRef>
+          <a:effectRef idx="0">
+            <a:schemeClr val="accent1"/>
+          </a:effectRef>
+          <a:fontRef idx="minor">
+            <a:schemeClr val="lt1"/>
+          </a:fontRef>
+        </p:style>
+        <p:txBody>
+          <a:bodyPr rtlCol="0" anchor="ctr"/>
+          <a:lstStyle/>
+          <a:p>
+            <a:pPr algn="ctr"/>
+            <a:endParaRPr lang="en-US"/>
+          </a:p>
+        </p:txBody>
+      </p:sp>
+      <p:sp>
+        <p:nvSpPr>
+          <p:cNvPr id="2" name="Title 1">
+            <a:extLst>
+              <a:ext uri="{FF2B5EF4-FFF2-40B4-BE49-F238E27FC236}">
+                <a16:creationId xmlns:a16="http://schemas.microsoft.com/office/drawing/2014/main" id="{DD687FA7-D417-7872-9C05-38F042AEC890}"/>
+              </a:ext>
+            </a:extLst>
+          </p:cNvPr>
+          <p:cNvSpPr>
+            <a:spLocks noGrp="1"/>
+          </p:cNvSpPr>
+          <p:nvPr>
+            <p:ph type="title"/>
+          </p:nvPr>
+        </p:nvSpPr>
+        <p:spPr>
+          <a:xfrm>
+            <a:off x="630936" y="640080"/>
+            <a:ext cx="4818888" cy="1481328"/>
+          </a:xfrm>
+        </p:spPr>
+        <p:txBody>
+          <a:bodyPr anchor="b">
+            <a:normAutofit/>
+          </a:bodyPr>
+          <a:lstStyle/>
+          <a:p>
+            <a:r>
+              <a:rPr lang="en-US" sz="5400" dirty="0"/>
+              <a:t>Requirements</a:t>
+            </a:r>
+            <a:endParaRPr lang="en-DE" sz="5400" dirty="0"/>
+          </a:p>
+        </p:txBody>
+      </p:sp>
+      <p:sp>
+        <p:nvSpPr>
+          <p:cNvPr id="14" name="sketch line">
+            <a:extLst>
+              <a:ext uri="{FF2B5EF4-FFF2-40B4-BE49-F238E27FC236}">
+                <a16:creationId xmlns:a16="http://schemas.microsoft.com/office/drawing/2014/main" id="{650D18FE-0824-4A46-B22C-A86B52E5780A}"/>
+              </a:ext>
+              <a:ext uri="{C183D7F6-B498-43B3-948B-1728B52AA6E4}">
+                <adec:decorative xmlns:adec="http://schemas.microsoft.com/office/drawing/2017/decorative" val="1"/>
+              </a:ext>
+            </a:extLst>
+          </p:cNvPr>
+          <p:cNvSpPr>
+            <a:spLocks noGrp="1" noRot="1" noChangeAspect="1" noMove="1" noResize="1" noEditPoints="1" noAdjustHandles="1" noChangeArrowheads="1" noChangeShapeType="1" noTextEdit="1"/>
+          </p:cNvSpPr>
+          <p:nvPr>
+            <p:extLst>
+              <p:ext uri="{386F3935-93C4-4BCD-93E2-E3B085C9AB24}">
+                <p16:designElem xmlns:p16="http://schemas.microsoft.com/office/powerpoint/2015/main" val="1"/>
+              </p:ext>
+            </p:extLst>
+          </p:nvPr>
+        </p:nvSpPr>
+        <p:spPr>
+          <a:xfrm>
+            <a:off x="643278" y="2372868"/>
+            <a:ext cx="3255095" cy="18288"/>
+          </a:xfrm>
+          <a:custGeom>
+            <a:avLst/>
+            <a:gdLst>
+              <a:gd name="connsiteX0" fmla="*/ 0 w 3255095"/>
+              <a:gd name="connsiteY0" fmla="*/ 0 h 18288"/>
+              <a:gd name="connsiteX1" fmla="*/ 618468 w 3255095"/>
+              <a:gd name="connsiteY1" fmla="*/ 0 h 18288"/>
+              <a:gd name="connsiteX2" fmla="*/ 1269487 w 3255095"/>
+              <a:gd name="connsiteY2" fmla="*/ 0 h 18288"/>
+              <a:gd name="connsiteX3" fmla="*/ 1953057 w 3255095"/>
+              <a:gd name="connsiteY3" fmla="*/ 0 h 18288"/>
+              <a:gd name="connsiteX4" fmla="*/ 2636627 w 3255095"/>
+              <a:gd name="connsiteY4" fmla="*/ 0 h 18288"/>
+              <a:gd name="connsiteX5" fmla="*/ 3255095 w 3255095"/>
+              <a:gd name="connsiteY5" fmla="*/ 0 h 18288"/>
+              <a:gd name="connsiteX6" fmla="*/ 3255095 w 3255095"/>
+              <a:gd name="connsiteY6" fmla="*/ 18288 h 18288"/>
+              <a:gd name="connsiteX7" fmla="*/ 2538974 w 3255095"/>
+              <a:gd name="connsiteY7" fmla="*/ 18288 h 18288"/>
+              <a:gd name="connsiteX8" fmla="*/ 1822853 w 3255095"/>
+              <a:gd name="connsiteY8" fmla="*/ 18288 h 18288"/>
+              <a:gd name="connsiteX9" fmla="*/ 1171834 w 3255095"/>
+              <a:gd name="connsiteY9" fmla="*/ 18288 h 18288"/>
+              <a:gd name="connsiteX10" fmla="*/ 0 w 3255095"/>
+              <a:gd name="connsiteY10" fmla="*/ 18288 h 18288"/>
+              <a:gd name="connsiteX11" fmla="*/ 0 w 3255095"/>
+              <a:gd name="connsiteY11" fmla="*/ 0 h 18288"/>
+            </a:gdLst>
+            <a:ahLst/>
+            <a:cxnLst>
+              <a:cxn ang="0">
+                <a:pos x="connsiteX0" y="connsiteY0"/>
+              </a:cxn>
+              <a:cxn ang="0">
+                <a:pos x="connsiteX1" y="connsiteY1"/>
+              </a:cxn>
+              <a:cxn ang="0">
+                <a:pos x="connsiteX2" y="connsiteY2"/>
+              </a:cxn>
+              <a:cxn ang="0">
+                <a:pos x="connsiteX3" y="connsiteY3"/>
+              </a:cxn>
+              <a:cxn ang="0">
+                <a:pos x="connsiteX4" y="connsiteY4"/>
+              </a:cxn>
+              <a:cxn ang="0">
+                <a:pos x="connsiteX5" y="connsiteY5"/>
+              </a:cxn>
+              <a:cxn ang="0">
+                <a:pos x="connsiteX6" y="connsiteY6"/>
+              </a:cxn>
+              <a:cxn ang="0">
+                <a:pos x="connsiteX7" y="connsiteY7"/>
+              </a:cxn>
+              <a:cxn ang="0">
+                <a:pos x="connsiteX8" y="connsiteY8"/>
+              </a:cxn>
+              <a:cxn ang="0">
+                <a:pos x="connsiteX9" y="connsiteY9"/>
+              </a:cxn>
+              <a:cxn ang="0">
+                <a:pos x="connsiteX10" y="connsiteY10"/>
+              </a:cxn>
+              <a:cxn ang="0">
+                <a:pos x="connsiteX11" y="connsiteY11"/>
+              </a:cxn>
+            </a:cxnLst>
+            <a:rect l="l" t="t" r="r" b="b"/>
+            <a:pathLst>
+              <a:path w="3255095" h="18288" fill="none" extrusionOk="0">
+                <a:moveTo>
+                  <a:pt x="0" y="0"/>
+                </a:moveTo>
+                <a:cubicBezTo>
+                  <a:pt x="240201" y="-22123"/>
+                  <a:pt x="462021" y="-19623"/>
+                  <a:pt x="618468" y="0"/>
+                </a:cubicBezTo>
+                <a:cubicBezTo>
+                  <a:pt x="774915" y="19623"/>
+                  <a:pt x="974734" y="2035"/>
+                  <a:pt x="1269487" y="0"/>
+                </a:cubicBezTo>
+                <a:cubicBezTo>
+                  <a:pt x="1564240" y="-2035"/>
+                  <a:pt x="1733579" y="10639"/>
+                  <a:pt x="1953057" y="0"/>
+                </a:cubicBezTo>
+                <a:cubicBezTo>
+                  <a:pt x="2172535" y="-10639"/>
+                  <a:pt x="2453962" y="14018"/>
+                  <a:pt x="2636627" y="0"/>
+                </a:cubicBezTo>
+                <a:cubicBezTo>
+                  <a:pt x="2819292" y="-14018"/>
+                  <a:pt x="3121375" y="5399"/>
+                  <a:pt x="3255095" y="0"/>
+                </a:cubicBezTo>
+                <a:cubicBezTo>
+                  <a:pt x="3254386" y="8157"/>
+                  <a:pt x="3254682" y="12125"/>
+                  <a:pt x="3255095" y="18288"/>
+                </a:cubicBezTo>
+                <a:cubicBezTo>
+                  <a:pt x="3088545" y="23203"/>
+                  <a:pt x="2687475" y="7419"/>
+                  <a:pt x="2538974" y="18288"/>
+                </a:cubicBezTo>
+                <a:cubicBezTo>
+                  <a:pt x="2390473" y="29157"/>
+                  <a:pt x="2137381" y="-8959"/>
+                  <a:pt x="1822853" y="18288"/>
+                </a:cubicBezTo>
+                <a:cubicBezTo>
+                  <a:pt x="1508325" y="45535"/>
+                  <a:pt x="1466437" y="20385"/>
+                  <a:pt x="1171834" y="18288"/>
+                </a:cubicBezTo>
+                <a:cubicBezTo>
+                  <a:pt x="877231" y="16191"/>
+                  <a:pt x="561097" y="37643"/>
+                  <a:pt x="0" y="18288"/>
+                </a:cubicBezTo>
+                <a:cubicBezTo>
+                  <a:pt x="-46" y="12483"/>
+                  <a:pt x="-203" y="6491"/>
+                  <a:pt x="0" y="0"/>
+                </a:cubicBezTo>
+                <a:close/>
+              </a:path>
+              <a:path w="3255095" h="18288" stroke="0" extrusionOk="0">
+                <a:moveTo>
+                  <a:pt x="0" y="0"/>
+                </a:moveTo>
+                <a:cubicBezTo>
+                  <a:pt x="291965" y="19429"/>
+                  <a:pt x="363155" y="8568"/>
+                  <a:pt x="618468" y="0"/>
+                </a:cubicBezTo>
+                <a:cubicBezTo>
+                  <a:pt x="873781" y="-8568"/>
+                  <a:pt x="904459" y="-19505"/>
+                  <a:pt x="1171834" y="0"/>
+                </a:cubicBezTo>
+                <a:cubicBezTo>
+                  <a:pt x="1439209" y="19505"/>
+                  <a:pt x="1744369" y="9790"/>
+                  <a:pt x="1887955" y="0"/>
+                </a:cubicBezTo>
+                <a:cubicBezTo>
+                  <a:pt x="2031541" y="-9790"/>
+                  <a:pt x="2346378" y="21240"/>
+                  <a:pt x="2506423" y="0"/>
+                </a:cubicBezTo>
+                <a:cubicBezTo>
+                  <a:pt x="2666468" y="-21240"/>
+                  <a:pt x="2990257" y="30414"/>
+                  <a:pt x="3255095" y="0"/>
+                </a:cubicBezTo>
+                <a:cubicBezTo>
+                  <a:pt x="3254831" y="4493"/>
+                  <a:pt x="3255479" y="9472"/>
+                  <a:pt x="3255095" y="18288"/>
+                </a:cubicBezTo>
+                <a:cubicBezTo>
+                  <a:pt x="3120743" y="16690"/>
+                  <a:pt x="2759628" y="42462"/>
+                  <a:pt x="2604076" y="18288"/>
+                </a:cubicBezTo>
+                <a:cubicBezTo>
+                  <a:pt x="2448524" y="-5886"/>
+                  <a:pt x="2184336" y="19599"/>
+                  <a:pt x="1887955" y="18288"/>
+                </a:cubicBezTo>
+                <a:cubicBezTo>
+                  <a:pt x="1591574" y="16977"/>
+                  <a:pt x="1548845" y="6870"/>
+                  <a:pt x="1334589" y="18288"/>
+                </a:cubicBezTo>
+                <a:cubicBezTo>
+                  <a:pt x="1120333" y="29706"/>
+                  <a:pt x="996014" y="9662"/>
+                  <a:pt x="683570" y="18288"/>
+                </a:cubicBezTo>
+                <a:cubicBezTo>
+                  <a:pt x="371126" y="26914"/>
+                  <a:pt x="198687" y="16167"/>
+                  <a:pt x="0" y="18288"/>
+                </a:cubicBezTo>
+                <a:cubicBezTo>
+                  <a:pt x="843" y="9577"/>
+                  <a:pt x="371" y="6900"/>
+                  <a:pt x="0" y="0"/>
+                </a:cubicBezTo>
+                <a:close/>
+              </a:path>
+            </a:pathLst>
+          </a:custGeom>
+          <a:solidFill>
+            <a:schemeClr val="accent2"/>
+          </a:solidFill>
+          <a:ln w="38100" cap="rnd">
+            <a:solidFill>
+              <a:schemeClr val="accent2"/>
+            </a:solidFill>
+            <a:round/>
+            <a:extLst>
+              <a:ext uri="{C807C97D-BFC1-408E-A445-0C87EB9F89A2}">
+                <ask:lineSketchStyleProps xmlns:ask="http://schemas.microsoft.com/office/drawing/2018/sketchyshapes" sd="1219033472">
+                  <a:prstGeom prst="rect">
+                    <a:avLst/>
+                  </a:prstGeom>
+                  <ask:type>
+                    <ask:lineSketchFreehand/>
+                  </ask:type>
+                </ask:lineSketchStyleProps>
+              </a:ext>
+            </a:extLst>
+          </a:ln>
+        </p:spPr>
+        <p:style>
+          <a:lnRef idx="2">
+            <a:schemeClr val="accent1">
+              <a:shade val="50000"/>
+            </a:schemeClr>
+          </a:lnRef>
+          <a:fillRef idx="1">
+            <a:schemeClr val="accent1"/>
+          </a:fillRef>
+          <a:effectRef idx="0">
+            <a:schemeClr val="accent1"/>
+          </a:effectRef>
+          <a:fontRef idx="minor">
+            <a:schemeClr val="lt1"/>
+          </a:fontRef>
+        </p:style>
+        <p:txBody>
+          <a:bodyPr rtlCol="0" anchor="ctr"/>
+          <a:lstStyle/>
+          <a:p>
+            <a:pPr algn="ctr"/>
+            <a:endParaRPr lang="en-US"/>
+          </a:p>
+        </p:txBody>
+      </p:sp>
+      <p:sp>
+        <p:nvSpPr>
+          <p:cNvPr id="9" name="Content Placeholder 8">
+            <a:extLst>
+              <a:ext uri="{FF2B5EF4-FFF2-40B4-BE49-F238E27FC236}">
+                <a16:creationId xmlns:a16="http://schemas.microsoft.com/office/drawing/2014/main" id="{94DDA1E1-7239-360E-274B-59BECE3CE42C}"/>
+              </a:ext>
+            </a:extLst>
+          </p:cNvPr>
+          <p:cNvSpPr>
+            <a:spLocks noGrp="1"/>
+          </p:cNvSpPr>
+          <p:nvPr>
+            <p:ph idx="1"/>
+          </p:nvPr>
+        </p:nvSpPr>
+        <p:spPr>
+          <a:xfrm>
+            <a:off x="630936" y="2660904"/>
+            <a:ext cx="4818888" cy="3547872"/>
+          </a:xfrm>
+        </p:spPr>
+        <p:txBody>
+          <a:bodyPr anchor="t">
+            <a:normAutofit/>
+          </a:bodyPr>
+          <a:lstStyle/>
+          <a:p>
+            <a:r>
+              <a:rPr lang="en-US" sz="2200" dirty="0"/>
+              <a:t>Specification of every case scenario for the smart city.</a:t>
+            </a:r>
+          </a:p>
+          <a:p>
+            <a:r>
+              <a:rPr lang="en-US" sz="2200" dirty="0"/>
+              <a:t>Each case scenario needed it requirements.</a:t>
+            </a:r>
+          </a:p>
+          <a:p>
+            <a:r>
+              <a:rPr lang="en-US" sz="2200" dirty="0"/>
+              <a:t>More attention was given to the case scenario to implement.</a:t>
+            </a:r>
+          </a:p>
+        </p:txBody>
+      </p:sp>
+      <p:pic>
+        <p:nvPicPr>
+          <p:cNvPr id="5" name="Content Placeholder 4" descr="A screenshot of a computer&#10;&#10;Description automatically generated">
+            <a:extLst>
+              <a:ext uri="{FF2B5EF4-FFF2-40B4-BE49-F238E27FC236}">
+                <a16:creationId xmlns:a16="http://schemas.microsoft.com/office/drawing/2014/main" id="{BEA00B24-3B0F-3E47-ABAB-5694E85DD7AE}"/>
+              </a:ext>
+            </a:extLst>
+          </p:cNvPr>
+          <p:cNvPicPr>
+            <a:picLocks noChangeAspect="1"/>
+          </p:cNvPicPr>
+          <p:nvPr/>
+        </p:nvPicPr>
+        <p:blipFill>
+          <a:blip r:embed="rId2">
+            <a:extLst>
+              <a:ext uri="{28A0092B-C50C-407E-A947-70E740481C1C}">
+                <a14:useLocalDpi xmlns:a14="http://schemas.microsoft.com/office/drawing/2010/main" val="0"/>
+              </a:ext>
+            </a:extLst>
+          </a:blip>
+          <a:stretch>
+            <a:fillRect/>
+          </a:stretch>
+        </p:blipFill>
+        <p:spPr>
+          <a:xfrm>
+            <a:off x="6569507" y="640080"/>
+            <a:ext cx="4518050" cy="5577840"/>
+          </a:xfrm>
+          <a:prstGeom prst="rect">
+            <a:avLst/>
+          </a:prstGeom>
+        </p:spPr>
+      </p:pic>
+    </p:spTree>
+    <p:extLst>
+      <p:ext uri="{BB962C8B-B14F-4D97-AF65-F5344CB8AC3E}">
+        <p14:creationId xmlns:p14="http://schemas.microsoft.com/office/powerpoint/2010/main" val="2684201535"/>
+      </p:ext>
+    </p:extLst>
+  </p:cSld>
+  <p:clrMapOvr>
+    <a:masterClrMapping/>
+  </p:clrMapOvr>
+</p:sld>
+</file>
+
+<file path=ppt/slides/slide3.xml><?xml version="1.0" encoding="utf-8"?>
+<p:sld xmlns:a="http://schemas.openxmlformats.org/drawingml/2006/main" xmlns:r="http://schemas.openxmlformats.org/officeDocument/2006/relationships" xmlns:p="http://schemas.openxmlformats.org/presentationml/2006/main">
+  <p:cSld>
+    <p:bg>
+      <p:bgPr>
+        <a:solidFill>
+          <a:schemeClr val="bg1"/>
+        </a:solidFill>
+        <a:effectLst/>
+      </p:bgPr>
+    </p:bg>
+    <p:spTree>
+      <p:nvGrpSpPr>
+        <p:cNvPr id="1" name=""/>
+        <p:cNvGrpSpPr/>
+        <p:nvPr/>
+      </p:nvGrpSpPr>
+      <p:grpSpPr>
+        <a:xfrm>
+          <a:off x="0" y="0"/>
+          <a:ext cx="0" cy="0"/>
+          <a:chOff x="0" y="0"/>
+          <a:chExt cx="0" cy="0"/>
+        </a:xfrm>
+      </p:grpSpPr>
+      <p:sp useBgFill="1">
+        <p:nvSpPr>
           <p:cNvPr id="14" name="Rectangle 13">
             <a:extLst>
               <a:ext uri="{FF2B5EF4-FFF2-40B4-BE49-F238E27FC236}">
@@ -5743,10 +6696,10 @@
       </p:sp>
       <p:pic>
         <p:nvPicPr>
-          <p:cNvPr id="8" name="Graphic 7" descr="Ambulance with solid fill">
-            <a:extLst>
-              <a:ext uri="{FF2B5EF4-FFF2-40B4-BE49-F238E27FC236}">
-                <a16:creationId xmlns:a16="http://schemas.microsoft.com/office/drawing/2014/main" id="{21D95ABC-747C-DA07-312D-76255D236E8D}"/>
+          <p:cNvPr id="7" name="Picture 6" descr="A screenshot of a computer&#10;&#10;Description automatically generated">
+            <a:extLst>
+              <a:ext uri="{FF2B5EF4-FFF2-40B4-BE49-F238E27FC236}">
+                <a16:creationId xmlns:a16="http://schemas.microsoft.com/office/drawing/2014/main" id="{9D0B9E41-6888-D0F3-1CD5-F78E75FBEF6C}"/>
               </a:ext>
             </a:extLst>
           </p:cNvPr>
@@ -5761,8 +6714,44 @@
               <a:ext uri="{28A0092B-C50C-407E-A947-70E740481C1C}">
                 <a14:useLocalDpi xmlns:a14="http://schemas.microsoft.com/office/drawing/2010/main" val="0"/>
               </a:ext>
+            </a:extLst>
+          </a:blip>
+          <a:stretch>
+            <a:fillRect/>
+          </a:stretch>
+        </p:blipFill>
+        <p:spPr>
+          <a:xfrm>
+            <a:off x="4279772" y="741811"/>
+            <a:ext cx="7494993" cy="5174170"/>
+          </a:xfrm>
+          <a:prstGeom prst="rect">
+            <a:avLst/>
+          </a:prstGeom>
+        </p:spPr>
+      </p:pic>
+      <p:pic>
+        <p:nvPicPr>
+          <p:cNvPr id="41" name="Graphic 40" descr="Ambulance with solid fill">
+            <a:extLst>
+              <a:ext uri="{FF2B5EF4-FFF2-40B4-BE49-F238E27FC236}">
+                <a16:creationId xmlns:a16="http://schemas.microsoft.com/office/drawing/2014/main" id="{D2D5DFCB-F9E8-3979-7A59-4B3203C18B48}"/>
+              </a:ext>
+            </a:extLst>
+          </p:cNvPr>
+          <p:cNvPicPr>
+            <a:picLocks noChangeAspect="1"/>
+          </p:cNvPicPr>
+          <p:nvPr/>
+        </p:nvPicPr>
+        <p:blipFill>
+          <a:blip r:embed="rId3">
+            <a:extLst>
+              <a:ext uri="{28A0092B-C50C-407E-A947-70E740481C1C}">
+                <a14:useLocalDpi xmlns:a14="http://schemas.microsoft.com/office/drawing/2010/main" val="0"/>
+              </a:ext>
               <a:ext uri="{96DAC541-7B7A-43D3-8B79-37D633B846F1}">
-                <asvg:svgBlip xmlns:asvg="http://schemas.microsoft.com/office/drawing/2016/SVG/main" r:embed="rId3"/>
+                <asvg:svgBlip xmlns:asvg="http://schemas.microsoft.com/office/drawing/2016/SVG/main" r:embed="rId4"/>
               </a:ext>
             </a:extLst>
           </a:blip>
@@ -5780,48 +6769,12 @@
           </a:prstGeom>
         </p:spPr>
       </p:pic>
-      <p:pic>
-        <p:nvPicPr>
-          <p:cNvPr id="24" name="Picture 23" descr="A screenshot of a computer&#10;&#10;Description automatically generated">
-            <a:extLst>
-              <a:ext uri="{FF2B5EF4-FFF2-40B4-BE49-F238E27FC236}">
-                <a16:creationId xmlns:a16="http://schemas.microsoft.com/office/drawing/2014/main" id="{1170184A-7187-4866-49DA-DF9FCE02C489}"/>
-              </a:ext>
-            </a:extLst>
-          </p:cNvPr>
-          <p:cNvPicPr>
-            <a:picLocks noChangeAspect="1"/>
-          </p:cNvPicPr>
-          <p:nvPr/>
-        </p:nvPicPr>
-        <p:blipFill>
-          <a:blip r:embed="rId4">
-            <a:extLst>
-              <a:ext uri="{28A0092B-C50C-407E-A947-70E740481C1C}">
-                <a14:useLocalDpi xmlns:a14="http://schemas.microsoft.com/office/drawing/2010/main" val="0"/>
-              </a:ext>
-            </a:extLst>
-          </a:blip>
-          <a:stretch>
-            <a:fillRect/>
-          </a:stretch>
-        </p:blipFill>
-        <p:spPr>
-          <a:xfrm>
-            <a:off x="4608191" y="1025111"/>
-            <a:ext cx="6485167" cy="4477035"/>
-          </a:xfrm>
-          <a:prstGeom prst="rect">
-            <a:avLst/>
-          </a:prstGeom>
-        </p:spPr>
-      </p:pic>
       <p:sp>
         <p:nvSpPr>
-          <p:cNvPr id="10" name="Oval 9">
-            <a:extLst>
-              <a:ext uri="{FF2B5EF4-FFF2-40B4-BE49-F238E27FC236}">
-                <a16:creationId xmlns:a16="http://schemas.microsoft.com/office/drawing/2014/main" id="{7019285E-40D6-7517-0D2D-F51C317CE0A0}"/>
+          <p:cNvPr id="42" name="Oval 41">
+            <a:extLst>
+              <a:ext uri="{FF2B5EF4-FFF2-40B4-BE49-F238E27FC236}">
+                <a16:creationId xmlns:a16="http://schemas.microsoft.com/office/drawing/2014/main" id="{1357319E-049B-0F1C-722A-0EC8E76A0785}"/>
               </a:ext>
             </a:extLst>
           </p:cNvPr>
@@ -5867,10 +6820,10 @@
       </p:sp>
       <p:sp>
         <p:nvSpPr>
-          <p:cNvPr id="12" name="Oval 11">
-            <a:extLst>
-              <a:ext uri="{FF2B5EF4-FFF2-40B4-BE49-F238E27FC236}">
-                <a16:creationId xmlns:a16="http://schemas.microsoft.com/office/drawing/2014/main" id="{569928B0-9253-FA55-0C11-B1860ECAE94A}"/>
+          <p:cNvPr id="43" name="Oval 42">
+            <a:extLst>
+              <a:ext uri="{FF2B5EF4-FFF2-40B4-BE49-F238E27FC236}">
+                <a16:creationId xmlns:a16="http://schemas.microsoft.com/office/drawing/2014/main" id="{61B43DEF-FCED-86C9-9CA6-CF68BD44706C}"/>
               </a:ext>
             </a:extLst>
           </p:cNvPr>
@@ -5919,10 +6872,10 @@
       </p:sp>
       <p:sp>
         <p:nvSpPr>
-          <p:cNvPr id="13" name="Oval 12">
-            <a:extLst>
-              <a:ext uri="{FF2B5EF4-FFF2-40B4-BE49-F238E27FC236}">
-                <a16:creationId xmlns:a16="http://schemas.microsoft.com/office/drawing/2014/main" id="{58B18A23-E1F5-D2F0-1742-5B4134C036DD}"/>
+          <p:cNvPr id="44" name="Oval 43">
+            <a:extLst>
+              <a:ext uri="{FF2B5EF4-FFF2-40B4-BE49-F238E27FC236}">
+                <a16:creationId xmlns:a16="http://schemas.microsoft.com/office/drawing/2014/main" id="{18EC5516-98EB-5C0E-0B9E-EAD6F8572533}"/>
               </a:ext>
             </a:extLst>
           </p:cNvPr>
@@ -5971,10 +6924,10 @@
       </p:sp>
       <p:pic>
         <p:nvPicPr>
-          <p:cNvPr id="5" name="Graphic 4" descr="Ambulance with solid fill">
-            <a:extLst>
-              <a:ext uri="{FF2B5EF4-FFF2-40B4-BE49-F238E27FC236}">
-                <a16:creationId xmlns:a16="http://schemas.microsoft.com/office/drawing/2014/main" id="{1BD58911-655B-E317-136F-F98A6B8BADB5}"/>
+          <p:cNvPr id="45" name="Graphic 44" descr="Ambulance with solid fill">
+            <a:extLst>
+              <a:ext uri="{FF2B5EF4-FFF2-40B4-BE49-F238E27FC236}">
+                <a16:creationId xmlns:a16="http://schemas.microsoft.com/office/drawing/2014/main" id="{FDCD2A21-A964-58FE-D38E-18B61DEF06E5}"/>
               </a:ext>
             </a:extLst>
           </p:cNvPr>
@@ -5984,13 +6937,13 @@
           <p:nvPr/>
         </p:nvPicPr>
         <p:blipFill>
-          <a:blip r:embed="rId2">
+          <a:blip r:embed="rId3">
             <a:extLst>
               <a:ext uri="{28A0092B-C50C-407E-A947-70E740481C1C}">
                 <a14:useLocalDpi xmlns:a14="http://schemas.microsoft.com/office/drawing/2010/main" val="0"/>
               </a:ext>
               <a:ext uri="{96DAC541-7B7A-43D3-8B79-37D633B846F1}">
-                <asvg:svgBlip xmlns:asvg="http://schemas.microsoft.com/office/drawing/2016/SVG/main" r:embed="rId3"/>
+                <asvg:svgBlip xmlns:asvg="http://schemas.microsoft.com/office/drawing/2016/SVG/main" r:embed="rId4"/>
               </a:ext>
             </a:extLst>
           </a:blip>
@@ -6000,7 +6953,7 @@
         </p:blipFill>
         <p:spPr>
           <a:xfrm>
-            <a:off x="4381112" y="3130963"/>
+            <a:off x="4231496" y="3205252"/>
             <a:ext cx="914400" cy="914400"/>
           </a:xfrm>
           <a:prstGeom prst="rect">
@@ -6010,10 +6963,10 @@
       </p:pic>
       <p:sp>
         <p:nvSpPr>
-          <p:cNvPr id="15" name="Oval 14">
-            <a:extLst>
-              <a:ext uri="{FF2B5EF4-FFF2-40B4-BE49-F238E27FC236}">
-                <a16:creationId xmlns:a16="http://schemas.microsoft.com/office/drawing/2014/main" id="{C23A6BEA-4FEA-226E-A272-269E6B3881F7}"/>
+          <p:cNvPr id="46" name="Oval 45">
+            <a:extLst>
+              <a:ext uri="{FF2B5EF4-FFF2-40B4-BE49-F238E27FC236}">
+                <a16:creationId xmlns:a16="http://schemas.microsoft.com/office/drawing/2014/main" id="{55767D49-1EF5-B7AE-77F2-42CA2795BF12}"/>
               </a:ext>
             </a:extLst>
           </p:cNvPr>
@@ -6022,7 +6975,7 @@
         </p:nvSpPr>
         <p:spPr>
           <a:xfrm>
-            <a:off x="5454589" y="3037696"/>
+            <a:off x="5304973" y="3111985"/>
             <a:ext cx="232721" cy="233452"/>
           </a:xfrm>
           <a:prstGeom prst="ellipse">
@@ -6059,10 +7012,10 @@
       </p:sp>
       <p:sp>
         <p:nvSpPr>
-          <p:cNvPr id="17" name="Oval 16">
-            <a:extLst>
-              <a:ext uri="{FF2B5EF4-FFF2-40B4-BE49-F238E27FC236}">
-                <a16:creationId xmlns:a16="http://schemas.microsoft.com/office/drawing/2014/main" id="{26F6281D-7B4A-CFD4-9E7E-1CEE0C71557D}"/>
+          <p:cNvPr id="47" name="Oval 46">
+            <a:extLst>
+              <a:ext uri="{FF2B5EF4-FFF2-40B4-BE49-F238E27FC236}">
+                <a16:creationId xmlns:a16="http://schemas.microsoft.com/office/drawing/2014/main" id="{F77AE316-A040-60CF-AD73-4963CE3B11DB}"/>
               </a:ext>
             </a:extLst>
           </p:cNvPr>
@@ -6071,7 +7024,7 @@
         </p:nvSpPr>
         <p:spPr>
           <a:xfrm>
-            <a:off x="5454588" y="3391325"/>
+            <a:off x="5304972" y="3465614"/>
             <a:ext cx="232721" cy="233452"/>
           </a:xfrm>
           <a:prstGeom prst="ellipse">
@@ -6111,10 +7064,10 @@
       </p:sp>
       <p:sp>
         <p:nvSpPr>
-          <p:cNvPr id="18" name="Oval 17">
-            <a:extLst>
-              <a:ext uri="{FF2B5EF4-FFF2-40B4-BE49-F238E27FC236}">
-                <a16:creationId xmlns:a16="http://schemas.microsoft.com/office/drawing/2014/main" id="{EF32660C-30F8-99B8-E41E-471103E89FB1}"/>
+          <p:cNvPr id="48" name="Oval 47">
+            <a:extLst>
+              <a:ext uri="{FF2B5EF4-FFF2-40B4-BE49-F238E27FC236}">
+                <a16:creationId xmlns:a16="http://schemas.microsoft.com/office/drawing/2014/main" id="{508CA081-2154-5827-2D47-433D3BB2A4D2}"/>
               </a:ext>
             </a:extLst>
           </p:cNvPr>
@@ -6123,7 +7076,7 @@
         </p:nvSpPr>
         <p:spPr>
           <a:xfrm>
-            <a:off x="5454588" y="3730975"/>
+            <a:off x="5304972" y="3805264"/>
             <a:ext cx="232721" cy="233452"/>
           </a:xfrm>
           <a:prstGeom prst="ellipse">
@@ -6163,10 +7116,10 @@
       </p:sp>
       <p:sp>
         <p:nvSpPr>
-          <p:cNvPr id="28" name="Oval 27">
-            <a:extLst>
-              <a:ext uri="{FF2B5EF4-FFF2-40B4-BE49-F238E27FC236}">
-                <a16:creationId xmlns:a16="http://schemas.microsoft.com/office/drawing/2014/main" id="{F626299B-1422-5920-5B6E-33E7AB56CCD9}"/>
+          <p:cNvPr id="49" name="Oval 48">
+            <a:extLst>
+              <a:ext uri="{FF2B5EF4-FFF2-40B4-BE49-F238E27FC236}">
+                <a16:creationId xmlns:a16="http://schemas.microsoft.com/office/drawing/2014/main" id="{680AA6C6-7D91-F1A0-0A17-D32EBB82EFFD}"/>
               </a:ext>
             </a:extLst>
           </p:cNvPr>
@@ -6175,7 +7128,7 @@
         </p:nvSpPr>
         <p:spPr>
           <a:xfrm>
-            <a:off x="7367737" y="1436012"/>
+            <a:off x="7481718" y="1216848"/>
             <a:ext cx="232721" cy="233452"/>
           </a:xfrm>
           <a:prstGeom prst="ellipse">
@@ -6212,10 +7165,10 @@
       </p:sp>
       <p:sp>
         <p:nvSpPr>
-          <p:cNvPr id="29" name="Oval 28">
-            <a:extLst>
-              <a:ext uri="{FF2B5EF4-FFF2-40B4-BE49-F238E27FC236}">
-                <a16:creationId xmlns:a16="http://schemas.microsoft.com/office/drawing/2014/main" id="{3D60F3CC-B5E4-A947-5F55-C46BF5128245}"/>
+          <p:cNvPr id="50" name="Oval 49">
+            <a:extLst>
+              <a:ext uri="{FF2B5EF4-FFF2-40B4-BE49-F238E27FC236}">
+                <a16:creationId xmlns:a16="http://schemas.microsoft.com/office/drawing/2014/main" id="{1CD6AF0D-FE76-6EED-FD3A-1C964F1109BD}"/>
               </a:ext>
             </a:extLst>
           </p:cNvPr>
@@ -6224,7 +7177,7 @@
         </p:nvSpPr>
         <p:spPr>
           <a:xfrm>
-            <a:off x="7734413" y="1436012"/>
+            <a:off x="7848394" y="1216848"/>
             <a:ext cx="232721" cy="233452"/>
           </a:xfrm>
           <a:prstGeom prst="ellipse">
@@ -6264,10 +7217,10 @@
       </p:sp>
       <p:sp>
         <p:nvSpPr>
-          <p:cNvPr id="30" name="Oval 29">
-            <a:extLst>
-              <a:ext uri="{FF2B5EF4-FFF2-40B4-BE49-F238E27FC236}">
-                <a16:creationId xmlns:a16="http://schemas.microsoft.com/office/drawing/2014/main" id="{82C88C94-3E1A-DD0D-0B11-8A3F1A803BCA}"/>
+          <p:cNvPr id="51" name="Oval 50">
+            <a:extLst>
+              <a:ext uri="{FF2B5EF4-FFF2-40B4-BE49-F238E27FC236}">
+                <a16:creationId xmlns:a16="http://schemas.microsoft.com/office/drawing/2014/main" id="{30444D10-577A-5EB3-B4B8-09CFFB972062}"/>
               </a:ext>
             </a:extLst>
           </p:cNvPr>
@@ -6276,7 +7229,7 @@
         </p:nvSpPr>
         <p:spPr>
           <a:xfrm>
-            <a:off x="8077555" y="1436012"/>
+            <a:off x="8191536" y="1216848"/>
             <a:ext cx="232721" cy="233452"/>
           </a:xfrm>
           <a:prstGeom prst="ellipse">
@@ -6316,10 +7269,10 @@
       </p:sp>
       <p:sp>
         <p:nvSpPr>
-          <p:cNvPr id="31" name="Oval 30">
-            <a:extLst>
-              <a:ext uri="{FF2B5EF4-FFF2-40B4-BE49-F238E27FC236}">
-                <a16:creationId xmlns:a16="http://schemas.microsoft.com/office/drawing/2014/main" id="{23E897B4-6B7A-3201-A4A2-F84359BDC81A}"/>
+          <p:cNvPr id="52" name="Oval 51">
+            <a:extLst>
+              <a:ext uri="{FF2B5EF4-FFF2-40B4-BE49-F238E27FC236}">
+                <a16:creationId xmlns:a16="http://schemas.microsoft.com/office/drawing/2014/main" id="{7B3EAF02-ACC2-14E5-6921-5782AFCD0284}"/>
               </a:ext>
             </a:extLst>
           </p:cNvPr>
@@ -6328,7 +7281,7 @@
         </p:nvSpPr>
         <p:spPr>
           <a:xfrm>
-            <a:off x="8060468" y="5136401"/>
+            <a:off x="8211546" y="5407700"/>
             <a:ext cx="232721" cy="233452"/>
           </a:xfrm>
           <a:prstGeom prst="ellipse">
@@ -6365,10 +7318,10 @@
       </p:sp>
       <p:sp>
         <p:nvSpPr>
-          <p:cNvPr id="32" name="Oval 31">
-            <a:extLst>
-              <a:ext uri="{FF2B5EF4-FFF2-40B4-BE49-F238E27FC236}">
-                <a16:creationId xmlns:a16="http://schemas.microsoft.com/office/drawing/2014/main" id="{7C0A972B-8DA6-464D-8DB8-52D10187E75B}"/>
+          <p:cNvPr id="53" name="Oval 52">
+            <a:extLst>
+              <a:ext uri="{FF2B5EF4-FFF2-40B4-BE49-F238E27FC236}">
+                <a16:creationId xmlns:a16="http://schemas.microsoft.com/office/drawing/2014/main" id="{57655DC0-3809-6A18-E1B8-793DD1B6C0B2}"/>
               </a:ext>
             </a:extLst>
           </p:cNvPr>
@@ -6377,7 +7330,7 @@
         </p:nvSpPr>
         <p:spPr>
           <a:xfrm>
-            <a:off x="7696911" y="5136401"/>
+            <a:off x="7847989" y="5407700"/>
             <a:ext cx="232721" cy="233452"/>
           </a:xfrm>
           <a:prstGeom prst="ellipse">
@@ -6417,10 +7370,10 @@
       </p:sp>
       <p:sp>
         <p:nvSpPr>
-          <p:cNvPr id="33" name="Oval 32">
-            <a:extLst>
-              <a:ext uri="{FF2B5EF4-FFF2-40B4-BE49-F238E27FC236}">
-                <a16:creationId xmlns:a16="http://schemas.microsoft.com/office/drawing/2014/main" id="{80D3272F-3785-EF90-ADAB-5AB5A77F4892}"/>
+          <p:cNvPr id="54" name="Oval 53">
+            <a:extLst>
+              <a:ext uri="{FF2B5EF4-FFF2-40B4-BE49-F238E27FC236}">
+                <a16:creationId xmlns:a16="http://schemas.microsoft.com/office/drawing/2014/main" id="{B95F2391-15E6-AD99-468D-980C22C688B8}"/>
               </a:ext>
             </a:extLst>
           </p:cNvPr>
@@ -6429,7 +7382,7 @@
         </p:nvSpPr>
         <p:spPr>
           <a:xfrm>
-            <a:off x="7350650" y="5136401"/>
+            <a:off x="7501728" y="5407700"/>
             <a:ext cx="232721" cy="233452"/>
           </a:xfrm>
           <a:prstGeom prst="ellipse">
@@ -6469,10 +7422,10 @@
       </p:sp>
       <p:cxnSp>
         <p:nvCxnSpPr>
-          <p:cNvPr id="35" name="Straight Arrow Connector 34">
-            <a:extLst>
-              <a:ext uri="{FF2B5EF4-FFF2-40B4-BE49-F238E27FC236}">
-                <a16:creationId xmlns:a16="http://schemas.microsoft.com/office/drawing/2014/main" id="{AC54A6A2-8D89-B46A-A0EA-2BA5937E15F4}"/>
+          <p:cNvPr id="55" name="Straight Arrow Connector 54">
+            <a:extLst>
+              <a:ext uri="{FF2B5EF4-FFF2-40B4-BE49-F238E27FC236}">
+                <a16:creationId xmlns:a16="http://schemas.microsoft.com/office/drawing/2014/main" id="{BD5330F2-3672-67DC-5299-32944AC77A6F}"/>
               </a:ext>
             </a:extLst>
           </p:cNvPr>
@@ -6481,7 +7434,7 @@
         </p:nvCxnSpPr>
         <p:spPr>
           <a:xfrm>
-            <a:off x="5915608" y="3624777"/>
+            <a:off x="5906278" y="3836091"/>
             <a:ext cx="4198776" cy="0"/>
           </a:xfrm>
           <a:prstGeom prst="straightConnector1">
@@ -6522,7 +7475,7 @@
 </p:sld>
 </file>
 
-<file path=ppt/slides/slide3.xml><?xml version="1.0" encoding="utf-8"?>
+<file path=ppt/slides/slide4.xml><?xml version="1.0" encoding="utf-8"?>
 <p:sld xmlns:a="http://schemas.openxmlformats.org/drawingml/2006/main" xmlns:r="http://schemas.openxmlformats.org/officeDocument/2006/relationships" xmlns:p="http://schemas.openxmlformats.org/presentationml/2006/main">
   <p:cSld>
     <p:bg>
@@ -6549,7 +7502,7 @@
       </p:grpSpPr>
       <p:sp useBgFill="1">
         <p:nvSpPr>
-          <p:cNvPr id="20" name="Rectangle 19">
+          <p:cNvPr id="26" name="Rectangle 25">
             <a:extLst>
               <a:ext uri="{FF2B5EF4-FFF2-40B4-BE49-F238E27FC236}">
                 <a16:creationId xmlns:a16="http://schemas.microsoft.com/office/drawing/2014/main" id="{2B97F24A-32CE-4C1C-A50D-3016B394DCFB}"/>
@@ -6609,7 +7562,7 @@
       </p:sp>
       <p:sp>
         <p:nvSpPr>
-          <p:cNvPr id="21" name="sketch line">
+          <p:cNvPr id="28" name="sketch line">
             <a:extLst>
               <a:ext uri="{FF2B5EF4-FFF2-40B4-BE49-F238E27FC236}">
                 <a16:creationId xmlns:a16="http://schemas.microsoft.com/office/drawing/2014/main" id="{CD8B4F24-440B-49E9-B85D-733523DC064B}"/>
@@ -6944,10 +7897,10 @@
       </p:sp>
       <p:pic>
         <p:nvPicPr>
-          <p:cNvPr id="23" name="Picture 22" descr="A screenshot of a computer&#10;&#10;Description automatically generated">
-            <a:extLst>
-              <a:ext uri="{FF2B5EF4-FFF2-40B4-BE49-F238E27FC236}">
-                <a16:creationId xmlns:a16="http://schemas.microsoft.com/office/drawing/2014/main" id="{2A06BE48-51EF-DE1D-9D7F-53EDA0D0B5EF}"/>
+          <p:cNvPr id="3" name="Picture 2" descr="A screenshot of a computer&#10;&#10;Description automatically generated">
+            <a:extLst>
+              <a:ext uri="{FF2B5EF4-FFF2-40B4-BE49-F238E27FC236}">
+                <a16:creationId xmlns:a16="http://schemas.microsoft.com/office/drawing/2014/main" id="{50C91B2F-0723-D5C5-0738-4250283CB87C}"/>
               </a:ext>
             </a:extLst>
           </p:cNvPr>
@@ -6970,8 +7923,8 @@
         </p:blipFill>
         <p:spPr>
           <a:xfrm>
-            <a:off x="4608191" y="1025111"/>
-            <a:ext cx="6485167" cy="4477035"/>
+            <a:off x="4654296" y="1047217"/>
+            <a:ext cx="6903720" cy="4763566"/>
           </a:xfrm>
           <a:prstGeom prst="rect">
             <a:avLst/>
@@ -6991,7 +7944,7 @@
 </p:sld>
 </file>
 
-<file path=ppt/slides/slide4.xml><?xml version="1.0" encoding="utf-8"?>
+<file path=ppt/slides/slide5.xml><?xml version="1.0" encoding="utf-8"?>
 <p:sld xmlns:a="http://schemas.openxmlformats.org/drawingml/2006/main" xmlns:r="http://schemas.openxmlformats.org/officeDocument/2006/relationships" xmlns:p="http://schemas.openxmlformats.org/presentationml/2006/main">
   <p:cSld>
     <p:bg>
@@ -7415,70 +8368,17 @@
           <a:p>
             <a:r>
               <a:rPr lang="en-US" sz="2200" dirty="0"/>
-              <a:t>One system will control the intersection.</a:t>
+              <a:t>One Manager will control each intersection.</a:t>
             </a:r>
           </a:p>
           <a:p>
             <a:r>
               <a:rPr lang="en-US" sz="2200" dirty="0"/>
-              <a:t>One system will communicate with city system to coordinate.</a:t>
+              <a:t>One Manager will communicate with city system to coordinate.</a:t>
             </a:r>
           </a:p>
-          <a:p>
-            <a:r>
-              <a:rPr lang="en-US" sz="2200" dirty="0"/>
-              <a:t>One system to coordinate them all.</a:t>
-            </a:r>
-          </a:p>
-        </p:txBody>
-      </p:sp>
-      <p:pic>
-        <p:nvPicPr>
-          <p:cNvPr id="1026" name="Picture 2" descr="One Ring | The One Wiki to Rule Them All | Fandom">
-            <a:extLst>
-              <a:ext uri="{FF2B5EF4-FFF2-40B4-BE49-F238E27FC236}">
-                <a16:creationId xmlns:a16="http://schemas.microsoft.com/office/drawing/2014/main" id="{6250C5F9-FF32-939E-34D4-BF94A1BB6DEE}"/>
-              </a:ext>
-            </a:extLst>
-          </p:cNvPr>
-          <p:cNvPicPr>
-            <a:picLocks noChangeAspect="1" noChangeArrowheads="1"/>
-          </p:cNvPicPr>
-          <p:nvPr/>
-        </p:nvPicPr>
-        <p:blipFill>
-          <a:blip r:embed="rId2">
-            <a:extLst>
-              <a:ext uri="{28A0092B-C50C-407E-A947-70E740481C1C}">
-                <a14:useLocalDpi xmlns:a14="http://schemas.microsoft.com/office/drawing/2010/main" val="0"/>
-              </a:ext>
-            </a:extLst>
-          </a:blip>
-          <a:srcRect/>
-          <a:stretch>
-            <a:fillRect/>
-          </a:stretch>
-        </p:blipFill>
-        <p:spPr bwMode="auto">
-          <a:xfrm>
-            <a:off x="819341" y="5384432"/>
-            <a:ext cx="2371725" cy="1581150"/>
-          </a:xfrm>
-          <a:prstGeom prst="rect">
-            <a:avLst/>
-          </a:prstGeom>
-          <a:noFill/>
-          <a:extLst>
-            <a:ext uri="{909E8E84-426E-40DD-AFC4-6F175D3DCCD1}">
-              <a14:hiddenFill xmlns:a14="http://schemas.microsoft.com/office/drawing/2010/main">
-                <a:solidFill>
-                  <a:srgbClr val="FFFFFF"/>
-                </a:solidFill>
-              </a14:hiddenFill>
-            </a:ext>
-          </a:extLst>
-        </p:spPr>
-      </p:pic>
+        </p:txBody>
+      </p:sp>
       <p:pic>
         <p:nvPicPr>
           <p:cNvPr id="6" name="Content Placeholder 4" descr="A computer screen shot of a diagram&#10;&#10;Description automatically generated">
@@ -7494,7 +8394,7 @@
           <p:nvPr/>
         </p:nvPicPr>
         <p:blipFill rotWithShape="1">
-          <a:blip r:embed="rId3">
+          <a:blip r:embed="rId2">
             <a:extLst>
               <a:ext uri="{28A0092B-C50C-407E-A947-70E740481C1C}">
                 <a14:useLocalDpi xmlns:a14="http://schemas.microsoft.com/office/drawing/2010/main" val="0"/>
@@ -7518,697 +8418,6 @@
     <p:extLst>
       <p:ext uri="{BB962C8B-B14F-4D97-AF65-F5344CB8AC3E}">
         <p14:creationId xmlns:p14="http://schemas.microsoft.com/office/powerpoint/2010/main" val="3556383139"/>
-      </p:ext>
-    </p:extLst>
-  </p:cSld>
-  <p:clrMapOvr>
-    <a:masterClrMapping/>
-  </p:clrMapOvr>
-  <p:timing>
-    <p:tnLst>
-      <p:par>
-        <p:cTn id="1" dur="indefinite" restart="never" nodeType="tmRoot">
-          <p:childTnLst>
-            <p:seq concurrent="1" nextAc="seek">
-              <p:cTn id="2" dur="indefinite" nodeType="mainSeq">
-                <p:childTnLst>
-                  <p:par>
-                    <p:cTn id="3" fill="hold">
-                      <p:stCondLst>
-                        <p:cond delay="indefinite"/>
-                        <p:cond evt="onBegin" delay="0">
-                          <p:tn val="2"/>
-                        </p:cond>
-                      </p:stCondLst>
-                      <p:childTnLst>
-                        <p:par>
-                          <p:cTn id="4" fill="hold">
-                            <p:stCondLst>
-                              <p:cond delay="0"/>
-                            </p:stCondLst>
-                            <p:childTnLst>
-                              <p:par>
-                                <p:cTn id="5" presetID="10" presetClass="entr" presetSubtype="0" fill="hold" grpId="0" nodeType="withEffect">
-                                  <p:stCondLst>
-                                    <p:cond delay="1000"/>
-                                  </p:stCondLst>
-                                  <p:iterate>
-                                    <p:tmPct val="10000"/>
-                                  </p:iterate>
-                                  <p:childTnLst>
-                                    <p:set>
-                                      <p:cBhvr>
-                                        <p:cTn id="6" dur="1" fill="hold">
-                                          <p:stCondLst>
-                                            <p:cond delay="0"/>
-                                          </p:stCondLst>
-                                        </p:cTn>
-                                        <p:tgtEl>
-                                          <p:spTgt spid="2"/>
-                                        </p:tgtEl>
-                                        <p:attrNameLst>
-                                          <p:attrName>style.visibility</p:attrName>
-                                        </p:attrNameLst>
-                                      </p:cBhvr>
-                                      <p:to>
-                                        <p:strVal val="visible"/>
-                                      </p:to>
-                                    </p:set>
-                                    <p:animEffect transition="in" filter="fade">
-                                      <p:cBhvr>
-                                        <p:cTn id="7" dur="700"/>
-                                        <p:tgtEl>
-                                          <p:spTgt spid="2"/>
-                                        </p:tgtEl>
-                                      </p:cBhvr>
-                                    </p:animEffect>
-                                  </p:childTnLst>
-                                </p:cTn>
-                              </p:par>
-                            </p:childTnLst>
-                          </p:cTn>
-                        </p:par>
-                      </p:childTnLst>
-                    </p:cTn>
-                  </p:par>
-                </p:childTnLst>
-              </p:cTn>
-              <p:prevCondLst>
-                <p:cond evt="onPrev" delay="0">
-                  <p:tgtEl>
-                    <p:sldTgt/>
-                  </p:tgtEl>
-                </p:cond>
-              </p:prevCondLst>
-              <p:nextCondLst>
-                <p:cond evt="onNext" delay="0">
-                  <p:tgtEl>
-                    <p:sldTgt/>
-                  </p:tgtEl>
-                </p:cond>
-              </p:nextCondLst>
-            </p:seq>
-          </p:childTnLst>
-        </p:cTn>
-      </p:par>
-    </p:tnLst>
-    <p:bldLst>
-      <p:bldP spid="2" grpId="0"/>
-    </p:bldLst>
-  </p:timing>
-</p:sld>
-</file>
-
-<file path=ppt/slides/slide5.xml><?xml version="1.0" encoding="utf-8"?>
-<p:sld xmlns:a="http://schemas.openxmlformats.org/drawingml/2006/main" xmlns:r="http://schemas.openxmlformats.org/officeDocument/2006/relationships" xmlns:p="http://schemas.openxmlformats.org/presentationml/2006/main">
-  <p:cSld>
-    <p:bg>
-      <p:bgPr>
-        <a:solidFill>
-          <a:schemeClr val="bg1"/>
-        </a:solidFill>
-        <a:effectLst/>
-      </p:bgPr>
-    </p:bg>
-    <p:spTree>
-      <p:nvGrpSpPr>
-        <p:cNvPr id="1" name=""/>
-        <p:cNvGrpSpPr/>
-        <p:nvPr/>
-      </p:nvGrpSpPr>
-      <p:grpSpPr>
-        <a:xfrm>
-          <a:off x="0" y="0"/>
-          <a:ext cx="0" cy="0"/>
-          <a:chOff x="0" y="0"/>
-          <a:chExt cx="0" cy="0"/>
-        </a:xfrm>
-      </p:grpSpPr>
-      <p:sp useBgFill="1">
-        <p:nvSpPr>
-          <p:cNvPr id="26" name="Rectangle 25">
-            <a:extLst>
-              <a:ext uri="{FF2B5EF4-FFF2-40B4-BE49-F238E27FC236}">
-                <a16:creationId xmlns:a16="http://schemas.microsoft.com/office/drawing/2014/main" id="{F13C74B1-5B17-4795-BED0-7140497B445A}"/>
-              </a:ext>
-              <a:ext uri="{C183D7F6-B498-43B3-948B-1728B52AA6E4}">
-                <adec:decorative xmlns:adec="http://schemas.microsoft.com/office/drawing/2017/decorative" val="1"/>
-              </a:ext>
-            </a:extLst>
-          </p:cNvPr>
-          <p:cNvSpPr>
-            <a:spLocks noGrp="1" noRot="1" noChangeAspect="1" noMove="1" noResize="1" noEditPoints="1" noAdjustHandles="1" noChangeArrowheads="1" noChangeShapeType="1" noTextEdit="1"/>
-          </p:cNvSpPr>
-          <p:nvPr>
-            <p:extLst>
-              <p:ext uri="{386F3935-93C4-4BCD-93E2-E3B085C9AB24}">
-                <p16:designElem xmlns:p16="http://schemas.microsoft.com/office/powerpoint/2015/main" val="1"/>
-              </p:ext>
-            </p:extLst>
-          </p:nvPr>
-        </p:nvSpPr>
-        <p:spPr>
-          <a:xfrm>
-            <a:off x="0" y="0"/>
-            <a:ext cx="12188952" cy="6858000"/>
-          </a:xfrm>
-          <a:prstGeom prst="rect">
-            <a:avLst/>
-          </a:prstGeom>
-          <a:ln>
-            <a:noFill/>
-          </a:ln>
-        </p:spPr>
-        <p:style>
-          <a:lnRef idx="2">
-            <a:schemeClr val="accent1">
-              <a:shade val="50000"/>
-            </a:schemeClr>
-          </a:lnRef>
-          <a:fillRef idx="1">
-            <a:schemeClr val="accent1"/>
-          </a:fillRef>
-          <a:effectRef idx="0">
-            <a:schemeClr val="accent1"/>
-          </a:effectRef>
-          <a:fontRef idx="minor">
-            <a:schemeClr val="lt1"/>
-          </a:fontRef>
-        </p:style>
-        <p:txBody>
-          <a:bodyPr rtlCol="0" anchor="ctr"/>
-          <a:lstStyle/>
-          <a:p>
-            <a:pPr algn="ctr"/>
-            <a:endParaRPr lang="en-US"/>
-          </a:p>
-        </p:txBody>
-      </p:sp>
-      <p:sp>
-        <p:nvSpPr>
-          <p:cNvPr id="2" name="Title 1">
-            <a:extLst>
-              <a:ext uri="{FF2B5EF4-FFF2-40B4-BE49-F238E27FC236}">
-                <a16:creationId xmlns:a16="http://schemas.microsoft.com/office/drawing/2014/main" id="{2CA1D05F-8071-6289-CF59-FA97AEE49972}"/>
-              </a:ext>
-            </a:extLst>
-          </p:cNvPr>
-          <p:cNvSpPr>
-            <a:spLocks noGrp="1"/>
-          </p:cNvSpPr>
-          <p:nvPr>
-            <p:ph type="title"/>
-          </p:nvPr>
-        </p:nvSpPr>
-        <p:spPr>
-          <a:xfrm>
-            <a:off x="640080" y="325369"/>
-            <a:ext cx="4368602" cy="1956841"/>
-          </a:xfrm>
-        </p:spPr>
-        <p:txBody>
-          <a:bodyPr anchor="b">
-            <a:normAutofit/>
-          </a:bodyPr>
-          <a:lstStyle/>
-          <a:p>
-            <a:r>
-              <a:rPr lang="en-US" sz="5400" dirty="0"/>
-              <a:t>Traffic Lamp</a:t>
-            </a:r>
-            <a:endParaRPr lang="en-DE" sz="5400" dirty="0"/>
-          </a:p>
-        </p:txBody>
-      </p:sp>
-      <p:sp>
-        <p:nvSpPr>
-          <p:cNvPr id="28" name="sketchy line">
-            <a:extLst>
-              <a:ext uri="{FF2B5EF4-FFF2-40B4-BE49-F238E27FC236}">
-                <a16:creationId xmlns:a16="http://schemas.microsoft.com/office/drawing/2014/main" id="{D4974D33-8DC5-464E-8C6D-BE58F0669C17}"/>
-              </a:ext>
-              <a:ext uri="{C183D7F6-B498-43B3-948B-1728B52AA6E4}">
-                <adec:decorative xmlns:adec="http://schemas.microsoft.com/office/drawing/2017/decorative" val="1"/>
-              </a:ext>
-            </a:extLst>
-          </p:cNvPr>
-          <p:cNvSpPr>
-            <a:spLocks noGrp="1" noRot="1" noChangeAspect="1" noMove="1" noResize="1" noEditPoints="1" noAdjustHandles="1" noChangeArrowheads="1" noChangeShapeType="1" noTextEdit="1"/>
-          </p:cNvSpPr>
-          <p:nvPr>
-            <p:extLst>
-              <p:ext uri="{386F3935-93C4-4BCD-93E2-E3B085C9AB24}">
-                <p16:designElem xmlns:p16="http://schemas.microsoft.com/office/powerpoint/2015/main" val="1"/>
-              </p:ext>
-            </p:extLst>
-          </p:nvPr>
-        </p:nvSpPr>
-        <p:spPr>
-          <a:xfrm>
-            <a:off x="640080" y="2586994"/>
-            <a:ext cx="3474720" cy="18288"/>
-          </a:xfrm>
-          <a:custGeom>
-            <a:avLst/>
-            <a:gdLst>
-              <a:gd name="connsiteX0" fmla="*/ 0 w 3474720"/>
-              <a:gd name="connsiteY0" fmla="*/ 0 h 18288"/>
-              <a:gd name="connsiteX1" fmla="*/ 694944 w 3474720"/>
-              <a:gd name="connsiteY1" fmla="*/ 0 h 18288"/>
-              <a:gd name="connsiteX2" fmla="*/ 1355141 w 3474720"/>
-              <a:gd name="connsiteY2" fmla="*/ 0 h 18288"/>
-              <a:gd name="connsiteX3" fmla="*/ 2015338 w 3474720"/>
-              <a:gd name="connsiteY3" fmla="*/ 0 h 18288"/>
-              <a:gd name="connsiteX4" fmla="*/ 2779776 w 3474720"/>
-              <a:gd name="connsiteY4" fmla="*/ 0 h 18288"/>
-              <a:gd name="connsiteX5" fmla="*/ 3474720 w 3474720"/>
-              <a:gd name="connsiteY5" fmla="*/ 0 h 18288"/>
-              <a:gd name="connsiteX6" fmla="*/ 3474720 w 3474720"/>
-              <a:gd name="connsiteY6" fmla="*/ 18288 h 18288"/>
-              <a:gd name="connsiteX7" fmla="*/ 2779776 w 3474720"/>
-              <a:gd name="connsiteY7" fmla="*/ 18288 h 18288"/>
-              <a:gd name="connsiteX8" fmla="*/ 2189074 w 3474720"/>
-              <a:gd name="connsiteY8" fmla="*/ 18288 h 18288"/>
-              <a:gd name="connsiteX9" fmla="*/ 1528877 w 3474720"/>
-              <a:gd name="connsiteY9" fmla="*/ 18288 h 18288"/>
-              <a:gd name="connsiteX10" fmla="*/ 868680 w 3474720"/>
-              <a:gd name="connsiteY10" fmla="*/ 18288 h 18288"/>
-              <a:gd name="connsiteX11" fmla="*/ 0 w 3474720"/>
-              <a:gd name="connsiteY11" fmla="*/ 18288 h 18288"/>
-              <a:gd name="connsiteX12" fmla="*/ 0 w 3474720"/>
-              <a:gd name="connsiteY12" fmla="*/ 0 h 18288"/>
-            </a:gdLst>
-            <a:ahLst/>
-            <a:cxnLst>
-              <a:cxn ang="0">
-                <a:pos x="connsiteX0" y="connsiteY0"/>
-              </a:cxn>
-              <a:cxn ang="0">
-                <a:pos x="connsiteX1" y="connsiteY1"/>
-              </a:cxn>
-              <a:cxn ang="0">
-                <a:pos x="connsiteX2" y="connsiteY2"/>
-              </a:cxn>
-              <a:cxn ang="0">
-                <a:pos x="connsiteX3" y="connsiteY3"/>
-              </a:cxn>
-              <a:cxn ang="0">
-                <a:pos x="connsiteX4" y="connsiteY4"/>
-              </a:cxn>
-              <a:cxn ang="0">
-                <a:pos x="connsiteX5" y="connsiteY5"/>
-              </a:cxn>
-              <a:cxn ang="0">
-                <a:pos x="connsiteX6" y="connsiteY6"/>
-              </a:cxn>
-              <a:cxn ang="0">
-                <a:pos x="connsiteX7" y="connsiteY7"/>
-              </a:cxn>
-              <a:cxn ang="0">
-                <a:pos x="connsiteX8" y="connsiteY8"/>
-              </a:cxn>
-              <a:cxn ang="0">
-                <a:pos x="connsiteX9" y="connsiteY9"/>
-              </a:cxn>
-              <a:cxn ang="0">
-                <a:pos x="connsiteX10" y="connsiteY10"/>
-              </a:cxn>
-              <a:cxn ang="0">
-                <a:pos x="connsiteX11" y="connsiteY11"/>
-              </a:cxn>
-              <a:cxn ang="0">
-                <a:pos x="connsiteX12" y="connsiteY12"/>
-              </a:cxn>
-            </a:cxnLst>
-            <a:rect l="l" t="t" r="r" b="b"/>
-            <a:pathLst>
-              <a:path w="3474720" h="18288" fill="none" extrusionOk="0">
-                <a:moveTo>
-                  <a:pt x="0" y="0"/>
-                </a:moveTo>
-                <a:cubicBezTo>
-                  <a:pt x="224454" y="-14544"/>
-                  <a:pt x="495407" y="26540"/>
-                  <a:pt x="694944" y="0"/>
-                </a:cubicBezTo>
-                <a:cubicBezTo>
-                  <a:pt x="894481" y="-26540"/>
-                  <a:pt x="1130063" y="24713"/>
-                  <a:pt x="1355141" y="0"/>
-                </a:cubicBezTo>
-                <a:cubicBezTo>
-                  <a:pt x="1580219" y="-24713"/>
-                  <a:pt x="1820099" y="26695"/>
-                  <a:pt x="2015338" y="0"/>
-                </a:cubicBezTo>
-                <a:cubicBezTo>
-                  <a:pt x="2210577" y="-26695"/>
-                  <a:pt x="2402045" y="165"/>
-                  <a:pt x="2779776" y="0"/>
-                </a:cubicBezTo>
-                <a:cubicBezTo>
-                  <a:pt x="3157507" y="-165"/>
-                  <a:pt x="3286859" y="-15571"/>
-                  <a:pt x="3474720" y="0"/>
-                </a:cubicBezTo>
-                <a:cubicBezTo>
-                  <a:pt x="3474286" y="7551"/>
-                  <a:pt x="3474253" y="9822"/>
-                  <a:pt x="3474720" y="18288"/>
-                </a:cubicBezTo>
-                <a:cubicBezTo>
-                  <a:pt x="3233904" y="29845"/>
-                  <a:pt x="2945134" y="-5256"/>
-                  <a:pt x="2779776" y="18288"/>
-                </a:cubicBezTo>
-                <a:cubicBezTo>
-                  <a:pt x="2614418" y="41832"/>
-                  <a:pt x="2339768" y="22709"/>
-                  <a:pt x="2189074" y="18288"/>
-                </a:cubicBezTo>
-                <a:cubicBezTo>
-                  <a:pt x="2038380" y="13867"/>
-                  <a:pt x="1817434" y="-4947"/>
-                  <a:pt x="1528877" y="18288"/>
-                </a:cubicBezTo>
-                <a:cubicBezTo>
-                  <a:pt x="1240320" y="41523"/>
-                  <a:pt x="1042447" y="37198"/>
-                  <a:pt x="868680" y="18288"/>
-                </a:cubicBezTo>
-                <a:cubicBezTo>
-                  <a:pt x="694913" y="-622"/>
-                  <a:pt x="233232" y="44909"/>
-                  <a:pt x="0" y="18288"/>
-                </a:cubicBezTo>
-                <a:cubicBezTo>
-                  <a:pt x="60" y="11696"/>
-                  <a:pt x="66" y="3758"/>
-                  <a:pt x="0" y="0"/>
-                </a:cubicBezTo>
-                <a:close/>
-              </a:path>
-              <a:path w="3474720" h="18288" stroke="0" extrusionOk="0">
-                <a:moveTo>
-                  <a:pt x="0" y="0"/>
-                </a:moveTo>
-                <a:cubicBezTo>
-                  <a:pt x="202328" y="-14716"/>
-                  <a:pt x="332722" y="-11499"/>
-                  <a:pt x="625450" y="0"/>
-                </a:cubicBezTo>
-                <a:cubicBezTo>
-                  <a:pt x="918178" y="11499"/>
-                  <a:pt x="1096688" y="5123"/>
-                  <a:pt x="1389888" y="0"/>
-                </a:cubicBezTo>
-                <a:cubicBezTo>
-                  <a:pt x="1683088" y="-5123"/>
-                  <a:pt x="1835981" y="-14038"/>
-                  <a:pt x="1980590" y="0"/>
-                </a:cubicBezTo>
-                <a:cubicBezTo>
-                  <a:pt x="2125199" y="14038"/>
-                  <a:pt x="2396099" y="-7203"/>
-                  <a:pt x="2571293" y="0"/>
-                </a:cubicBezTo>
-                <a:cubicBezTo>
-                  <a:pt x="2746487" y="7203"/>
-                  <a:pt x="3041609" y="-12036"/>
-                  <a:pt x="3474720" y="0"/>
-                </a:cubicBezTo>
-                <a:cubicBezTo>
-                  <a:pt x="3474638" y="4406"/>
-                  <a:pt x="3474631" y="9982"/>
-                  <a:pt x="3474720" y="18288"/>
-                </a:cubicBezTo>
-                <a:cubicBezTo>
-                  <a:pt x="3324873" y="21876"/>
-                  <a:pt x="3136771" y="12587"/>
-                  <a:pt x="2814523" y="18288"/>
-                </a:cubicBezTo>
-                <a:cubicBezTo>
-                  <a:pt x="2492275" y="23989"/>
-                  <a:pt x="2294402" y="47111"/>
-                  <a:pt x="2154326" y="18288"/>
-                </a:cubicBezTo>
-                <a:cubicBezTo>
-                  <a:pt x="2014250" y="-10535"/>
-                  <a:pt x="1820317" y="33903"/>
-                  <a:pt x="1494130" y="18288"/>
-                </a:cubicBezTo>
-                <a:cubicBezTo>
-                  <a:pt x="1167943" y="2673"/>
-                  <a:pt x="948432" y="14868"/>
-                  <a:pt x="729691" y="18288"/>
-                </a:cubicBezTo>
-                <a:cubicBezTo>
-                  <a:pt x="510950" y="21708"/>
-                  <a:pt x="264032" y="24354"/>
-                  <a:pt x="0" y="18288"/>
-                </a:cubicBezTo>
-                <a:cubicBezTo>
-                  <a:pt x="189" y="14288"/>
-                  <a:pt x="-703" y="3747"/>
-                  <a:pt x="0" y="0"/>
-                </a:cubicBezTo>
-                <a:close/>
-              </a:path>
-            </a:pathLst>
-          </a:custGeom>
-          <a:solidFill>
-            <a:schemeClr val="accent2"/>
-          </a:solidFill>
-          <a:ln w="44450" cap="rnd">
-            <a:solidFill>
-              <a:schemeClr val="accent2"/>
-            </a:solidFill>
-            <a:round/>
-            <a:extLst>
-              <a:ext uri="{C807C97D-BFC1-408E-A445-0C87EB9F89A2}">
-                <ask:lineSketchStyleProps xmlns:ask="http://schemas.microsoft.com/office/drawing/2018/sketchyshapes" sd="2863741219">
-                  <a:prstGeom prst="rect">
-                    <a:avLst/>
-                  </a:prstGeom>
-                  <ask:type>
-                    <ask:lineSketchFreehand/>
-                  </ask:type>
-                </ask:lineSketchStyleProps>
-              </a:ext>
-            </a:extLst>
-          </a:ln>
-        </p:spPr>
-        <p:style>
-          <a:lnRef idx="2">
-            <a:schemeClr val="accent1">
-              <a:shade val="50000"/>
-            </a:schemeClr>
-          </a:lnRef>
-          <a:fillRef idx="1">
-            <a:schemeClr val="accent1"/>
-          </a:fillRef>
-          <a:effectRef idx="0">
-            <a:schemeClr val="accent1"/>
-          </a:effectRef>
-          <a:fontRef idx="minor">
-            <a:schemeClr val="lt1"/>
-          </a:fontRef>
-        </p:style>
-        <p:txBody>
-          <a:bodyPr rtlCol="0" anchor="ctr"/>
-          <a:lstStyle/>
-          <a:p>
-            <a:pPr algn="ctr"/>
-            <a:endParaRPr lang="en-US"/>
-          </a:p>
-        </p:txBody>
-      </p:sp>
-      <p:sp>
-        <p:nvSpPr>
-          <p:cNvPr id="9" name="Content Placeholder 8">
-            <a:extLst>
-              <a:ext uri="{FF2B5EF4-FFF2-40B4-BE49-F238E27FC236}">
-                <a16:creationId xmlns:a16="http://schemas.microsoft.com/office/drawing/2014/main" id="{6587E8D0-A7AB-C8BA-C7C7-86FEE2105C0B}"/>
-              </a:ext>
-            </a:extLst>
-          </p:cNvPr>
-          <p:cNvSpPr>
-            <a:spLocks noGrp="1"/>
-          </p:cNvSpPr>
-          <p:nvPr>
-            <p:ph idx="1"/>
-          </p:nvPr>
-        </p:nvSpPr>
-        <p:spPr>
-          <a:xfrm>
-            <a:off x="640080" y="2872899"/>
-            <a:ext cx="4243589" cy="3320668"/>
-          </a:xfrm>
-        </p:spPr>
-        <p:txBody>
-          <a:bodyPr>
-            <a:normAutofit/>
-          </a:bodyPr>
-          <a:lstStyle/>
-          <a:p>
-            <a:r>
-              <a:rPr lang="en-US" sz="2200" dirty="0"/>
-              <a:t>Definition of the components inside the traffic light.</a:t>
-            </a:r>
-          </a:p>
-        </p:txBody>
-      </p:sp>
-      <p:pic>
-        <p:nvPicPr>
-          <p:cNvPr id="4" name="Picture 3" descr="A screenshot of a computer&#10;&#10;Description automatically generated">
-            <a:extLst>
-              <a:ext uri="{FF2B5EF4-FFF2-40B4-BE49-F238E27FC236}">
-                <a16:creationId xmlns:a16="http://schemas.microsoft.com/office/drawing/2014/main" id="{FC82363D-8C1A-48E1-1BF7-4F2699F398CC}"/>
-              </a:ext>
-            </a:extLst>
-          </p:cNvPr>
-          <p:cNvPicPr>
-            <a:picLocks noChangeAspect="1"/>
-          </p:cNvPicPr>
-          <p:nvPr/>
-        </p:nvPicPr>
-        <p:blipFill rotWithShape="1">
-          <a:blip r:embed="rId2">
-            <a:extLst>
-              <a:ext uri="{28A0092B-C50C-407E-A947-70E740481C1C}">
-                <a14:useLocalDpi xmlns:a14="http://schemas.microsoft.com/office/drawing/2010/main" val="0"/>
-              </a:ext>
-            </a:extLst>
-          </a:blip>
-          <a:srcRect r="15998" b="2"/>
-          <a:stretch/>
-        </p:blipFill>
-        <p:spPr>
-          <a:xfrm>
-            <a:off x="5311702" y="10"/>
-            <a:ext cx="6878775" cy="6857990"/>
-          </a:xfrm>
-          <a:custGeom>
-            <a:avLst/>
-            <a:gdLst/>
-            <a:ahLst/>
-            <a:cxnLst/>
-            <a:rect l="l" t="t" r="r" b="b"/>
-            <a:pathLst>
-              <a:path w="6878775" h="6858000">
-                <a:moveTo>
-                  <a:pt x="1102973" y="0"/>
-                </a:moveTo>
-                <a:lnTo>
-                  <a:pt x="1160688" y="0"/>
-                </a:lnTo>
-                <a:lnTo>
-                  <a:pt x="983189" y="331786"/>
-                </a:lnTo>
-                <a:cubicBezTo>
-                  <a:pt x="914866" y="469145"/>
-                  <a:pt x="850355" y="608712"/>
-                  <a:pt x="789261" y="750263"/>
-                </a:cubicBezTo>
-                <a:cubicBezTo>
-                  <a:pt x="774307" y="784928"/>
-                  <a:pt x="759992" y="819849"/>
-                  <a:pt x="745295" y="854514"/>
-                </a:cubicBezTo>
-                <a:cubicBezTo>
-                  <a:pt x="756682" y="845393"/>
-                  <a:pt x="765489" y="833492"/>
-                  <a:pt x="770857" y="819975"/>
-                </a:cubicBezTo>
-                <a:cubicBezTo>
-                  <a:pt x="879943" y="589569"/>
-                  <a:pt x="999605" y="365513"/>
-                  <a:pt x="1131329" y="148742"/>
-                </a:cubicBezTo>
-                <a:lnTo>
-                  <a:pt x="1227589" y="0"/>
-                </a:lnTo>
-                <a:lnTo>
-                  <a:pt x="6878775" y="0"/>
-                </a:lnTo>
-                <a:lnTo>
-                  <a:pt x="6878775" y="6858000"/>
-                </a:lnTo>
-                <a:lnTo>
-                  <a:pt x="713521" y="6858000"/>
-                </a:lnTo>
-                <a:lnTo>
-                  <a:pt x="625642" y="6670527"/>
-                </a:lnTo>
-                <a:cubicBezTo>
-                  <a:pt x="507232" y="6398531"/>
-                  <a:pt x="403083" y="6118381"/>
-                  <a:pt x="312785" y="5830359"/>
-                </a:cubicBezTo>
-                <a:cubicBezTo>
-                  <a:pt x="278149" y="5719759"/>
-                  <a:pt x="248879" y="5607635"/>
-                  <a:pt x="212198" y="5480401"/>
-                </a:cubicBezTo>
-                <a:cubicBezTo>
-                  <a:pt x="212208" y="5491601"/>
-                  <a:pt x="212803" y="5502788"/>
-                  <a:pt x="213988" y="5513923"/>
-                </a:cubicBezTo>
-                <a:cubicBezTo>
-                  <a:pt x="264089" y="5723695"/>
-                  <a:pt x="307290" y="5935370"/>
-                  <a:pt x="365826" y="6142729"/>
-                </a:cubicBezTo>
-                <a:cubicBezTo>
-                  <a:pt x="433152" y="6380817"/>
-                  <a:pt x="510068" y="6614016"/>
-                  <a:pt x="597975" y="6841549"/>
-                </a:cubicBezTo>
-                <a:lnTo>
-                  <a:pt x="604824" y="6858000"/>
-                </a:lnTo>
-                <a:lnTo>
-                  <a:pt x="552056" y="6858000"/>
-                </a:lnTo>
-                <a:lnTo>
-                  <a:pt x="539576" y="6828295"/>
-                </a:lnTo>
-                <a:cubicBezTo>
-                  <a:pt x="380597" y="6414594"/>
-                  <a:pt x="260223" y="5988893"/>
-                  <a:pt x="171555" y="5552906"/>
-                </a:cubicBezTo>
-                <a:cubicBezTo>
-                  <a:pt x="91163" y="5157998"/>
-                  <a:pt x="43746" y="4758899"/>
-                  <a:pt x="12305" y="4357388"/>
-                </a:cubicBezTo>
-                <a:cubicBezTo>
-                  <a:pt x="-14281" y="4013908"/>
-                  <a:pt x="4507" y="3672965"/>
-                  <a:pt x="46684" y="3331516"/>
-                </a:cubicBezTo>
-                <a:cubicBezTo>
-                  <a:pt x="127203" y="2664286"/>
-                  <a:pt x="277819" y="2007265"/>
-                  <a:pt x="496065" y="1371196"/>
-                </a:cubicBezTo>
-                <a:cubicBezTo>
-                  <a:pt x="636273" y="966066"/>
-                  <a:pt x="800445" y="573253"/>
-                  <a:pt x="995723" y="196614"/>
-                </a:cubicBezTo>
-                <a:close/>
-              </a:path>
-            </a:pathLst>
-          </a:custGeom>
-        </p:spPr>
-      </p:pic>
-    </p:spTree>
-    <p:extLst>
-      <p:ext uri="{BB962C8B-B14F-4D97-AF65-F5344CB8AC3E}">
-        <p14:creationId xmlns:p14="http://schemas.microsoft.com/office/powerpoint/2010/main" val="3873958600"/>
       </p:ext>
     </p:extLst>
   </p:cSld>
@@ -8337,10 +8546,10 @@
       </p:grpSpPr>
       <p:sp useBgFill="1">
         <p:nvSpPr>
-          <p:cNvPr id="25" name="Rectangle 24">
-            <a:extLst>
-              <a:ext uri="{FF2B5EF4-FFF2-40B4-BE49-F238E27FC236}">
-                <a16:creationId xmlns:a16="http://schemas.microsoft.com/office/drawing/2014/main" id="{2B97F24A-32CE-4C1C-A50D-3016B394DCFB}"/>
+          <p:cNvPr id="26" name="Rectangle 25">
+            <a:extLst>
+              <a:ext uri="{FF2B5EF4-FFF2-40B4-BE49-F238E27FC236}">
+                <a16:creationId xmlns:a16="http://schemas.microsoft.com/office/drawing/2014/main" id="{F13C74B1-5B17-4795-BED0-7140497B445A}"/>
               </a:ext>
               <a:ext uri="{C183D7F6-B498-43B3-948B-1728B52AA6E4}">
                 <adec:decorative xmlns:adec="http://schemas.microsoft.com/office/drawing/2017/decorative" val="1"/>
@@ -8361,7 +8570,7 @@
         <p:spPr>
           <a:xfrm>
             <a:off x="0" y="0"/>
-            <a:ext cx="12192000" cy="6858000"/>
+            <a:ext cx="12188952" cy="6858000"/>
           </a:xfrm>
           <a:prstGeom prst="rect">
             <a:avLst/>
@@ -8413,8 +8622,8 @@
         </p:nvSpPr>
         <p:spPr>
           <a:xfrm>
-            <a:off x="630936" y="639520"/>
-            <a:ext cx="3429000" cy="1719072"/>
+            <a:off x="640080" y="325369"/>
+            <a:ext cx="4368602" cy="1956841"/>
           </a:xfrm>
         </p:spPr>
         <p:txBody>
@@ -8425,7 +8634,7 @@
           <a:p>
             <a:r>
               <a:rPr lang="en-US" sz="5400" dirty="0"/>
-              <a:t>Lightning System</a:t>
+              <a:t>Traffic Lamp</a:t>
             </a:r>
             <a:endParaRPr lang="en-DE" sz="5400" dirty="0"/>
           </a:p>
@@ -8433,10 +8642,10 @@
       </p:sp>
       <p:sp>
         <p:nvSpPr>
-          <p:cNvPr id="27" name="sketch line">
-            <a:extLst>
-              <a:ext uri="{FF2B5EF4-FFF2-40B4-BE49-F238E27FC236}">
-                <a16:creationId xmlns:a16="http://schemas.microsoft.com/office/drawing/2014/main" id="{CD8B4F24-440B-49E9-B85D-733523DC064B}"/>
+          <p:cNvPr id="28" name="sketchy line">
+            <a:extLst>
+              <a:ext uri="{FF2B5EF4-FFF2-40B4-BE49-F238E27FC236}">
+                <a16:creationId xmlns:a16="http://schemas.microsoft.com/office/drawing/2014/main" id="{D4974D33-8DC5-464E-8C6D-BE58F0669C17}"/>
               </a:ext>
               <a:ext uri="{C183D7F6-B498-43B3-948B-1728B52AA6E4}">
                 <adec:decorative xmlns:adec="http://schemas.microsoft.com/office/drawing/2017/decorative" val="1"/>
@@ -8456,36 +8665,38 @@
         </p:nvSpPr>
         <p:spPr>
           <a:xfrm>
-            <a:off x="643278" y="2573756"/>
-            <a:ext cx="3255095" cy="18288"/>
+            <a:off x="640080" y="2586994"/>
+            <a:ext cx="3474720" cy="18288"/>
           </a:xfrm>
           <a:custGeom>
             <a:avLst/>
             <a:gdLst>
-              <a:gd name="connsiteX0" fmla="*/ 0 w 3255095"/>
+              <a:gd name="connsiteX0" fmla="*/ 0 w 3474720"/>
               <a:gd name="connsiteY0" fmla="*/ 0 h 18288"/>
-              <a:gd name="connsiteX1" fmla="*/ 618468 w 3255095"/>
+              <a:gd name="connsiteX1" fmla="*/ 694944 w 3474720"/>
               <a:gd name="connsiteY1" fmla="*/ 0 h 18288"/>
-              <a:gd name="connsiteX2" fmla="*/ 1269487 w 3255095"/>
+              <a:gd name="connsiteX2" fmla="*/ 1355141 w 3474720"/>
               <a:gd name="connsiteY2" fmla="*/ 0 h 18288"/>
-              <a:gd name="connsiteX3" fmla="*/ 1953057 w 3255095"/>
+              <a:gd name="connsiteX3" fmla="*/ 2015338 w 3474720"/>
               <a:gd name="connsiteY3" fmla="*/ 0 h 18288"/>
-              <a:gd name="connsiteX4" fmla="*/ 2636627 w 3255095"/>
+              <a:gd name="connsiteX4" fmla="*/ 2779776 w 3474720"/>
               <a:gd name="connsiteY4" fmla="*/ 0 h 18288"/>
-              <a:gd name="connsiteX5" fmla="*/ 3255095 w 3255095"/>
+              <a:gd name="connsiteX5" fmla="*/ 3474720 w 3474720"/>
               <a:gd name="connsiteY5" fmla="*/ 0 h 18288"/>
-              <a:gd name="connsiteX6" fmla="*/ 3255095 w 3255095"/>
+              <a:gd name="connsiteX6" fmla="*/ 3474720 w 3474720"/>
               <a:gd name="connsiteY6" fmla="*/ 18288 h 18288"/>
-              <a:gd name="connsiteX7" fmla="*/ 2538974 w 3255095"/>
+              <a:gd name="connsiteX7" fmla="*/ 2779776 w 3474720"/>
               <a:gd name="connsiteY7" fmla="*/ 18288 h 18288"/>
-              <a:gd name="connsiteX8" fmla="*/ 1822853 w 3255095"/>
+              <a:gd name="connsiteX8" fmla="*/ 2189074 w 3474720"/>
               <a:gd name="connsiteY8" fmla="*/ 18288 h 18288"/>
-              <a:gd name="connsiteX9" fmla="*/ 1171834 w 3255095"/>
+              <a:gd name="connsiteX9" fmla="*/ 1528877 w 3474720"/>
               <a:gd name="connsiteY9" fmla="*/ 18288 h 18288"/>
-              <a:gd name="connsiteX10" fmla="*/ 0 w 3255095"/>
+              <a:gd name="connsiteX10" fmla="*/ 868680 w 3474720"/>
               <a:gd name="connsiteY10" fmla="*/ 18288 h 18288"/>
-              <a:gd name="connsiteX11" fmla="*/ 0 w 3255095"/>
-              <a:gd name="connsiteY11" fmla="*/ 0 h 18288"/>
+              <a:gd name="connsiteX11" fmla="*/ 0 w 3474720"/>
+              <a:gd name="connsiteY11" fmla="*/ 18288 h 18288"/>
+              <a:gd name="connsiteX12" fmla="*/ 0 w 3474720"/>
+              <a:gd name="connsiteY12" fmla="*/ 0 h 18288"/>
             </a:gdLst>
             <a:ahLst/>
             <a:cxnLst>
@@ -8525,132 +8736,140 @@
               <a:cxn ang="0">
                 <a:pos x="connsiteX11" y="connsiteY11"/>
               </a:cxn>
+              <a:cxn ang="0">
+                <a:pos x="connsiteX12" y="connsiteY12"/>
+              </a:cxn>
             </a:cxnLst>
             <a:rect l="l" t="t" r="r" b="b"/>
             <a:pathLst>
-              <a:path w="3255095" h="18288" fill="none" extrusionOk="0">
+              <a:path w="3474720" h="18288" fill="none" extrusionOk="0">
                 <a:moveTo>
                   <a:pt x="0" y="0"/>
                 </a:moveTo>
                 <a:cubicBezTo>
-                  <a:pt x="240201" y="-22123"/>
-                  <a:pt x="462021" y="-19623"/>
-                  <a:pt x="618468" y="0"/>
-                </a:cubicBezTo>
-                <a:cubicBezTo>
-                  <a:pt x="774915" y="19623"/>
-                  <a:pt x="974734" y="2035"/>
-                  <a:pt x="1269487" y="0"/>
-                </a:cubicBezTo>
-                <a:cubicBezTo>
-                  <a:pt x="1564240" y="-2035"/>
-                  <a:pt x="1733579" y="10639"/>
-                  <a:pt x="1953057" y="0"/>
-                </a:cubicBezTo>
-                <a:cubicBezTo>
-                  <a:pt x="2172535" y="-10639"/>
-                  <a:pt x="2453962" y="14018"/>
-                  <a:pt x="2636627" y="0"/>
-                </a:cubicBezTo>
-                <a:cubicBezTo>
-                  <a:pt x="2819292" y="-14018"/>
-                  <a:pt x="3121375" y="5399"/>
-                  <a:pt x="3255095" y="0"/>
-                </a:cubicBezTo>
-                <a:cubicBezTo>
-                  <a:pt x="3254386" y="8157"/>
-                  <a:pt x="3254682" y="12125"/>
-                  <a:pt x="3255095" y="18288"/>
-                </a:cubicBezTo>
-                <a:cubicBezTo>
-                  <a:pt x="3088545" y="23203"/>
-                  <a:pt x="2687475" y="7419"/>
-                  <a:pt x="2538974" y="18288"/>
-                </a:cubicBezTo>
-                <a:cubicBezTo>
-                  <a:pt x="2390473" y="29157"/>
-                  <a:pt x="2137381" y="-8959"/>
-                  <a:pt x="1822853" y="18288"/>
-                </a:cubicBezTo>
-                <a:cubicBezTo>
-                  <a:pt x="1508325" y="45535"/>
-                  <a:pt x="1466437" y="20385"/>
-                  <a:pt x="1171834" y="18288"/>
-                </a:cubicBezTo>
-                <a:cubicBezTo>
-                  <a:pt x="877231" y="16191"/>
-                  <a:pt x="561097" y="37643"/>
+                  <a:pt x="224454" y="-14544"/>
+                  <a:pt x="495407" y="26540"/>
+                  <a:pt x="694944" y="0"/>
+                </a:cubicBezTo>
+                <a:cubicBezTo>
+                  <a:pt x="894481" y="-26540"/>
+                  <a:pt x="1130063" y="24713"/>
+                  <a:pt x="1355141" y="0"/>
+                </a:cubicBezTo>
+                <a:cubicBezTo>
+                  <a:pt x="1580219" y="-24713"/>
+                  <a:pt x="1820099" y="26695"/>
+                  <a:pt x="2015338" y="0"/>
+                </a:cubicBezTo>
+                <a:cubicBezTo>
+                  <a:pt x="2210577" y="-26695"/>
+                  <a:pt x="2402045" y="165"/>
+                  <a:pt x="2779776" y="0"/>
+                </a:cubicBezTo>
+                <a:cubicBezTo>
+                  <a:pt x="3157507" y="-165"/>
+                  <a:pt x="3286859" y="-15571"/>
+                  <a:pt x="3474720" y="0"/>
+                </a:cubicBezTo>
+                <a:cubicBezTo>
+                  <a:pt x="3474286" y="7551"/>
+                  <a:pt x="3474253" y="9822"/>
+                  <a:pt x="3474720" y="18288"/>
+                </a:cubicBezTo>
+                <a:cubicBezTo>
+                  <a:pt x="3233904" y="29845"/>
+                  <a:pt x="2945134" y="-5256"/>
+                  <a:pt x="2779776" y="18288"/>
+                </a:cubicBezTo>
+                <a:cubicBezTo>
+                  <a:pt x="2614418" y="41832"/>
+                  <a:pt x="2339768" y="22709"/>
+                  <a:pt x="2189074" y="18288"/>
+                </a:cubicBezTo>
+                <a:cubicBezTo>
+                  <a:pt x="2038380" y="13867"/>
+                  <a:pt x="1817434" y="-4947"/>
+                  <a:pt x="1528877" y="18288"/>
+                </a:cubicBezTo>
+                <a:cubicBezTo>
+                  <a:pt x="1240320" y="41523"/>
+                  <a:pt x="1042447" y="37198"/>
+                  <a:pt x="868680" y="18288"/>
+                </a:cubicBezTo>
+                <a:cubicBezTo>
+                  <a:pt x="694913" y="-622"/>
+                  <a:pt x="233232" y="44909"/>
                   <a:pt x="0" y="18288"/>
                 </a:cubicBezTo>
                 <a:cubicBezTo>
-                  <a:pt x="-46" y="12483"/>
-                  <a:pt x="-203" y="6491"/>
+                  <a:pt x="60" y="11696"/>
+                  <a:pt x="66" y="3758"/>
                   <a:pt x="0" y="0"/>
                 </a:cubicBezTo>
                 <a:close/>
               </a:path>
-              <a:path w="3255095" h="18288" stroke="0" extrusionOk="0">
+              <a:path w="3474720" h="18288" stroke="0" extrusionOk="0">
                 <a:moveTo>
                   <a:pt x="0" y="0"/>
                 </a:moveTo>
                 <a:cubicBezTo>
-                  <a:pt x="291965" y="19429"/>
-                  <a:pt x="363155" y="8568"/>
-                  <a:pt x="618468" y="0"/>
-                </a:cubicBezTo>
-                <a:cubicBezTo>
-                  <a:pt x="873781" y="-8568"/>
-                  <a:pt x="904459" y="-19505"/>
-                  <a:pt x="1171834" y="0"/>
-                </a:cubicBezTo>
-                <a:cubicBezTo>
-                  <a:pt x="1439209" y="19505"/>
-                  <a:pt x="1744369" y="9790"/>
-                  <a:pt x="1887955" y="0"/>
-                </a:cubicBezTo>
-                <a:cubicBezTo>
-                  <a:pt x="2031541" y="-9790"/>
-                  <a:pt x="2346378" y="21240"/>
-                  <a:pt x="2506423" y="0"/>
-                </a:cubicBezTo>
-                <a:cubicBezTo>
-                  <a:pt x="2666468" y="-21240"/>
-                  <a:pt x="2990257" y="30414"/>
-                  <a:pt x="3255095" y="0"/>
-                </a:cubicBezTo>
-                <a:cubicBezTo>
-                  <a:pt x="3254831" y="4493"/>
-                  <a:pt x="3255479" y="9472"/>
-                  <a:pt x="3255095" y="18288"/>
-                </a:cubicBezTo>
-                <a:cubicBezTo>
-                  <a:pt x="3120743" y="16690"/>
-                  <a:pt x="2759628" y="42462"/>
-                  <a:pt x="2604076" y="18288"/>
-                </a:cubicBezTo>
-                <a:cubicBezTo>
-                  <a:pt x="2448524" y="-5886"/>
-                  <a:pt x="2184336" y="19599"/>
-                  <a:pt x="1887955" y="18288"/>
-                </a:cubicBezTo>
-                <a:cubicBezTo>
-                  <a:pt x="1591574" y="16977"/>
-                  <a:pt x="1548845" y="6870"/>
-                  <a:pt x="1334589" y="18288"/>
-                </a:cubicBezTo>
-                <a:cubicBezTo>
-                  <a:pt x="1120333" y="29706"/>
-                  <a:pt x="996014" y="9662"/>
-                  <a:pt x="683570" y="18288"/>
-                </a:cubicBezTo>
-                <a:cubicBezTo>
-                  <a:pt x="371126" y="26914"/>
-                  <a:pt x="198687" y="16167"/>
+                  <a:pt x="202328" y="-14716"/>
+                  <a:pt x="332722" y="-11499"/>
+                  <a:pt x="625450" y="0"/>
+                </a:cubicBezTo>
+                <a:cubicBezTo>
+                  <a:pt x="918178" y="11499"/>
+                  <a:pt x="1096688" y="5123"/>
+                  <a:pt x="1389888" y="0"/>
+                </a:cubicBezTo>
+                <a:cubicBezTo>
+                  <a:pt x="1683088" y="-5123"/>
+                  <a:pt x="1835981" y="-14038"/>
+                  <a:pt x="1980590" y="0"/>
+                </a:cubicBezTo>
+                <a:cubicBezTo>
+                  <a:pt x="2125199" y="14038"/>
+                  <a:pt x="2396099" y="-7203"/>
+                  <a:pt x="2571293" y="0"/>
+                </a:cubicBezTo>
+                <a:cubicBezTo>
+                  <a:pt x="2746487" y="7203"/>
+                  <a:pt x="3041609" y="-12036"/>
+                  <a:pt x="3474720" y="0"/>
+                </a:cubicBezTo>
+                <a:cubicBezTo>
+                  <a:pt x="3474638" y="4406"/>
+                  <a:pt x="3474631" y="9982"/>
+                  <a:pt x="3474720" y="18288"/>
+                </a:cubicBezTo>
+                <a:cubicBezTo>
+                  <a:pt x="3324873" y="21876"/>
+                  <a:pt x="3136771" y="12587"/>
+                  <a:pt x="2814523" y="18288"/>
+                </a:cubicBezTo>
+                <a:cubicBezTo>
+                  <a:pt x="2492275" y="23989"/>
+                  <a:pt x="2294402" y="47111"/>
+                  <a:pt x="2154326" y="18288"/>
+                </a:cubicBezTo>
+                <a:cubicBezTo>
+                  <a:pt x="2014250" y="-10535"/>
+                  <a:pt x="1820317" y="33903"/>
+                  <a:pt x="1494130" y="18288"/>
+                </a:cubicBezTo>
+                <a:cubicBezTo>
+                  <a:pt x="1167943" y="2673"/>
+                  <a:pt x="948432" y="14868"/>
+                  <a:pt x="729691" y="18288"/>
+                </a:cubicBezTo>
+                <a:cubicBezTo>
+                  <a:pt x="510950" y="21708"/>
+                  <a:pt x="264032" y="24354"/>
                   <a:pt x="0" y="18288"/>
                 </a:cubicBezTo>
                 <a:cubicBezTo>
-                  <a:pt x="843" y="9577"/>
-                  <a:pt x="371" y="6900"/>
+                  <a:pt x="189" y="14288"/>
+                  <a:pt x="-703" y="3747"/>
                   <a:pt x="0" y="0"/>
                 </a:cubicBezTo>
                 <a:close/>
@@ -8660,14 +8879,14 @@
           <a:solidFill>
             <a:schemeClr val="accent2"/>
           </a:solidFill>
-          <a:ln w="38100" cap="rnd">
+          <a:ln w="44450" cap="rnd">
             <a:solidFill>
               <a:schemeClr val="accent2"/>
             </a:solidFill>
             <a:round/>
             <a:extLst>
               <a:ext uri="{C807C97D-BFC1-408E-A445-0C87EB9F89A2}">
-                <ask:lineSketchStyleProps xmlns:ask="http://schemas.microsoft.com/office/drawing/2018/sketchyshapes" sd="1219033472">
+                <ask:lineSketchStyleProps xmlns:ask="http://schemas.microsoft.com/office/drawing/2018/sketchyshapes" sd="2863741219">
                   <a:prstGeom prst="rect">
                     <a:avLst/>
                   </a:prstGeom>
@@ -8722,12 +8941,12 @@
         </p:nvSpPr>
         <p:spPr>
           <a:xfrm>
-            <a:off x="630936" y="2807208"/>
-            <a:ext cx="3429000" cy="3410712"/>
+            <a:off x="640080" y="2872899"/>
+            <a:ext cx="4243589" cy="3320668"/>
           </a:xfrm>
         </p:spPr>
         <p:txBody>
-          <a:bodyPr anchor="t">
+          <a:bodyPr>
             <a:normAutofit/>
           </a:bodyPr>
           <a:lstStyle/>
@@ -8741,10 +8960,10 @@
       </p:sp>
       <p:pic>
         <p:nvPicPr>
-          <p:cNvPr id="7" name="Picture 6" descr="A screenshot of a computer&#10;&#10;Description automatically generated">
-            <a:extLst>
-              <a:ext uri="{FF2B5EF4-FFF2-40B4-BE49-F238E27FC236}">
-                <a16:creationId xmlns:a16="http://schemas.microsoft.com/office/drawing/2014/main" id="{7C8A1DC3-AFB6-55F9-5639-F80F729E651A}"/>
+          <p:cNvPr id="4" name="Picture 3" descr="A screenshot of a computer&#10;&#10;Description automatically generated">
+            <a:extLst>
+              <a:ext uri="{FF2B5EF4-FFF2-40B4-BE49-F238E27FC236}">
+                <a16:creationId xmlns:a16="http://schemas.microsoft.com/office/drawing/2014/main" id="{FC82363D-8C1A-48E1-1BF7-4F2699F398CC}"/>
               </a:ext>
             </a:extLst>
           </p:cNvPr>
@@ -8753,7 +8972,7 @@
           </p:cNvPicPr>
           <p:nvPr/>
         </p:nvPicPr>
-        <p:blipFill>
+        <p:blipFill rotWithShape="1">
           <a:blip r:embed="rId2">
             <a:extLst>
               <a:ext uri="{28A0092B-C50C-407E-A947-70E740481C1C}">
@@ -8761,24 +8980,135 @@
               </a:ext>
             </a:extLst>
           </a:blip>
-          <a:stretch>
-            <a:fillRect/>
-          </a:stretch>
+          <a:srcRect r="15998" b="2"/>
+          <a:stretch/>
         </p:blipFill>
         <p:spPr>
           <a:xfrm>
-            <a:off x="4654296" y="1047217"/>
-            <a:ext cx="6903720" cy="4763566"/>
+            <a:off x="5311702" y="10"/>
+            <a:ext cx="6878775" cy="6857990"/>
           </a:xfrm>
-          <a:prstGeom prst="rect">
+          <a:custGeom>
             <a:avLst/>
-          </a:prstGeom>
+            <a:gdLst/>
+            <a:ahLst/>
+            <a:cxnLst/>
+            <a:rect l="l" t="t" r="r" b="b"/>
+            <a:pathLst>
+              <a:path w="6878775" h="6858000">
+                <a:moveTo>
+                  <a:pt x="1102973" y="0"/>
+                </a:moveTo>
+                <a:lnTo>
+                  <a:pt x="1160688" y="0"/>
+                </a:lnTo>
+                <a:lnTo>
+                  <a:pt x="983189" y="331786"/>
+                </a:lnTo>
+                <a:cubicBezTo>
+                  <a:pt x="914866" y="469145"/>
+                  <a:pt x="850355" y="608712"/>
+                  <a:pt x="789261" y="750263"/>
+                </a:cubicBezTo>
+                <a:cubicBezTo>
+                  <a:pt x="774307" y="784928"/>
+                  <a:pt x="759992" y="819849"/>
+                  <a:pt x="745295" y="854514"/>
+                </a:cubicBezTo>
+                <a:cubicBezTo>
+                  <a:pt x="756682" y="845393"/>
+                  <a:pt x="765489" y="833492"/>
+                  <a:pt x="770857" y="819975"/>
+                </a:cubicBezTo>
+                <a:cubicBezTo>
+                  <a:pt x="879943" y="589569"/>
+                  <a:pt x="999605" y="365513"/>
+                  <a:pt x="1131329" y="148742"/>
+                </a:cubicBezTo>
+                <a:lnTo>
+                  <a:pt x="1227589" y="0"/>
+                </a:lnTo>
+                <a:lnTo>
+                  <a:pt x="6878775" y="0"/>
+                </a:lnTo>
+                <a:lnTo>
+                  <a:pt x="6878775" y="6858000"/>
+                </a:lnTo>
+                <a:lnTo>
+                  <a:pt x="713521" y="6858000"/>
+                </a:lnTo>
+                <a:lnTo>
+                  <a:pt x="625642" y="6670527"/>
+                </a:lnTo>
+                <a:cubicBezTo>
+                  <a:pt x="507232" y="6398531"/>
+                  <a:pt x="403083" y="6118381"/>
+                  <a:pt x="312785" y="5830359"/>
+                </a:cubicBezTo>
+                <a:cubicBezTo>
+                  <a:pt x="278149" y="5719759"/>
+                  <a:pt x="248879" y="5607635"/>
+                  <a:pt x="212198" y="5480401"/>
+                </a:cubicBezTo>
+                <a:cubicBezTo>
+                  <a:pt x="212208" y="5491601"/>
+                  <a:pt x="212803" y="5502788"/>
+                  <a:pt x="213988" y="5513923"/>
+                </a:cubicBezTo>
+                <a:cubicBezTo>
+                  <a:pt x="264089" y="5723695"/>
+                  <a:pt x="307290" y="5935370"/>
+                  <a:pt x="365826" y="6142729"/>
+                </a:cubicBezTo>
+                <a:cubicBezTo>
+                  <a:pt x="433152" y="6380817"/>
+                  <a:pt x="510068" y="6614016"/>
+                  <a:pt x="597975" y="6841549"/>
+                </a:cubicBezTo>
+                <a:lnTo>
+                  <a:pt x="604824" y="6858000"/>
+                </a:lnTo>
+                <a:lnTo>
+                  <a:pt x="552056" y="6858000"/>
+                </a:lnTo>
+                <a:lnTo>
+                  <a:pt x="539576" y="6828295"/>
+                </a:lnTo>
+                <a:cubicBezTo>
+                  <a:pt x="380597" y="6414594"/>
+                  <a:pt x="260223" y="5988893"/>
+                  <a:pt x="171555" y="5552906"/>
+                </a:cubicBezTo>
+                <a:cubicBezTo>
+                  <a:pt x="91163" y="5157998"/>
+                  <a:pt x="43746" y="4758899"/>
+                  <a:pt x="12305" y="4357388"/>
+                </a:cubicBezTo>
+                <a:cubicBezTo>
+                  <a:pt x="-14281" y="4013908"/>
+                  <a:pt x="4507" y="3672965"/>
+                  <a:pt x="46684" y="3331516"/>
+                </a:cubicBezTo>
+                <a:cubicBezTo>
+                  <a:pt x="127203" y="2664286"/>
+                  <a:pt x="277819" y="2007265"/>
+                  <a:pt x="496065" y="1371196"/>
+                </a:cubicBezTo>
+                <a:cubicBezTo>
+                  <a:pt x="636273" y="966066"/>
+                  <a:pt x="800445" y="573253"/>
+                  <a:pt x="995723" y="196614"/>
+                </a:cubicBezTo>
+                <a:close/>
+              </a:path>
+            </a:pathLst>
+          </a:custGeom>
         </p:spPr>
       </p:pic>
     </p:spTree>
     <p:extLst>
       <p:ext uri="{BB962C8B-B14F-4D97-AF65-F5344CB8AC3E}">
-        <p14:creationId xmlns:p14="http://schemas.microsoft.com/office/powerpoint/2010/main" val="706287446"/>
+        <p14:creationId xmlns:p14="http://schemas.microsoft.com/office/powerpoint/2010/main" val="3873958600"/>
       </p:ext>
     </p:extLst>
   </p:cSld>
@@ -8907,7 +9237,7 @@
       </p:grpSpPr>
       <p:sp useBgFill="1">
         <p:nvSpPr>
-          <p:cNvPr id="21" name="Rectangle 20">
+          <p:cNvPr id="25" name="Rectangle 24">
             <a:extLst>
               <a:ext uri="{FF2B5EF4-FFF2-40B4-BE49-F238E27FC236}">
                 <a16:creationId xmlns:a16="http://schemas.microsoft.com/office/drawing/2014/main" id="{2B97F24A-32CE-4C1C-A50D-3016B394DCFB}"/>
@@ -8994,16 +9324,16 @@
           <a:lstStyle/>
           <a:p>
             <a:r>
-              <a:rPr lang="en-US" sz="4600"/>
-              <a:t>Internal State Machine</a:t>
+              <a:rPr lang="en-US" sz="5400" dirty="0"/>
+              <a:t>Lightning System</a:t>
             </a:r>
-            <a:endParaRPr lang="en-DE" sz="4600"/>
+            <a:endParaRPr lang="en-DE" sz="5400" dirty="0"/>
           </a:p>
         </p:txBody>
       </p:sp>
       <p:sp>
         <p:nvSpPr>
-          <p:cNvPr id="23" name="sketch line">
+          <p:cNvPr id="27" name="sketch line">
             <a:extLst>
               <a:ext uri="{FF2B5EF4-FFF2-40B4-BE49-F238E27FC236}">
                 <a16:creationId xmlns:a16="http://schemas.microsoft.com/office/drawing/2014/main" id="{CD8B4F24-440B-49E9-B85D-733523DC064B}"/>
@@ -9304,23 +9634,17 @@
           <a:p>
             <a:r>
               <a:rPr lang="en-US" sz="2200" dirty="0"/>
-              <a:t>Definition of the most basic state machine of a traffic light.</a:t>
-            </a:r>
-          </a:p>
-          <a:p>
-            <a:r>
-              <a:rPr lang="en-US" sz="2200" dirty="0"/>
-              <a:t>Refinement of the state machine to accommodate our use case scenario.</a:t>
+              <a:t>Definition of the components inside the traffic light.</a:t>
             </a:r>
           </a:p>
         </p:txBody>
       </p:sp>
       <p:pic>
         <p:nvPicPr>
-          <p:cNvPr id="4" name="Picture 3" descr="A diagram of a machine&#10;&#10;Description automatically generated">
-            <a:extLst>
-              <a:ext uri="{FF2B5EF4-FFF2-40B4-BE49-F238E27FC236}">
-                <a16:creationId xmlns:a16="http://schemas.microsoft.com/office/drawing/2014/main" id="{6A52FA51-F15D-558B-042D-16B245E2F3AF}"/>
+          <p:cNvPr id="7" name="Picture 6" descr="A screenshot of a computer&#10;&#10;Description automatically generated">
+            <a:extLst>
+              <a:ext uri="{FF2B5EF4-FFF2-40B4-BE49-F238E27FC236}">
+                <a16:creationId xmlns:a16="http://schemas.microsoft.com/office/drawing/2014/main" id="{7C8A1DC3-AFB6-55F9-5639-F80F729E651A}"/>
               </a:ext>
             </a:extLst>
           </p:cNvPr>
@@ -9343,8 +9667,8 @@
         </p:blipFill>
         <p:spPr>
           <a:xfrm>
-            <a:off x="4654296" y="1029957"/>
-            <a:ext cx="6903720" cy="4798085"/>
+            <a:off x="4654296" y="1047217"/>
+            <a:ext cx="6903720" cy="4763566"/>
           </a:xfrm>
           <a:prstGeom prst="rect">
             <a:avLst/>
@@ -9354,13 +9678,105 @@
     </p:spTree>
     <p:extLst>
       <p:ext uri="{BB962C8B-B14F-4D97-AF65-F5344CB8AC3E}">
-        <p14:creationId xmlns:p14="http://schemas.microsoft.com/office/powerpoint/2010/main" val="2080358371"/>
+        <p14:creationId xmlns:p14="http://schemas.microsoft.com/office/powerpoint/2010/main" val="706287446"/>
       </p:ext>
     </p:extLst>
   </p:cSld>
   <p:clrMapOvr>
     <a:masterClrMapping/>
   </p:clrMapOvr>
+  <p:timing>
+    <p:tnLst>
+      <p:par>
+        <p:cTn id="1" dur="indefinite" restart="never" nodeType="tmRoot">
+          <p:childTnLst>
+            <p:seq concurrent="1" nextAc="seek">
+              <p:cTn id="2" dur="indefinite" nodeType="mainSeq">
+                <p:childTnLst>
+                  <p:par>
+                    <p:cTn id="3" fill="hold">
+                      <p:stCondLst>
+                        <p:cond delay="indefinite"/>
+                        <p:cond evt="onBegin" delay="0">
+                          <p:tn val="2"/>
+                        </p:cond>
+                      </p:stCondLst>
+                      <p:childTnLst>
+                        <p:par>
+                          <p:cTn id="4" fill="hold">
+                            <p:stCondLst>
+                              <p:cond delay="0"/>
+                            </p:stCondLst>
+                            <p:childTnLst>
+                              <p:par>
+                                <p:cTn id="5" presetID="10" presetClass="entr" presetSubtype="0" fill="hold" grpId="0" nodeType="withEffect">
+                                  <p:stCondLst>
+                                    <p:cond delay="1000"/>
+                                  </p:stCondLst>
+                                  <p:iterate>
+                                    <p:tmPct val="10000"/>
+                                  </p:iterate>
+                                  <p:childTnLst>
+                                    <p:set>
+                                      <p:cBhvr>
+                                        <p:cTn id="6" dur="1" fill="hold">
+                                          <p:stCondLst>
+                                            <p:cond delay="0"/>
+                                          </p:stCondLst>
+                                        </p:cTn>
+                                        <p:tgtEl>
+                                          <p:spTgt spid="2"/>
+                                        </p:tgtEl>
+                                        <p:attrNameLst>
+                                          <p:attrName>style.visibility</p:attrName>
+                                        </p:attrNameLst>
+                                      </p:cBhvr>
+                                      <p:to>
+                                        <p:strVal val="visible"/>
+                                      </p:to>
+                                    </p:set>
+                                    <p:animEffect transition="in" filter="fade">
+                                      <p:cBhvr>
+                                        <p:cTn id="7" dur="700"/>
+                                        <p:tgtEl>
+                                          <p:spTgt spid="2"/>
+                                        </p:tgtEl>
+                                      </p:cBhvr>
+                                    </p:animEffect>
+                                  </p:childTnLst>
+                                </p:cTn>
+                              </p:par>
+                            </p:childTnLst>
+                          </p:cTn>
+                        </p:par>
+                      </p:childTnLst>
+                    </p:cTn>
+                  </p:par>
+                </p:childTnLst>
+              </p:cTn>
+              <p:prevCondLst>
+                <p:cond evt="onPrev" delay="0">
+                  <p:tgtEl>
+                    <p:sldTgt/>
+                  </p:tgtEl>
+                </p:cond>
+              </p:prevCondLst>
+              <p:nextCondLst>
+                <p:cond evt="onNext" delay="0">
+                  <p:tgtEl>
+                    <p:sldTgt/>
+                  </p:tgtEl>
+                </p:cond>
+              </p:nextCondLst>
+            </p:seq>
+          </p:childTnLst>
+        </p:cTn>
+      </p:par>
+    </p:tnLst>
+    <p:bldLst>
+      <p:bldP spid="2" grpId="0"/>
+    </p:bldLst>
+  </p:timing>
 </p:sld>
 </file>
 
@@ -9391,10 +9807,10 @@
       </p:grpSpPr>
       <p:sp useBgFill="1">
         <p:nvSpPr>
-          <p:cNvPr id="12" name="Rectangle 11">
-            <a:extLst>
-              <a:ext uri="{FF2B5EF4-FFF2-40B4-BE49-F238E27FC236}">
-                <a16:creationId xmlns:a16="http://schemas.microsoft.com/office/drawing/2014/main" id="{743AA782-23D1-4521-8CAD-47662984AA08}"/>
+          <p:cNvPr id="28" name="Rectangle 27">
+            <a:extLst>
+              <a:ext uri="{FF2B5EF4-FFF2-40B4-BE49-F238E27FC236}">
+                <a16:creationId xmlns:a16="http://schemas.microsoft.com/office/drawing/2014/main" id="{2B97F24A-32CE-4C1C-A50D-3016B394DCFB}"/>
               </a:ext>
               <a:ext uri="{C183D7F6-B498-43B3-948B-1728B52AA6E4}">
                 <adec:decorative xmlns:adec="http://schemas.microsoft.com/office/drawing/2017/decorative" val="1"/>
@@ -9454,7 +9870,7 @@
           <p:cNvPr id="2" name="Title 1">
             <a:extLst>
               <a:ext uri="{FF2B5EF4-FFF2-40B4-BE49-F238E27FC236}">
-                <a16:creationId xmlns:a16="http://schemas.microsoft.com/office/drawing/2014/main" id="{DD687FA7-D417-7872-9C05-38F042AEC890}"/>
+                <a16:creationId xmlns:a16="http://schemas.microsoft.com/office/drawing/2014/main" id="{2CA1D05F-8071-6289-CF59-FA97AEE49972}"/>
               </a:ext>
             </a:extLst>
           </p:cNvPr>
@@ -9467,8 +9883,8 @@
         </p:nvSpPr>
         <p:spPr>
           <a:xfrm>
-            <a:off x="630936" y="640080"/>
-            <a:ext cx="4818888" cy="1481328"/>
+            <a:off x="630936" y="639520"/>
+            <a:ext cx="3429000" cy="1719072"/>
           </a:xfrm>
         </p:spPr>
         <p:txBody>
@@ -9477,16 +9893,20 @@
           </a:bodyPr>
           <a:lstStyle/>
           <a:p>
-            <a:endParaRPr lang="en-DE" sz="5400"/>
+            <a:r>
+              <a:rPr lang="en-US" sz="4600"/>
+              <a:t>Internal State Machine</a:t>
+            </a:r>
+            <a:endParaRPr lang="en-DE" sz="4600"/>
           </a:p>
         </p:txBody>
       </p:sp>
       <p:sp>
         <p:nvSpPr>
-          <p:cNvPr id="14" name="sketch line">
-            <a:extLst>
-              <a:ext uri="{FF2B5EF4-FFF2-40B4-BE49-F238E27FC236}">
-                <a16:creationId xmlns:a16="http://schemas.microsoft.com/office/drawing/2014/main" id="{650D18FE-0824-4A46-B22C-A86B52E5780A}"/>
+          <p:cNvPr id="30" name="sketch line">
+            <a:extLst>
+              <a:ext uri="{FF2B5EF4-FFF2-40B4-BE49-F238E27FC236}">
+                <a16:creationId xmlns:a16="http://schemas.microsoft.com/office/drawing/2014/main" id="{CD8B4F24-440B-49E9-B85D-733523DC064B}"/>
               </a:ext>
               <a:ext uri="{C183D7F6-B498-43B3-948B-1728B52AA6E4}">
                 <adec:decorative xmlns:adec="http://schemas.microsoft.com/office/drawing/2017/decorative" val="1"/>
@@ -9506,7 +9926,7 @@
         </p:nvSpPr>
         <p:spPr>
           <a:xfrm>
-            <a:off x="643278" y="2372868"/>
+            <a:off x="643278" y="2573756"/>
             <a:ext cx="3255095" cy="18288"/>
           </a:xfrm>
           <a:custGeom>
@@ -9759,7 +10179,7 @@
           <p:cNvPr id="9" name="Content Placeholder 8">
             <a:extLst>
               <a:ext uri="{FF2B5EF4-FFF2-40B4-BE49-F238E27FC236}">
-                <a16:creationId xmlns:a16="http://schemas.microsoft.com/office/drawing/2014/main" id="{94DDA1E1-7239-360E-274B-59BECE3CE42C}"/>
+                <a16:creationId xmlns:a16="http://schemas.microsoft.com/office/drawing/2014/main" id="{6587E8D0-A7AB-C8BA-C7C7-86FEE2105C0B}"/>
               </a:ext>
             </a:extLst>
           </p:cNvPr>
@@ -9772,8 +10192,8 @@
         </p:nvSpPr>
         <p:spPr>
           <a:xfrm>
-            <a:off x="630936" y="2660904"/>
-            <a:ext cx="4818888" cy="3547872"/>
+            <a:off x="630936" y="2807208"/>
+            <a:ext cx="3429000" cy="3410712"/>
           </a:xfrm>
         </p:spPr>
         <p:txBody>
@@ -9782,16 +10202,25 @@
           </a:bodyPr>
           <a:lstStyle/>
           <a:p>
-            <a:endParaRPr lang="en-US" sz="2200"/>
+            <a:r>
+              <a:rPr lang="en-US" sz="2200" dirty="0"/>
+              <a:t>Definition of the most basic state machine of a traffic light.</a:t>
+            </a:r>
+          </a:p>
+          <a:p>
+            <a:r>
+              <a:rPr lang="en-US" sz="2200" dirty="0"/>
+              <a:t>Refinement of the state machine to accommodate our use case scenario.</a:t>
+            </a:r>
           </a:p>
         </p:txBody>
       </p:sp>
       <p:pic>
         <p:nvPicPr>
-          <p:cNvPr id="5" name="Content Placeholder 4" descr="A screenshot of a computer&#10;&#10;Description automatically generated">
-            <a:extLst>
-              <a:ext uri="{FF2B5EF4-FFF2-40B4-BE49-F238E27FC236}">
-                <a16:creationId xmlns:a16="http://schemas.microsoft.com/office/drawing/2014/main" id="{BEA00B24-3B0F-3E47-ABAB-5694E85DD7AE}"/>
+          <p:cNvPr id="5" name="Picture 4">
+            <a:extLst>
+              <a:ext uri="{FF2B5EF4-FFF2-40B4-BE49-F238E27FC236}">
+                <a16:creationId xmlns:a16="http://schemas.microsoft.com/office/drawing/2014/main" id="{1371372A-7ACD-F9AC-AED0-052716656783}"/>
               </a:ext>
             </a:extLst>
           </p:cNvPr>
@@ -9814,8 +10243,8 @@
         </p:blipFill>
         <p:spPr>
           <a:xfrm>
-            <a:off x="6569507" y="640080"/>
-            <a:ext cx="4518050" cy="5577840"/>
+            <a:off x="4654296" y="1685810"/>
+            <a:ext cx="6903720" cy="3486379"/>
           </a:xfrm>
           <a:prstGeom prst="rect">
             <a:avLst/>
@@ -9825,7 +10254,457 @@
     </p:spTree>
     <p:extLst>
       <p:ext uri="{BB962C8B-B14F-4D97-AF65-F5344CB8AC3E}">
-        <p14:creationId xmlns:p14="http://schemas.microsoft.com/office/powerpoint/2010/main" val="2684201535"/>
+        <p14:creationId xmlns:p14="http://schemas.microsoft.com/office/powerpoint/2010/main" val="2080358371"/>
+      </p:ext>
+    </p:extLst>
+  </p:cSld>
+  <p:clrMapOvr>
+    <a:masterClrMapping/>
+  </p:clrMapOvr>
+</p:sld>
+</file>
+
+<file path=ppt/slides/slide9.xml><?xml version="1.0" encoding="utf-8"?>
+<p:sld xmlns:a="http://schemas.openxmlformats.org/drawingml/2006/main" xmlns:r="http://schemas.openxmlformats.org/officeDocument/2006/relationships" xmlns:p="http://schemas.openxmlformats.org/presentationml/2006/main">
+  <p:cSld>
+    <p:bg>
+      <p:bgPr>
+        <a:solidFill>
+          <a:schemeClr val="bg1"/>
+        </a:solidFill>
+        <a:effectLst/>
+      </p:bgPr>
+    </p:bg>
+    <p:spTree>
+      <p:nvGrpSpPr>
+        <p:cNvPr id="1" name=""/>
+        <p:cNvGrpSpPr/>
+        <p:nvPr/>
+      </p:nvGrpSpPr>
+      <p:grpSpPr>
+        <a:xfrm>
+          <a:off x="0" y="0"/>
+          <a:ext cx="0" cy="0"/>
+          <a:chOff x="0" y="0"/>
+          <a:chExt cx="0" cy="0"/>
+        </a:xfrm>
+      </p:grpSpPr>
+      <p:sp useBgFill="1">
+        <p:nvSpPr>
+          <p:cNvPr id="27" name="Rectangle 26">
+            <a:extLst>
+              <a:ext uri="{FF2B5EF4-FFF2-40B4-BE49-F238E27FC236}">
+                <a16:creationId xmlns:a16="http://schemas.microsoft.com/office/drawing/2014/main" id="{21516CB1-E8C8-4751-B6A6-46B2D1E72A61}"/>
+              </a:ext>
+              <a:ext uri="{C183D7F6-B498-43B3-948B-1728B52AA6E4}">
+                <adec:decorative xmlns:adec="http://schemas.microsoft.com/office/drawing/2017/decorative" val="1"/>
+              </a:ext>
+            </a:extLst>
+          </p:cNvPr>
+          <p:cNvSpPr>
+            <a:spLocks noGrp="1" noRot="1" noChangeAspect="1" noMove="1" noResize="1" noEditPoints="1" noAdjustHandles="1" noChangeArrowheads="1" noChangeShapeType="1" noTextEdit="1"/>
+          </p:cNvSpPr>
+          <p:nvPr>
+            <p:extLst>
+              <p:ext uri="{386F3935-93C4-4BCD-93E2-E3B085C9AB24}">
+                <p16:designElem xmlns:p16="http://schemas.microsoft.com/office/powerpoint/2015/main" val="1"/>
+              </p:ext>
+            </p:extLst>
+          </p:nvPr>
+        </p:nvSpPr>
+        <p:spPr>
+          <a:xfrm>
+            <a:off x="0" y="0"/>
+            <a:ext cx="12192000" cy="6858000"/>
+          </a:xfrm>
+          <a:prstGeom prst="rect">
+            <a:avLst/>
+          </a:prstGeom>
+          <a:ln>
+            <a:noFill/>
+          </a:ln>
+        </p:spPr>
+        <p:style>
+          <a:lnRef idx="2">
+            <a:schemeClr val="accent1">
+              <a:shade val="50000"/>
+            </a:schemeClr>
+          </a:lnRef>
+          <a:fillRef idx="1">
+            <a:schemeClr val="accent1"/>
+          </a:fillRef>
+          <a:effectRef idx="0">
+            <a:schemeClr val="accent1"/>
+          </a:effectRef>
+          <a:fontRef idx="minor">
+            <a:schemeClr val="lt1"/>
+          </a:fontRef>
+        </p:style>
+        <p:txBody>
+          <a:bodyPr rtlCol="0" anchor="ctr"/>
+          <a:lstStyle/>
+          <a:p>
+            <a:pPr algn="ctr"/>
+            <a:endParaRPr lang="en-US"/>
+          </a:p>
+        </p:txBody>
+      </p:sp>
+      <p:sp>
+        <p:nvSpPr>
+          <p:cNvPr id="2" name="Title 1">
+            <a:extLst>
+              <a:ext uri="{FF2B5EF4-FFF2-40B4-BE49-F238E27FC236}">
+                <a16:creationId xmlns:a16="http://schemas.microsoft.com/office/drawing/2014/main" id="{2CA1D05F-8071-6289-CF59-FA97AEE49972}"/>
+              </a:ext>
+            </a:extLst>
+          </p:cNvPr>
+          <p:cNvSpPr>
+            <a:spLocks noGrp="1"/>
+          </p:cNvSpPr>
+          <p:nvPr>
+            <p:ph type="title"/>
+          </p:nvPr>
+        </p:nvSpPr>
+        <p:spPr>
+          <a:xfrm>
+            <a:off x="429768" y="411480"/>
+            <a:ext cx="11131298" cy="1106424"/>
+          </a:xfrm>
+        </p:spPr>
+        <p:txBody>
+          <a:bodyPr>
+            <a:normAutofit/>
+          </a:bodyPr>
+          <a:lstStyle/>
+          <a:p>
+            <a:r>
+              <a:rPr lang="en-US" sz="3600"/>
+              <a:t>Sequence Diagrams</a:t>
+            </a:r>
+            <a:endParaRPr lang="en-DE" sz="3600"/>
+          </a:p>
+        </p:txBody>
+      </p:sp>
+      <p:sp>
+        <p:nvSpPr>
+          <p:cNvPr id="29" name="Rectangle 28">
+            <a:extLst>
+              <a:ext uri="{FF2B5EF4-FFF2-40B4-BE49-F238E27FC236}">
+                <a16:creationId xmlns:a16="http://schemas.microsoft.com/office/drawing/2014/main" id="{90C0C0D1-E79A-41FF-8322-256F6DD1499B}"/>
+              </a:ext>
+              <a:ext uri="{C183D7F6-B498-43B3-948B-1728B52AA6E4}">
+                <adec:decorative xmlns:adec="http://schemas.microsoft.com/office/drawing/2017/decorative" val="1"/>
+              </a:ext>
+            </a:extLst>
+          </p:cNvPr>
+          <p:cNvSpPr>
+            <a:spLocks noGrp="1" noRot="1" noChangeAspect="1" noMove="1" noResize="1" noEditPoints="1" noAdjustHandles="1" noChangeArrowheads="1" noChangeShapeType="1" noTextEdit="1"/>
+          </p:cNvSpPr>
+          <p:nvPr>
+            <p:extLst>
+              <p:ext uri="{386F3935-93C4-4BCD-93E2-E3B085C9AB24}">
+                <p16:designElem xmlns:p16="http://schemas.microsoft.com/office/powerpoint/2015/main" val="1"/>
+              </p:ext>
+            </p:extLst>
+          </p:nvPr>
+        </p:nvSpPr>
+        <p:spPr>
+          <a:xfrm>
+            <a:off x="0" y="585216"/>
+            <a:ext cx="128016" cy="704088"/>
+          </a:xfrm>
+          <a:prstGeom prst="rect">
+            <a:avLst/>
+          </a:prstGeom>
+          <a:solidFill>
+            <a:schemeClr val="accent2"/>
+          </a:solidFill>
+          <a:ln>
+            <a:noFill/>
+          </a:ln>
+        </p:spPr>
+        <p:style>
+          <a:lnRef idx="2">
+            <a:schemeClr val="accent1">
+              <a:shade val="50000"/>
+            </a:schemeClr>
+          </a:lnRef>
+          <a:fillRef idx="1">
+            <a:schemeClr val="accent1"/>
+          </a:fillRef>
+          <a:effectRef idx="0">
+            <a:schemeClr val="accent1"/>
+          </a:effectRef>
+          <a:fontRef idx="minor">
+            <a:schemeClr val="lt1"/>
+          </a:fontRef>
+        </p:style>
+        <p:txBody>
+          <a:bodyPr rtlCol="0" anchor="ctr"/>
+          <a:lstStyle/>
+          <a:p>
+            <a:pPr marL="0" marR="0" lvl="0" indent="0" algn="ctr" defTabSz="914400" rtl="0" eaLnBrk="1" fontAlgn="auto" latinLnBrk="0" hangingPunct="1">
+              <a:lnSpc>
+                <a:spcPct val="100000"/>
+              </a:lnSpc>
+              <a:spcBef>
+                <a:spcPts val="0"/>
+              </a:spcBef>
+              <a:spcAft>
+                <a:spcPts val="0"/>
+              </a:spcAft>
+              <a:buClrTx/>
+              <a:buSzTx/>
+              <a:buFontTx/>
+              <a:buNone/>
+              <a:tabLst/>
+              <a:defRPr/>
+            </a:pPr>
+            <a:endParaRPr kumimoji="0" lang="en-US" sz="1800" b="0" i="0" u="none" strike="noStrike" kern="1200" cap="none" spc="0" normalizeH="0" baseline="0" noProof="0">
+              <a:ln>
+                <a:noFill/>
+              </a:ln>
+              <a:solidFill>
+                <a:prstClr val="white"/>
+              </a:solidFill>
+              <a:effectLst/>
+              <a:uLnTx/>
+              <a:uFillTx/>
+              <a:latin typeface="Calibri" panose="020F0502020204030204"/>
+              <a:ea typeface="+mn-ea"/>
+              <a:cs typeface="+mn-cs"/>
+            </a:endParaRPr>
+          </a:p>
+        </p:txBody>
+      </p:sp>
+      <p:pic>
+        <p:nvPicPr>
+          <p:cNvPr id="7" name="Picture 6" descr="A diagram of a computer&#10;&#10;Description automatically generated">
+            <a:extLst>
+              <a:ext uri="{FF2B5EF4-FFF2-40B4-BE49-F238E27FC236}">
+                <a16:creationId xmlns:a16="http://schemas.microsoft.com/office/drawing/2014/main" id="{E53DC600-58EE-996E-C649-027E7025AE3D}"/>
+              </a:ext>
+            </a:extLst>
+          </p:cNvPr>
+          <p:cNvPicPr>
+            <a:picLocks noChangeAspect="1"/>
+          </p:cNvPicPr>
+          <p:nvPr/>
+        </p:nvPicPr>
+        <p:blipFill rotWithShape="1">
+          <a:blip r:embed="rId2">
+            <a:extLst>
+              <a:ext uri="{28A0092B-C50C-407E-A947-70E740481C1C}">
+                <a14:useLocalDpi xmlns:a14="http://schemas.microsoft.com/office/drawing/2010/main" val="0"/>
+              </a:ext>
+            </a:extLst>
+          </a:blip>
+          <a:srcRect l="5341" r="2379" b="-4"/>
+          <a:stretch/>
+        </p:blipFill>
+        <p:spPr>
+          <a:xfrm>
+            <a:off x="4226837" y="1721922"/>
+            <a:ext cx="3420596" cy="4520560"/>
+          </a:xfrm>
+          <a:prstGeom prst="rect">
+            <a:avLst/>
+          </a:prstGeom>
+        </p:spPr>
+      </p:pic>
+      <p:sp useBgFill="1">
+        <p:nvSpPr>
+          <p:cNvPr id="31" name="Rectangle 30">
+            <a:extLst>
+              <a:ext uri="{FF2B5EF4-FFF2-40B4-BE49-F238E27FC236}">
+                <a16:creationId xmlns:a16="http://schemas.microsoft.com/office/drawing/2014/main" id="{395FA420-5595-49D1-9D5F-79EC43B55574}"/>
+              </a:ext>
+              <a:ext uri="{C183D7F6-B498-43B3-948B-1728B52AA6E4}">
+                <adec:decorative xmlns:adec="http://schemas.microsoft.com/office/drawing/2017/decorative" val="1"/>
+              </a:ext>
+            </a:extLst>
+          </p:cNvPr>
+          <p:cNvSpPr>
+            <a:spLocks noGrp="1" noRot="1" noChangeAspect="1" noMove="1" noResize="1" noEditPoints="1" noAdjustHandles="1" noChangeArrowheads="1" noChangeShapeType="1" noTextEdit="1"/>
+          </p:cNvSpPr>
+          <p:nvPr>
+            <p:extLst>
+              <p:ext uri="{386F3935-93C4-4BCD-93E2-E3B085C9AB24}">
+                <p16:designElem xmlns:p16="http://schemas.microsoft.com/office/powerpoint/2015/main" val="1"/>
+              </p:ext>
+            </p:extLst>
+          </p:nvPr>
+        </p:nvSpPr>
+        <p:spPr>
+          <a:xfrm>
+            <a:off x="8024648" y="1721922"/>
+            <a:ext cx="3609143" cy="4520560"/>
+          </a:xfrm>
+          <a:prstGeom prst="rect">
+            <a:avLst/>
+          </a:prstGeom>
+          <a:ln w="9525">
+            <a:solidFill>
+              <a:srgbClr val="E1E1E1"/>
+            </a:solidFill>
+          </a:ln>
+          <a:effectLst>
+            <a:outerShdw blurRad="50800" dist="38100" dir="2700000" algn="tl" rotWithShape="0">
+              <a:schemeClr val="bg1">
+                <a:lumMod val="85000"/>
+                <a:alpha val="50000"/>
+              </a:schemeClr>
+            </a:outerShdw>
+          </a:effectLst>
+        </p:spPr>
+        <p:style>
+          <a:lnRef idx="2">
+            <a:schemeClr val="accent1">
+              <a:shade val="50000"/>
+            </a:schemeClr>
+          </a:lnRef>
+          <a:fillRef idx="1">
+            <a:schemeClr val="accent1"/>
+          </a:fillRef>
+          <a:effectRef idx="0">
+            <a:schemeClr val="accent1"/>
+          </a:effectRef>
+          <a:fontRef idx="minor">
+            <a:schemeClr val="lt1"/>
+          </a:fontRef>
+        </p:style>
+        <p:txBody>
+          <a:bodyPr rtlCol="0" anchor="ctr"/>
+          <a:lstStyle/>
+          <a:p>
+            <a:pPr marL="0" marR="0" lvl="0" indent="0" algn="ctr" defTabSz="914400" rtl="0" eaLnBrk="1" fontAlgn="auto" latinLnBrk="0" hangingPunct="1">
+              <a:lnSpc>
+                <a:spcPct val="100000"/>
+              </a:lnSpc>
+              <a:spcBef>
+                <a:spcPts val="0"/>
+              </a:spcBef>
+              <a:spcAft>
+                <a:spcPts val="0"/>
+              </a:spcAft>
+              <a:buClrTx/>
+              <a:buSzTx/>
+              <a:buFontTx/>
+              <a:buNone/>
+              <a:tabLst/>
+              <a:defRPr/>
+            </a:pPr>
+            <a:endParaRPr kumimoji="0" lang="en-US" sz="1800" b="0" i="0" u="none" strike="noStrike" kern="1200" cap="none" spc="0" normalizeH="0" baseline="0" noProof="0">
+              <a:ln>
+                <a:noFill/>
+              </a:ln>
+              <a:solidFill>
+                <a:prstClr val="white"/>
+              </a:solidFill>
+              <a:effectLst/>
+              <a:uLnTx/>
+              <a:uFillTx/>
+              <a:latin typeface="Calibri" panose="020F0502020204030204"/>
+              <a:ea typeface="+mn-ea"/>
+              <a:cs typeface="+mn-cs"/>
+            </a:endParaRPr>
+          </a:p>
+        </p:txBody>
+      </p:sp>
+      <p:sp>
+        <p:nvSpPr>
+          <p:cNvPr id="9" name="Content Placeholder 8">
+            <a:extLst>
+              <a:ext uri="{FF2B5EF4-FFF2-40B4-BE49-F238E27FC236}">
+                <a16:creationId xmlns:a16="http://schemas.microsoft.com/office/drawing/2014/main" id="{6587E8D0-A7AB-C8BA-C7C7-86FEE2105C0B}"/>
+              </a:ext>
+            </a:extLst>
+          </p:cNvPr>
+          <p:cNvSpPr>
+            <a:spLocks noGrp="1"/>
+          </p:cNvSpPr>
+          <p:nvPr>
+            <p:ph idx="1"/>
+          </p:nvPr>
+        </p:nvSpPr>
+        <p:spPr>
+          <a:xfrm>
+            <a:off x="712568" y="1721922"/>
+            <a:ext cx="2956060" cy="3959352"/>
+          </a:xfrm>
+        </p:spPr>
+        <p:txBody>
+          <a:bodyPr anchor="ctr">
+            <a:normAutofit/>
+          </a:bodyPr>
+          <a:lstStyle/>
+          <a:p>
+            <a:r>
+              <a:rPr lang="en-US" sz="1800" dirty="0"/>
+              <a:t>Definition for 2 use cases.</a:t>
+            </a:r>
+          </a:p>
+          <a:p>
+            <a:pPr lvl="1"/>
+            <a:r>
+              <a:rPr lang="en-US" sz="1800" dirty="0"/>
+              <a:t>Emergency Vehicles</a:t>
+            </a:r>
+          </a:p>
+          <a:p>
+            <a:pPr lvl="1"/>
+            <a:r>
+              <a:rPr lang="en-US" sz="1800" dirty="0"/>
+              <a:t>Non-Emergency Vehicles</a:t>
+            </a:r>
+          </a:p>
+          <a:p>
+            <a:r>
+              <a:rPr lang="en-US" sz="1800" dirty="0"/>
+              <a:t>Refinement of the sequence diagrams to fit a correct behavior.</a:t>
+            </a:r>
+          </a:p>
+        </p:txBody>
+      </p:sp>
+      <p:pic>
+        <p:nvPicPr>
+          <p:cNvPr id="4" name="Picture 3">
+            <a:extLst>
+              <a:ext uri="{FF2B5EF4-FFF2-40B4-BE49-F238E27FC236}">
+                <a16:creationId xmlns:a16="http://schemas.microsoft.com/office/drawing/2014/main" id="{A9B7E561-A069-7833-6DED-28BEF3E07113}"/>
+              </a:ext>
+            </a:extLst>
+          </p:cNvPr>
+          <p:cNvPicPr>
+            <a:picLocks noChangeAspect="1"/>
+          </p:cNvPicPr>
+          <p:nvPr/>
+        </p:nvPicPr>
+        <p:blipFill rotWithShape="1">
+          <a:blip r:embed="rId3">
+            <a:extLst>
+              <a:ext uri="{28A0092B-C50C-407E-A947-70E740481C1C}">
+                <a14:useLocalDpi xmlns:a14="http://schemas.microsoft.com/office/drawing/2010/main" val="0"/>
+              </a:ext>
+            </a:extLst>
+          </a:blip>
+          <a:srcRect l="3321" r="-4" b="-4"/>
+          <a:stretch/>
+        </p:blipFill>
+        <p:spPr>
+          <a:xfrm>
+            <a:off x="8213935" y="1721922"/>
+            <a:ext cx="3419856" cy="4520560"/>
+          </a:xfrm>
+          <a:prstGeom prst="rect">
+            <a:avLst/>
+          </a:prstGeom>
+        </p:spPr>
+      </p:pic>
+    </p:spTree>
+    <p:extLst>
+      <p:ext uri="{BB962C8B-B14F-4D97-AF65-F5344CB8AC3E}">
+        <p14:creationId xmlns:p14="http://schemas.microsoft.com/office/powerpoint/2010/main" val="417262923"/>
       </p:ext>
     </p:extLst>
   </p:cSld>

</xml_diff>